<commit_message>
Updated r project script, did discussion 5 and some python week 5
</commit_message>
<xml_diff>
--- a/R Project/AdelineCasali_RProject.pptx
+++ b/R Project/AdelineCasali_RProject.pptx
@@ -3307,6 +3307,14 @@
 <file path=ppt/slides/slide1.xml><?xml version="1.0" encoding="utf-8"?>
 <p:sld xmlns:a="http://schemas.openxmlformats.org/drawingml/2006/main" xmlns:r="http://schemas.openxmlformats.org/officeDocument/2006/relationships" xmlns:p="http://schemas.openxmlformats.org/presentationml/2006/main">
   <p:cSld>
+    <p:bg>
+      <p:bgPr>
+        <a:solidFill>
+          <a:schemeClr val="bg1"/>
+        </a:solidFill>
+        <a:effectLst/>
+      </p:bgPr>
+    </p:bg>
     <p:spTree>
       <p:nvGrpSpPr>
         <p:cNvPr id="1" name=""/>
@@ -3321,6 +3329,479 @@
           <a:chExt cx="0" cy="0"/>
         </a:xfrm>
       </p:grpSpPr>
+      <p:sp useBgFill="1">
+        <p:nvSpPr>
+          <p:cNvPr id="10" name="Rectangle 9">
+            <a:extLst>
+              <a:ext uri="{FF2B5EF4-FFF2-40B4-BE49-F238E27FC236}">
+                <a16:creationId xmlns:a16="http://schemas.microsoft.com/office/drawing/2014/main" id="{A8384FB5-9ADC-4DDC-881B-597D56F5B15D}"/>
+              </a:ext>
+              <a:ext uri="{C183D7F6-B498-43B3-948B-1728B52AA6E4}">
+                <adec:decorative xmlns:adec="http://schemas.microsoft.com/office/drawing/2017/decorative" val="1"/>
+              </a:ext>
+            </a:extLst>
+          </p:cNvPr>
+          <p:cNvSpPr>
+            <a:spLocks noGrp="1" noRot="1" noChangeAspect="1" noMove="1" noResize="1" noEditPoints="1" noAdjustHandles="1" noChangeArrowheads="1" noChangeShapeType="1" noTextEdit="1"/>
+          </p:cNvSpPr>
+          <p:nvPr>
+            <p:extLst>
+              <p:ext uri="{386F3935-93C4-4BCD-93E2-E3B085C9AB24}">
+                <p16:designElem xmlns:p16="http://schemas.microsoft.com/office/powerpoint/2015/main" val="1"/>
+              </p:ext>
+            </p:extLst>
+          </p:nvPr>
+        </p:nvSpPr>
+        <p:spPr>
+          <a:xfrm>
+            <a:off x="0" y="0"/>
+            <a:ext cx="12192000" cy="6858000"/>
+          </a:xfrm>
+          <a:prstGeom prst="rect">
+            <a:avLst/>
+          </a:prstGeom>
+          <a:ln w="12700" cap="flat" cmpd="sng" algn="ctr">
+            <a:noFill/>
+            <a:prstDash val="solid"/>
+            <a:miter lim="800000"/>
+          </a:ln>
+          <a:effectLst/>
+          <a:extLst>
+            <a:ext uri="{91240B29-F687-4F45-9708-019B960494DF}">
+              <a14:hiddenLine xmlns:a14="http://schemas.microsoft.com/office/drawing/2010/main" w="12700" cap="flat" cmpd="sng" algn="ctr">
+                <a:solidFill>
+                  <a:schemeClr val="accent1">
+                    <a:shade val="50000"/>
+                  </a:schemeClr>
+                </a:solidFill>
+                <a:prstDash val="solid"/>
+                <a:miter lim="800000"/>
+              </a14:hiddenLine>
+            </a:ext>
+          </a:extLst>
+        </p:spPr>
+        <p:style>
+          <a:lnRef idx="2">
+            <a:schemeClr val="accent1">
+              <a:shade val="50000"/>
+            </a:schemeClr>
+          </a:lnRef>
+          <a:fillRef idx="1">
+            <a:schemeClr val="accent1"/>
+          </a:fillRef>
+          <a:effectRef idx="0">
+            <a:schemeClr val="accent1"/>
+          </a:effectRef>
+          <a:fontRef idx="minor">
+            <a:schemeClr val="lt1"/>
+          </a:fontRef>
+        </p:style>
+        <p:txBody>
+          <a:bodyPr rtlCol="0" anchor="ctr"/>
+          <a:lstStyle/>
+          <a:p>
+            <a:pPr algn="ctr"/>
+            <a:endParaRPr lang="en-US"/>
+          </a:p>
+        </p:txBody>
+      </p:sp>
+      <p:sp>
+        <p:nvSpPr>
+          <p:cNvPr id="12" name="Rectangle 11">
+            <a:extLst>
+              <a:ext uri="{FF2B5EF4-FFF2-40B4-BE49-F238E27FC236}">
+                <a16:creationId xmlns:a16="http://schemas.microsoft.com/office/drawing/2014/main" id="{91E5A9A7-95C6-4F4F-B00E-C82E07FE62EF}"/>
+              </a:ext>
+              <a:ext uri="{C183D7F6-B498-43B3-948B-1728B52AA6E4}">
+                <adec:decorative xmlns:adec="http://schemas.microsoft.com/office/drawing/2017/decorative" val="1"/>
+              </a:ext>
+            </a:extLst>
+          </p:cNvPr>
+          <p:cNvSpPr>
+            <a:spLocks noGrp="1" noRot="1" noChangeAspect="1" noMove="1" noResize="1" noEditPoints="1" noAdjustHandles="1" noChangeArrowheads="1" noChangeShapeType="1" noTextEdit="1"/>
+          </p:cNvSpPr>
+          <p:nvPr>
+            <p:extLst>
+              <p:ext uri="{386F3935-93C4-4BCD-93E2-E3B085C9AB24}">
+                <p16:designElem xmlns:p16="http://schemas.microsoft.com/office/powerpoint/2015/main" val="1"/>
+              </p:ext>
+            </p:extLst>
+          </p:nvPr>
+        </p:nvSpPr>
+        <p:spPr>
+          <a:xfrm rot="5400000" flipH="1">
+            <a:off x="-1417539" y="1417538"/>
+            <a:ext cx="6875818" cy="4040744"/>
+          </a:xfrm>
+          <a:prstGeom prst="rect">
+            <a:avLst/>
+          </a:prstGeom>
+          <a:gradFill>
+            <a:gsLst>
+              <a:gs pos="0">
+                <a:srgbClr val="000000"/>
+              </a:gs>
+              <a:gs pos="100000">
+                <a:schemeClr val="accent1">
+                  <a:lumMod val="75000"/>
+                </a:schemeClr>
+              </a:gs>
+            </a:gsLst>
+            <a:lin ang="18600000" scaled="0"/>
+          </a:gradFill>
+          <a:ln>
+            <a:noFill/>
+          </a:ln>
+        </p:spPr>
+        <p:style>
+          <a:lnRef idx="2">
+            <a:schemeClr val="accent1">
+              <a:shade val="50000"/>
+            </a:schemeClr>
+          </a:lnRef>
+          <a:fillRef idx="1">
+            <a:schemeClr val="accent1"/>
+          </a:fillRef>
+          <a:effectRef idx="0">
+            <a:schemeClr val="accent1"/>
+          </a:effectRef>
+          <a:fontRef idx="minor">
+            <a:schemeClr val="lt1"/>
+          </a:fontRef>
+        </p:style>
+        <p:txBody>
+          <a:bodyPr rtlCol="0" anchor="ctr"/>
+          <a:lstStyle/>
+          <a:p>
+            <a:pPr algn="ctr"/>
+            <a:endParaRPr lang="en-US" dirty="0"/>
+          </a:p>
+        </p:txBody>
+      </p:sp>
+      <p:sp>
+        <p:nvSpPr>
+          <p:cNvPr id="14" name="Rectangle 13">
+            <a:extLst>
+              <a:ext uri="{FF2B5EF4-FFF2-40B4-BE49-F238E27FC236}">
+                <a16:creationId xmlns:a16="http://schemas.microsoft.com/office/drawing/2014/main" id="{D07DD2DE-F619-49DD-B5E7-03A290FF4ED1}"/>
+              </a:ext>
+              <a:ext uri="{C183D7F6-B498-43B3-948B-1728B52AA6E4}">
+                <adec:decorative xmlns:adec="http://schemas.microsoft.com/office/drawing/2017/decorative" val="1"/>
+              </a:ext>
+            </a:extLst>
+          </p:cNvPr>
+          <p:cNvSpPr>
+            <a:spLocks noGrp="1" noRot="1" noChangeAspect="1" noMove="1" noResize="1" noEditPoints="1" noAdjustHandles="1" noChangeArrowheads="1" noChangeShapeType="1" noTextEdit="1"/>
+          </p:cNvSpPr>
+          <p:nvPr>
+            <p:extLst>
+              <p:ext uri="{386F3935-93C4-4BCD-93E2-E3B085C9AB24}">
+                <p16:designElem xmlns:p16="http://schemas.microsoft.com/office/powerpoint/2015/main" val="1"/>
+              </p:ext>
+            </p:extLst>
+          </p:nvPr>
+        </p:nvSpPr>
+        <p:spPr>
+          <a:xfrm rot="16200000">
+            <a:off x="-158495" y="2660473"/>
+            <a:ext cx="4355594" cy="4038603"/>
+          </a:xfrm>
+          <a:prstGeom prst="rect">
+            <a:avLst/>
+          </a:prstGeom>
+          <a:gradFill>
+            <a:gsLst>
+              <a:gs pos="0">
+                <a:schemeClr val="accent1">
+                  <a:alpha val="50000"/>
+                </a:schemeClr>
+              </a:gs>
+              <a:gs pos="100000">
+                <a:schemeClr val="accent1">
+                  <a:lumMod val="50000"/>
+                  <a:alpha val="0"/>
+                </a:schemeClr>
+              </a:gs>
+            </a:gsLst>
+            <a:lin ang="11400000" scaled="0"/>
+          </a:gradFill>
+          <a:ln>
+            <a:noFill/>
+          </a:ln>
+        </p:spPr>
+        <p:style>
+          <a:lnRef idx="2">
+            <a:schemeClr val="accent1">
+              <a:shade val="50000"/>
+            </a:schemeClr>
+          </a:lnRef>
+          <a:fillRef idx="1">
+            <a:schemeClr val="accent1"/>
+          </a:fillRef>
+          <a:effectRef idx="0">
+            <a:schemeClr val="accent1"/>
+          </a:effectRef>
+          <a:fontRef idx="minor">
+            <a:schemeClr val="lt1"/>
+          </a:fontRef>
+        </p:style>
+        <p:txBody>
+          <a:bodyPr rtlCol="0" anchor="ctr"/>
+          <a:lstStyle/>
+          <a:p>
+            <a:pPr algn="ctr"/>
+            <a:endParaRPr lang="en-US"/>
+          </a:p>
+        </p:txBody>
+      </p:sp>
+      <p:sp>
+        <p:nvSpPr>
+          <p:cNvPr id="16" name="Rectangle 15">
+            <a:extLst>
+              <a:ext uri="{FF2B5EF4-FFF2-40B4-BE49-F238E27FC236}">
+                <a16:creationId xmlns:a16="http://schemas.microsoft.com/office/drawing/2014/main" id="{85149191-5F60-4A28-AAFF-039F96B0F3EC}"/>
+              </a:ext>
+              <a:ext uri="{C183D7F6-B498-43B3-948B-1728B52AA6E4}">
+                <adec:decorative xmlns:adec="http://schemas.microsoft.com/office/drawing/2017/decorative" val="1"/>
+              </a:ext>
+            </a:extLst>
+          </p:cNvPr>
+          <p:cNvSpPr>
+            <a:spLocks noGrp="1" noRot="1" noChangeAspect="1" noMove="1" noResize="1" noEditPoints="1" noAdjustHandles="1" noChangeArrowheads="1" noChangeShapeType="1" noTextEdit="1"/>
+          </p:cNvSpPr>
+          <p:nvPr>
+            <p:extLst>
+              <p:ext uri="{386F3935-93C4-4BCD-93E2-E3B085C9AB24}">
+                <p16:designElem xmlns:p16="http://schemas.microsoft.com/office/powerpoint/2015/main" val="1"/>
+              </p:ext>
+            </p:extLst>
+          </p:nvPr>
+        </p:nvSpPr>
+        <p:spPr>
+          <a:xfrm rot="16200000" flipH="1">
+            <a:off x="-1180882" y="1638085"/>
+            <a:ext cx="6857572" cy="3581401"/>
+          </a:xfrm>
+          <a:prstGeom prst="rect">
+            <a:avLst/>
+          </a:prstGeom>
+          <a:gradFill>
+            <a:gsLst>
+              <a:gs pos="0">
+                <a:srgbClr val="000000">
+                  <a:alpha val="59000"/>
+                </a:srgbClr>
+              </a:gs>
+              <a:gs pos="69000">
+                <a:schemeClr val="accent1">
+                  <a:alpha val="0"/>
+                </a:schemeClr>
+              </a:gs>
+            </a:gsLst>
+            <a:lin ang="13200000" scaled="0"/>
+          </a:gradFill>
+          <a:ln>
+            <a:noFill/>
+          </a:ln>
+        </p:spPr>
+        <p:style>
+          <a:lnRef idx="2">
+            <a:schemeClr val="accent1">
+              <a:shade val="50000"/>
+            </a:schemeClr>
+          </a:lnRef>
+          <a:fillRef idx="1">
+            <a:schemeClr val="accent1"/>
+          </a:fillRef>
+          <a:effectRef idx="0">
+            <a:schemeClr val="accent1"/>
+          </a:effectRef>
+          <a:fontRef idx="minor">
+            <a:schemeClr val="lt1"/>
+          </a:fontRef>
+        </p:style>
+        <p:txBody>
+          <a:bodyPr rtlCol="0" anchor="ctr"/>
+          <a:lstStyle/>
+          <a:p>
+            <a:pPr algn="ctr"/>
+            <a:endParaRPr lang="en-US" dirty="0"/>
+          </a:p>
+        </p:txBody>
+      </p:sp>
+      <p:sp>
+        <p:nvSpPr>
+          <p:cNvPr id="18" name="Freeform: Shape 17">
+            <a:extLst>
+              <a:ext uri="{FF2B5EF4-FFF2-40B4-BE49-F238E27FC236}">
+                <a16:creationId xmlns:a16="http://schemas.microsoft.com/office/drawing/2014/main" id="{F8260ED5-17F7-4158-B241-D51DD4CF1B7E}"/>
+              </a:ext>
+              <a:ext uri="{C183D7F6-B498-43B3-948B-1728B52AA6E4}">
+                <adec:decorative xmlns:adec="http://schemas.microsoft.com/office/drawing/2017/decorative" val="1"/>
+              </a:ext>
+            </a:extLst>
+          </p:cNvPr>
+          <p:cNvSpPr>
+            <a:spLocks noGrp="1" noRot="1" noChangeAspect="1" noMove="1" noResize="1" noEditPoints="1" noAdjustHandles="1" noChangeArrowheads="1" noChangeShapeType="1" noTextEdit="1"/>
+          </p:cNvSpPr>
+          <p:nvPr>
+            <p:extLst>
+              <p:ext uri="{386F3935-93C4-4BCD-93E2-E3B085C9AB24}">
+                <p16:designElem xmlns:p16="http://schemas.microsoft.com/office/powerpoint/2015/main" val="1"/>
+              </p:ext>
+            </p:extLst>
+          </p:nvPr>
+        </p:nvSpPr>
+        <p:spPr>
+          <a:xfrm rot="6097846">
+            <a:off x="-747355" y="1201312"/>
+            <a:ext cx="4808302" cy="4088666"/>
+          </a:xfrm>
+          <a:custGeom>
+            <a:avLst/>
+            <a:gdLst>
+              <a:gd name="connsiteX0" fmla="*/ 48844 w 4808302"/>
+              <a:gd name="connsiteY0" fmla="*/ 2888671 h 4088666"/>
+              <a:gd name="connsiteX1" fmla="*/ 0 w 4808302"/>
+              <a:gd name="connsiteY1" fmla="*/ 2404151 h 4088666"/>
+              <a:gd name="connsiteX2" fmla="*/ 2404151 w 4808302"/>
+              <a:gd name="connsiteY2" fmla="*/ 0 h 4088666"/>
+              <a:gd name="connsiteX3" fmla="*/ 4808302 w 4808302"/>
+              <a:gd name="connsiteY3" fmla="*/ 2404151 h 4088666"/>
+              <a:gd name="connsiteX4" fmla="*/ 4700216 w 4808302"/>
+              <a:gd name="connsiteY4" fmla="*/ 3119072 h 4088666"/>
+              <a:gd name="connsiteX5" fmla="*/ 4643143 w 4808302"/>
+              <a:gd name="connsiteY5" fmla="*/ 3275009 h 4088666"/>
+              <a:gd name="connsiteX6" fmla="*/ 690093 w 4808302"/>
+              <a:gd name="connsiteY6" fmla="*/ 4088666 h 4088666"/>
+              <a:gd name="connsiteX7" fmla="*/ 548991 w 4808302"/>
+              <a:gd name="connsiteY7" fmla="*/ 3933414 h 4088666"/>
+              <a:gd name="connsiteX8" fmla="*/ 48844 w 4808302"/>
+              <a:gd name="connsiteY8" fmla="*/ 2888671 h 4088666"/>
+            </a:gdLst>
+            <a:ahLst/>
+            <a:cxnLst>
+              <a:cxn ang="0">
+                <a:pos x="connsiteX0" y="connsiteY0"/>
+              </a:cxn>
+              <a:cxn ang="0">
+                <a:pos x="connsiteX1" y="connsiteY1"/>
+              </a:cxn>
+              <a:cxn ang="0">
+                <a:pos x="connsiteX2" y="connsiteY2"/>
+              </a:cxn>
+              <a:cxn ang="0">
+                <a:pos x="connsiteX3" y="connsiteY3"/>
+              </a:cxn>
+              <a:cxn ang="0">
+                <a:pos x="connsiteX4" y="connsiteY4"/>
+              </a:cxn>
+              <a:cxn ang="0">
+                <a:pos x="connsiteX5" y="connsiteY5"/>
+              </a:cxn>
+              <a:cxn ang="0">
+                <a:pos x="connsiteX6" y="connsiteY6"/>
+              </a:cxn>
+              <a:cxn ang="0">
+                <a:pos x="connsiteX7" y="connsiteY7"/>
+              </a:cxn>
+              <a:cxn ang="0">
+                <a:pos x="connsiteX8" y="connsiteY8"/>
+              </a:cxn>
+            </a:cxnLst>
+            <a:rect l="l" t="t" r="r" b="b"/>
+            <a:pathLst>
+              <a:path w="4808302" h="4088666">
+                <a:moveTo>
+                  <a:pt x="48844" y="2888671"/>
+                </a:moveTo>
+                <a:cubicBezTo>
+                  <a:pt x="16818" y="2732167"/>
+                  <a:pt x="0" y="2570123"/>
+                  <a:pt x="0" y="2404151"/>
+                </a:cubicBezTo>
+                <a:cubicBezTo>
+                  <a:pt x="0" y="1076375"/>
+                  <a:pt x="1076375" y="0"/>
+                  <a:pt x="2404151" y="0"/>
+                </a:cubicBezTo>
+                <a:cubicBezTo>
+                  <a:pt x="3731927" y="0"/>
+                  <a:pt x="4808302" y="1076375"/>
+                  <a:pt x="4808302" y="2404151"/>
+                </a:cubicBezTo>
+                <a:cubicBezTo>
+                  <a:pt x="4808302" y="2653109"/>
+                  <a:pt x="4770461" y="2893229"/>
+                  <a:pt x="4700216" y="3119072"/>
+                </a:cubicBezTo>
+                <a:lnTo>
+                  <a:pt x="4643143" y="3275009"/>
+                </a:lnTo>
+                <a:lnTo>
+                  <a:pt x="690093" y="4088666"/>
+                </a:lnTo>
+                <a:lnTo>
+                  <a:pt x="548991" y="3933414"/>
+                </a:lnTo>
+                <a:cubicBezTo>
+                  <a:pt x="304015" y="3636572"/>
+                  <a:pt x="128908" y="3279932"/>
+                  <a:pt x="48844" y="2888671"/>
+                </a:cubicBezTo>
+                <a:close/>
+              </a:path>
+            </a:pathLst>
+          </a:custGeom>
+          <a:gradFill>
+            <a:gsLst>
+              <a:gs pos="39000">
+                <a:schemeClr val="accent1">
+                  <a:lumMod val="60000"/>
+                  <a:lumOff val="40000"/>
+                  <a:alpha val="0"/>
+                </a:schemeClr>
+              </a:gs>
+              <a:gs pos="100000">
+                <a:schemeClr val="accent1">
+                  <a:lumMod val="75000"/>
+                  <a:alpha val="26000"/>
+                </a:schemeClr>
+              </a:gs>
+            </a:gsLst>
+            <a:lin ang="18600000" scaled="0"/>
+          </a:gradFill>
+          <a:ln>
+            <a:noFill/>
+          </a:ln>
+        </p:spPr>
+        <p:style>
+          <a:lnRef idx="2">
+            <a:schemeClr val="accent1">
+              <a:shade val="50000"/>
+            </a:schemeClr>
+          </a:lnRef>
+          <a:fillRef idx="1">
+            <a:schemeClr val="accent1"/>
+          </a:fillRef>
+          <a:effectRef idx="0">
+            <a:schemeClr val="accent1"/>
+          </a:effectRef>
+          <a:fontRef idx="minor">
+            <a:schemeClr val="lt1"/>
+          </a:fontRef>
+        </p:style>
+        <p:txBody>
+          <a:bodyPr wrap="square" rtlCol="0" anchor="ctr">
+            <a:noAutofit/>
+          </a:bodyPr>
+          <a:lstStyle/>
+          <a:p>
+            <a:pPr algn="ctr"/>
+            <a:endParaRPr lang="en-US" dirty="0"/>
+          </a:p>
+        </p:txBody>
+      </p:sp>
       <p:sp>
         <p:nvSpPr>
           <p:cNvPr id="2" name="Title 1">
@@ -3337,12 +3818,42 @@
             <p:ph type="ctrTitle"/>
           </p:nvPr>
         </p:nvSpPr>
-        <p:spPr/>
-        <p:txBody>
-          <a:bodyPr/>
-          <a:lstStyle/>
-          <a:p>
-            <a:endParaRPr lang="en-US"/>
+        <p:spPr>
+          <a:xfrm>
+            <a:off x="660041" y="2767106"/>
+            <a:ext cx="2880828" cy="3071906"/>
+          </a:xfrm>
+        </p:spPr>
+        <p:txBody>
+          <a:bodyPr anchor="t">
+            <a:normAutofit/>
+          </a:bodyPr>
+          <a:lstStyle/>
+          <a:p>
+            <a:pPr algn="l"/>
+            <a:r>
+              <a:rPr lang="en-US" sz="4000">
+                <a:solidFill>
+                  <a:srgbClr val="FFFFFF"/>
+                </a:solidFill>
+              </a:rPr>
+              <a:t>Data Science Salary Analysis: </a:t>
+            </a:r>
+            <a:br>
+              <a:rPr lang="en-US" sz="4000">
+                <a:solidFill>
+                  <a:srgbClr val="FFFFFF"/>
+                </a:solidFill>
+              </a:rPr>
+            </a:br>
+            <a:r>
+              <a:rPr lang="en-US" sz="4000">
+                <a:solidFill>
+                  <a:srgbClr val="FFFFFF"/>
+                </a:solidFill>
+              </a:rPr>
+              <a:t>Attracting Top Talent</a:t>
+            </a:r>
           </a:p>
         </p:txBody>
       </p:sp>
@@ -3362,15 +3873,272 @@
             <p:ph type="subTitle" idx="1"/>
           </p:nvPr>
         </p:nvSpPr>
-        <p:spPr/>
-        <p:txBody>
-          <a:bodyPr/>
-          <a:lstStyle/>
-          <a:p>
-            <a:endParaRPr lang="en-US"/>
-          </a:p>
-        </p:txBody>
-      </p:sp>
+        <p:spPr>
+          <a:xfrm>
+            <a:off x="660042" y="806824"/>
+            <a:ext cx="2919738" cy="1494117"/>
+          </a:xfrm>
+        </p:spPr>
+        <p:txBody>
+          <a:bodyPr anchor="b">
+            <a:normAutofit/>
+          </a:bodyPr>
+          <a:lstStyle/>
+          <a:p>
+            <a:pPr algn="l"/>
+            <a:r>
+              <a:rPr lang="en-US" sz="2000">
+                <a:solidFill>
+                  <a:srgbClr val="FFFFFF"/>
+                </a:solidFill>
+              </a:rPr>
+              <a:t>Adeline Casali, DSE5002</a:t>
+            </a:r>
+          </a:p>
+        </p:txBody>
+      </p:sp>
+      <p:pic>
+        <p:nvPicPr>
+          <p:cNvPr id="5" name="Picture 4" descr="A graph of salary&#10;&#10;Description automatically generated">
+            <a:extLst>
+              <a:ext uri="{FF2B5EF4-FFF2-40B4-BE49-F238E27FC236}">
+                <a16:creationId xmlns:a16="http://schemas.microsoft.com/office/drawing/2014/main" id="{7BEB672E-7F40-6A93-8E03-0E6E44B9F7A3}"/>
+              </a:ext>
+            </a:extLst>
+          </p:cNvPr>
+          <p:cNvPicPr>
+            <a:picLocks noChangeAspect="1"/>
+          </p:cNvPicPr>
+          <p:nvPr/>
+        </p:nvPicPr>
+        <p:blipFill>
+          <a:blip r:embed="rId2"/>
+          <a:stretch>
+            <a:fillRect/>
+          </a:stretch>
+        </p:blipFill>
+        <p:spPr>
+          <a:xfrm>
+            <a:off x="4143840" y="1814864"/>
+            <a:ext cx="6463200" cy="4831241"/>
+          </a:xfrm>
+          <a:prstGeom prst="rect">
+            <a:avLst/>
+          </a:prstGeom>
+        </p:spPr>
+      </p:pic>
+      <p:graphicFrame>
+        <p:nvGraphicFramePr>
+          <p:cNvPr id="7" name="Table 7">
+            <a:extLst>
+              <a:ext uri="{FF2B5EF4-FFF2-40B4-BE49-F238E27FC236}">
+                <a16:creationId xmlns:a16="http://schemas.microsoft.com/office/drawing/2014/main" id="{49E19639-AD47-A16A-7707-6AF1297F11A9}"/>
+              </a:ext>
+            </a:extLst>
+          </p:cNvPr>
+          <p:cNvGraphicFramePr>
+            <a:graphicFrameLocks noGrp="1"/>
+          </p:cNvGraphicFramePr>
+          <p:nvPr>
+            <p:extLst>
+              <p:ext uri="{D42A27DB-BD31-4B8C-83A1-F6EECF244321}">
+                <p14:modId xmlns:p14="http://schemas.microsoft.com/office/powerpoint/2010/main" val="3321931922"/>
+              </p:ext>
+            </p:extLst>
+          </p:nvPr>
+        </p:nvGraphicFramePr>
+        <p:xfrm>
+          <a:off x="8705088" y="211896"/>
+          <a:ext cx="3238176" cy="1828800"/>
+        </p:xfrm>
+        <a:graphic>
+          <a:graphicData uri="http://schemas.openxmlformats.org/drawingml/2006/table">
+            <a:tbl>
+              <a:tblPr firstRow="1" bandRow="1">
+                <a:tableStyleId>{5C22544A-7EE6-4342-B048-85BDC9FD1C3A}</a:tableStyleId>
+              </a:tblPr>
+              <a:tblGrid>
+                <a:gridCol w="1619088">
+                  <a:extLst>
+                    <a:ext uri="{9D8B030D-6E8A-4147-A177-3AD203B41FA5}">
+                      <a16:colId xmlns:a16="http://schemas.microsoft.com/office/drawing/2014/main" val="2364674308"/>
+                    </a:ext>
+                  </a:extLst>
+                </a:gridCol>
+                <a:gridCol w="1619088">
+                  <a:extLst>
+                    <a:ext uri="{9D8B030D-6E8A-4147-A177-3AD203B41FA5}">
+                      <a16:colId xmlns:a16="http://schemas.microsoft.com/office/drawing/2014/main" val="1418458252"/>
+                    </a:ext>
+                  </a:extLst>
+                </a:gridCol>
+              </a:tblGrid>
+              <a:tr h="312408">
+                <a:tc>
+                  <a:txBody>
+                    <a:bodyPr/>
+                    <a:lstStyle/>
+                    <a:p>
+                      <a:endParaRPr lang="en-US" dirty="0"/>
+                    </a:p>
+                  </a:txBody>
+                  <a:tcPr/>
+                </a:tc>
+                <a:tc>
+                  <a:txBody>
+                    <a:bodyPr/>
+                    <a:lstStyle/>
+                    <a:p>
+                      <a:r>
+                        <a:rPr lang="en-US" dirty="0"/>
+                        <a:t>Salary in USD</a:t>
+                      </a:r>
+                    </a:p>
+                  </a:txBody>
+                  <a:tcPr/>
+                </a:tc>
+                <a:extLst>
+                  <a:ext uri="{0D108BD9-81ED-4DB2-BD59-A6C34878D82A}">
+                    <a16:rowId xmlns:a16="http://schemas.microsoft.com/office/drawing/2014/main" val="3892380934"/>
+                  </a:ext>
+                </a:extLst>
+              </a:tr>
+              <a:tr h="312408">
+                <a:tc>
+                  <a:txBody>
+                    <a:bodyPr/>
+                    <a:lstStyle/>
+                    <a:p>
+                      <a:r>
+                        <a:rPr lang="en-US" dirty="0"/>
+                        <a:t>Minimum</a:t>
+                      </a:r>
+                    </a:p>
+                  </a:txBody>
+                  <a:tcPr/>
+                </a:tc>
+                <a:tc>
+                  <a:txBody>
+                    <a:bodyPr/>
+                    <a:lstStyle/>
+                    <a:p>
+                      <a:r>
+                        <a:rPr lang="en-US" dirty="0"/>
+                        <a:t>5,679</a:t>
+                      </a:r>
+                    </a:p>
+                  </a:txBody>
+                  <a:tcPr/>
+                </a:tc>
+                <a:extLst>
+                  <a:ext uri="{0D108BD9-81ED-4DB2-BD59-A6C34878D82A}">
+                    <a16:rowId xmlns:a16="http://schemas.microsoft.com/office/drawing/2014/main" val="641111717"/>
+                  </a:ext>
+                </a:extLst>
+              </a:tr>
+              <a:tr h="312408">
+                <a:tc>
+                  <a:txBody>
+                    <a:bodyPr/>
+                    <a:lstStyle/>
+                    <a:p>
+                      <a:r>
+                        <a:rPr lang="en-US" dirty="0"/>
+                        <a:t>Median</a:t>
+                      </a:r>
+                    </a:p>
+                  </a:txBody>
+                  <a:tcPr/>
+                </a:tc>
+                <a:tc>
+                  <a:txBody>
+                    <a:bodyPr/>
+                    <a:lstStyle/>
+                    <a:p>
+                      <a:r>
+                        <a:rPr lang="en-US" dirty="0"/>
+                        <a:t>135,000</a:t>
+                      </a:r>
+                    </a:p>
+                  </a:txBody>
+                  <a:tcPr/>
+                </a:tc>
+                <a:extLst>
+                  <a:ext uri="{0D108BD9-81ED-4DB2-BD59-A6C34878D82A}">
+                    <a16:rowId xmlns:a16="http://schemas.microsoft.com/office/drawing/2014/main" val="2414179572"/>
+                  </a:ext>
+                </a:extLst>
+              </a:tr>
+              <a:tr h="312408">
+                <a:tc>
+                  <a:txBody>
+                    <a:bodyPr/>
+                    <a:lstStyle/>
+                    <a:p>
+                      <a:r>
+                        <a:rPr lang="en-US" dirty="0"/>
+                        <a:t>Mean</a:t>
+                      </a:r>
+                    </a:p>
+                  </a:txBody>
+                  <a:tcPr/>
+                </a:tc>
+                <a:tc>
+                  <a:txBody>
+                    <a:bodyPr/>
+                    <a:lstStyle/>
+                    <a:p>
+                      <a:r>
+                        <a:rPr lang="en-US" dirty="0"/>
+                        <a:t>144,055</a:t>
+                      </a:r>
+                    </a:p>
+                  </a:txBody>
+                  <a:tcPr/>
+                </a:tc>
+                <a:extLst>
+                  <a:ext uri="{0D108BD9-81ED-4DB2-BD59-A6C34878D82A}">
+                    <a16:rowId xmlns:a16="http://schemas.microsoft.com/office/drawing/2014/main" val="3985389974"/>
+                  </a:ext>
+                </a:extLst>
+              </a:tr>
+              <a:tr h="312408">
+                <a:tc>
+                  <a:txBody>
+                    <a:bodyPr/>
+                    <a:lstStyle/>
+                    <a:p>
+                      <a:r>
+                        <a:rPr lang="en-US" dirty="0"/>
+                        <a:t>Maximum</a:t>
+                      </a:r>
+                    </a:p>
+                  </a:txBody>
+                  <a:tcPr/>
+                </a:tc>
+                <a:tc>
+                  <a:txBody>
+                    <a:bodyPr/>
+                    <a:lstStyle/>
+                    <a:p>
+                      <a:r>
+                        <a:rPr lang="en-US" dirty="0"/>
+                        <a:t>600,000</a:t>
+                      </a:r>
+                    </a:p>
+                  </a:txBody>
+                  <a:tcPr/>
+                </a:tc>
+                <a:extLst>
+                  <a:ext uri="{0D108BD9-81ED-4DB2-BD59-A6C34878D82A}">
+                    <a16:rowId xmlns:a16="http://schemas.microsoft.com/office/drawing/2014/main" val="1277129094"/>
+                  </a:ext>
+                </a:extLst>
+              </a:tr>
+            </a:tbl>
+          </a:graphicData>
+        </a:graphic>
+      </p:graphicFrame>
     </p:spTree>
     <p:extLst>
       <p:ext uri="{BB962C8B-B14F-4D97-AF65-F5344CB8AC3E}">

</xml_diff>

<commit_message>
Finished project and assignment 5
</commit_message>
<xml_diff>
--- a/R Project/AdelineCasali_RProject.pptx
+++ b/R Project/AdelineCasali_RProject.pptx
@@ -4,8 +4,15 @@
   <p:sldMasterIdLst>
     <p:sldMasterId id="2147483648" r:id="rId1"/>
   </p:sldMasterIdLst>
+  <p:notesMasterIdLst>
+    <p:notesMasterId r:id="rId7"/>
+  </p:notesMasterIdLst>
   <p:sldIdLst>
     <p:sldId id="256" r:id="rId2"/>
+    <p:sldId id="257" r:id="rId3"/>
+    <p:sldId id="258" r:id="rId4"/>
+    <p:sldId id="259" r:id="rId5"/>
+    <p:sldId id="260" r:id="rId6"/>
   </p:sldIdLst>
   <p:sldSz cx="12192000" cy="6858000"/>
   <p:notesSz cx="6858000" cy="9144000"/>
@@ -104,7 +111,802 @@
       </a:defRPr>
     </a:lvl9pPr>
   </p:defaultTextStyle>
+  <p:extLst>
+    <p:ext uri="{EFAFB233-063F-42B5-8137-9DF3F51BA10A}">
+      <p15:sldGuideLst xmlns:p15="http://schemas.microsoft.com/office/powerpoint/2012/main"/>
+    </p:ext>
+  </p:extLst>
 </p:presentation>
+</file>
+
+<file path=ppt/notesMasters/notesMaster1.xml><?xml version="1.0" encoding="utf-8"?>
+<p:notesMaster xmlns:a="http://schemas.openxmlformats.org/drawingml/2006/main" xmlns:r="http://schemas.openxmlformats.org/officeDocument/2006/relationships" xmlns:p="http://schemas.openxmlformats.org/presentationml/2006/main">
+  <p:cSld>
+    <p:bg>
+      <p:bgRef idx="1001">
+        <a:schemeClr val="bg1"/>
+      </p:bgRef>
+    </p:bg>
+    <p:spTree>
+      <p:nvGrpSpPr>
+        <p:cNvPr id="1" name=""/>
+        <p:cNvGrpSpPr/>
+        <p:nvPr/>
+      </p:nvGrpSpPr>
+      <p:grpSpPr>
+        <a:xfrm>
+          <a:off x="0" y="0"/>
+          <a:ext cx="0" cy="0"/>
+          <a:chOff x="0" y="0"/>
+          <a:chExt cx="0" cy="0"/>
+        </a:xfrm>
+      </p:grpSpPr>
+      <p:sp>
+        <p:nvSpPr>
+          <p:cNvPr id="2" name="Header Placeholder 1"/>
+          <p:cNvSpPr>
+            <a:spLocks noGrp="1"/>
+          </p:cNvSpPr>
+          <p:nvPr>
+            <p:ph type="hdr" sz="quarter"/>
+          </p:nvPr>
+        </p:nvSpPr>
+        <p:spPr>
+          <a:xfrm>
+            <a:off x="0" y="0"/>
+            <a:ext cx="2971800" cy="458788"/>
+          </a:xfrm>
+          <a:prstGeom prst="rect">
+            <a:avLst/>
+          </a:prstGeom>
+        </p:spPr>
+        <p:txBody>
+          <a:bodyPr vert="horz" lIns="91440" tIns="45720" rIns="91440" bIns="45720" rtlCol="0"/>
+          <a:lstStyle>
+            <a:lvl1pPr algn="l">
+              <a:defRPr sz="1200"/>
+            </a:lvl1pPr>
+          </a:lstStyle>
+          <a:p>
+            <a:endParaRPr lang="en-US"/>
+          </a:p>
+        </p:txBody>
+      </p:sp>
+      <p:sp>
+        <p:nvSpPr>
+          <p:cNvPr id="3" name="Date Placeholder 2"/>
+          <p:cNvSpPr>
+            <a:spLocks noGrp="1"/>
+          </p:cNvSpPr>
+          <p:nvPr>
+            <p:ph type="dt" idx="1"/>
+          </p:nvPr>
+        </p:nvSpPr>
+        <p:spPr>
+          <a:xfrm>
+            <a:off x="3884613" y="0"/>
+            <a:ext cx="2971800" cy="458788"/>
+          </a:xfrm>
+          <a:prstGeom prst="rect">
+            <a:avLst/>
+          </a:prstGeom>
+        </p:spPr>
+        <p:txBody>
+          <a:bodyPr vert="horz" lIns="91440" tIns="45720" rIns="91440" bIns="45720" rtlCol="0"/>
+          <a:lstStyle>
+            <a:lvl1pPr algn="r">
+              <a:defRPr sz="1200"/>
+            </a:lvl1pPr>
+          </a:lstStyle>
+          <a:p>
+            <a:fld id="{974CDB65-719A-A249-820E-CE2C7FC11534}" type="datetimeFigureOut">
+              <a:rPr lang="en-US" smtClean="0"/>
+              <a:t>8/4/23</a:t>
+            </a:fld>
+            <a:endParaRPr lang="en-US"/>
+          </a:p>
+        </p:txBody>
+      </p:sp>
+      <p:sp>
+        <p:nvSpPr>
+          <p:cNvPr id="4" name="Slide Image Placeholder 3"/>
+          <p:cNvSpPr>
+            <a:spLocks noGrp="1" noRot="1" noChangeAspect="1"/>
+          </p:cNvSpPr>
+          <p:nvPr>
+            <p:ph type="sldImg" idx="2"/>
+          </p:nvPr>
+        </p:nvSpPr>
+        <p:spPr>
+          <a:xfrm>
+            <a:off x="685800" y="1143000"/>
+            <a:ext cx="5486400" cy="3086100"/>
+          </a:xfrm>
+          <a:prstGeom prst="rect">
+            <a:avLst/>
+          </a:prstGeom>
+          <a:noFill/>
+          <a:ln w="12700">
+            <a:solidFill>
+              <a:prstClr val="black"/>
+            </a:solidFill>
+          </a:ln>
+        </p:spPr>
+        <p:txBody>
+          <a:bodyPr vert="horz" lIns="91440" tIns="45720" rIns="91440" bIns="45720" rtlCol="0" anchor="ctr"/>
+          <a:lstStyle/>
+          <a:p>
+            <a:endParaRPr lang="en-US"/>
+          </a:p>
+        </p:txBody>
+      </p:sp>
+      <p:sp>
+        <p:nvSpPr>
+          <p:cNvPr id="5" name="Notes Placeholder 4"/>
+          <p:cNvSpPr>
+            <a:spLocks noGrp="1"/>
+          </p:cNvSpPr>
+          <p:nvPr>
+            <p:ph type="body" sz="quarter" idx="3"/>
+          </p:nvPr>
+        </p:nvSpPr>
+        <p:spPr>
+          <a:xfrm>
+            <a:off x="685800" y="4400550"/>
+            <a:ext cx="5486400" cy="3600450"/>
+          </a:xfrm>
+          <a:prstGeom prst="rect">
+            <a:avLst/>
+          </a:prstGeom>
+        </p:spPr>
+        <p:txBody>
+          <a:bodyPr vert="horz" lIns="91440" tIns="45720" rIns="91440" bIns="45720" rtlCol="0"/>
+          <a:lstStyle/>
+          <a:p>
+            <a:pPr lvl="0"/>
+            <a:r>
+              <a:rPr lang="en-US"/>
+              <a:t>Click to edit Master text styles</a:t>
+            </a:r>
+          </a:p>
+          <a:p>
+            <a:pPr lvl="1"/>
+            <a:r>
+              <a:rPr lang="en-US"/>
+              <a:t>Second level</a:t>
+            </a:r>
+          </a:p>
+          <a:p>
+            <a:pPr lvl="2"/>
+            <a:r>
+              <a:rPr lang="en-US"/>
+              <a:t>Third level</a:t>
+            </a:r>
+          </a:p>
+          <a:p>
+            <a:pPr lvl="3"/>
+            <a:r>
+              <a:rPr lang="en-US"/>
+              <a:t>Fourth level</a:t>
+            </a:r>
+          </a:p>
+          <a:p>
+            <a:pPr lvl="4"/>
+            <a:r>
+              <a:rPr lang="en-US"/>
+              <a:t>Fifth level</a:t>
+            </a:r>
+          </a:p>
+        </p:txBody>
+      </p:sp>
+      <p:sp>
+        <p:nvSpPr>
+          <p:cNvPr id="6" name="Footer Placeholder 5"/>
+          <p:cNvSpPr>
+            <a:spLocks noGrp="1"/>
+          </p:cNvSpPr>
+          <p:nvPr>
+            <p:ph type="ftr" sz="quarter" idx="4"/>
+          </p:nvPr>
+        </p:nvSpPr>
+        <p:spPr>
+          <a:xfrm>
+            <a:off x="0" y="8685213"/>
+            <a:ext cx="2971800" cy="458787"/>
+          </a:xfrm>
+          <a:prstGeom prst="rect">
+            <a:avLst/>
+          </a:prstGeom>
+        </p:spPr>
+        <p:txBody>
+          <a:bodyPr vert="horz" lIns="91440" tIns="45720" rIns="91440" bIns="45720" rtlCol="0" anchor="b"/>
+          <a:lstStyle>
+            <a:lvl1pPr algn="l">
+              <a:defRPr sz="1200"/>
+            </a:lvl1pPr>
+          </a:lstStyle>
+          <a:p>
+            <a:endParaRPr lang="en-US"/>
+          </a:p>
+        </p:txBody>
+      </p:sp>
+      <p:sp>
+        <p:nvSpPr>
+          <p:cNvPr id="7" name="Slide Number Placeholder 6"/>
+          <p:cNvSpPr>
+            <a:spLocks noGrp="1"/>
+          </p:cNvSpPr>
+          <p:nvPr>
+            <p:ph type="sldNum" sz="quarter" idx="5"/>
+          </p:nvPr>
+        </p:nvSpPr>
+        <p:spPr>
+          <a:xfrm>
+            <a:off x="3884613" y="8685213"/>
+            <a:ext cx="2971800" cy="458787"/>
+          </a:xfrm>
+          <a:prstGeom prst="rect">
+            <a:avLst/>
+          </a:prstGeom>
+        </p:spPr>
+        <p:txBody>
+          <a:bodyPr vert="horz" lIns="91440" tIns="45720" rIns="91440" bIns="45720" rtlCol="0" anchor="b"/>
+          <a:lstStyle>
+            <a:lvl1pPr algn="r">
+              <a:defRPr sz="1200"/>
+            </a:lvl1pPr>
+          </a:lstStyle>
+          <a:p>
+            <a:fld id="{755601EB-3C8F-D646-B9C1-A038CD3E4673}" type="slidenum">
+              <a:rPr lang="en-US" smtClean="0"/>
+              <a:t>‹#›</a:t>
+            </a:fld>
+            <a:endParaRPr lang="en-US"/>
+          </a:p>
+        </p:txBody>
+      </p:sp>
+    </p:spTree>
+    <p:extLst>
+      <p:ext uri="{BB962C8B-B14F-4D97-AF65-F5344CB8AC3E}">
+        <p14:creationId xmlns:p14="http://schemas.microsoft.com/office/powerpoint/2010/main" val="4084326386"/>
+      </p:ext>
+    </p:extLst>
+  </p:cSld>
+  <p:clrMap bg1="lt1" tx1="dk1" bg2="lt2" tx2="dk2" accent1="accent1" accent2="accent2" accent3="accent3" accent4="accent4" accent5="accent5" accent6="accent6" hlink="hlink" folHlink="folHlink"/>
+  <p:notesStyle>
+    <a:lvl1pPr marL="0" algn="l" defTabSz="914400" rtl="0" eaLnBrk="1" latinLnBrk="0" hangingPunct="1">
+      <a:defRPr sz="1200" kern="1200">
+        <a:solidFill>
+          <a:schemeClr val="tx1"/>
+        </a:solidFill>
+        <a:latin typeface="+mn-lt"/>
+        <a:ea typeface="+mn-ea"/>
+        <a:cs typeface="+mn-cs"/>
+      </a:defRPr>
+    </a:lvl1pPr>
+    <a:lvl2pPr marL="457200" algn="l" defTabSz="914400" rtl="0" eaLnBrk="1" latinLnBrk="0" hangingPunct="1">
+      <a:defRPr sz="1200" kern="1200">
+        <a:solidFill>
+          <a:schemeClr val="tx1"/>
+        </a:solidFill>
+        <a:latin typeface="+mn-lt"/>
+        <a:ea typeface="+mn-ea"/>
+        <a:cs typeface="+mn-cs"/>
+      </a:defRPr>
+    </a:lvl2pPr>
+    <a:lvl3pPr marL="914400" algn="l" defTabSz="914400" rtl="0" eaLnBrk="1" latinLnBrk="0" hangingPunct="1">
+      <a:defRPr sz="1200" kern="1200">
+        <a:solidFill>
+          <a:schemeClr val="tx1"/>
+        </a:solidFill>
+        <a:latin typeface="+mn-lt"/>
+        <a:ea typeface="+mn-ea"/>
+        <a:cs typeface="+mn-cs"/>
+      </a:defRPr>
+    </a:lvl3pPr>
+    <a:lvl4pPr marL="1371600" algn="l" defTabSz="914400" rtl="0" eaLnBrk="1" latinLnBrk="0" hangingPunct="1">
+      <a:defRPr sz="1200" kern="1200">
+        <a:solidFill>
+          <a:schemeClr val="tx1"/>
+        </a:solidFill>
+        <a:latin typeface="+mn-lt"/>
+        <a:ea typeface="+mn-ea"/>
+        <a:cs typeface="+mn-cs"/>
+      </a:defRPr>
+    </a:lvl4pPr>
+    <a:lvl5pPr marL="1828800" algn="l" defTabSz="914400" rtl="0" eaLnBrk="1" latinLnBrk="0" hangingPunct="1">
+      <a:defRPr sz="1200" kern="1200">
+        <a:solidFill>
+          <a:schemeClr val="tx1"/>
+        </a:solidFill>
+        <a:latin typeface="+mn-lt"/>
+        <a:ea typeface="+mn-ea"/>
+        <a:cs typeface="+mn-cs"/>
+      </a:defRPr>
+    </a:lvl5pPr>
+    <a:lvl6pPr marL="2286000" algn="l" defTabSz="914400" rtl="0" eaLnBrk="1" latinLnBrk="0" hangingPunct="1">
+      <a:defRPr sz="1200" kern="1200">
+        <a:solidFill>
+          <a:schemeClr val="tx1"/>
+        </a:solidFill>
+        <a:latin typeface="+mn-lt"/>
+        <a:ea typeface="+mn-ea"/>
+        <a:cs typeface="+mn-cs"/>
+      </a:defRPr>
+    </a:lvl6pPr>
+    <a:lvl7pPr marL="2743200" algn="l" defTabSz="914400" rtl="0" eaLnBrk="1" latinLnBrk="0" hangingPunct="1">
+      <a:defRPr sz="1200" kern="1200">
+        <a:solidFill>
+          <a:schemeClr val="tx1"/>
+        </a:solidFill>
+        <a:latin typeface="+mn-lt"/>
+        <a:ea typeface="+mn-ea"/>
+        <a:cs typeface="+mn-cs"/>
+      </a:defRPr>
+    </a:lvl7pPr>
+    <a:lvl8pPr marL="3200400" algn="l" defTabSz="914400" rtl="0" eaLnBrk="1" latinLnBrk="0" hangingPunct="1">
+      <a:defRPr sz="1200" kern="1200">
+        <a:solidFill>
+          <a:schemeClr val="tx1"/>
+        </a:solidFill>
+        <a:latin typeface="+mn-lt"/>
+        <a:ea typeface="+mn-ea"/>
+        <a:cs typeface="+mn-cs"/>
+      </a:defRPr>
+    </a:lvl8pPr>
+    <a:lvl9pPr marL="3657600" algn="l" defTabSz="914400" rtl="0" eaLnBrk="1" latinLnBrk="0" hangingPunct="1">
+      <a:defRPr sz="1200" kern="1200">
+        <a:solidFill>
+          <a:schemeClr val="tx1"/>
+        </a:solidFill>
+        <a:latin typeface="+mn-lt"/>
+        <a:ea typeface="+mn-ea"/>
+        <a:cs typeface="+mn-cs"/>
+      </a:defRPr>
+    </a:lvl9pPr>
+  </p:notesStyle>
+</p:notesMaster>
+</file>
+
+<file path=ppt/notesSlides/notesSlide1.xml><?xml version="1.0" encoding="utf-8"?>
+<p:notes xmlns:a="http://schemas.openxmlformats.org/drawingml/2006/main" xmlns:r="http://schemas.openxmlformats.org/officeDocument/2006/relationships" xmlns:p="http://schemas.openxmlformats.org/presentationml/2006/main">
+  <p:cSld>
+    <p:spTree>
+      <p:nvGrpSpPr>
+        <p:cNvPr id="1" name=""/>
+        <p:cNvGrpSpPr/>
+        <p:nvPr/>
+      </p:nvGrpSpPr>
+      <p:grpSpPr>
+        <a:xfrm>
+          <a:off x="0" y="0"/>
+          <a:ext cx="0" cy="0"/>
+          <a:chOff x="0" y="0"/>
+          <a:chExt cx="0" cy="0"/>
+        </a:xfrm>
+      </p:grpSpPr>
+      <p:sp>
+        <p:nvSpPr>
+          <p:cNvPr id="2" name="Slide Image Placeholder 1"/>
+          <p:cNvSpPr>
+            <a:spLocks noGrp="1" noRot="1" noChangeAspect="1"/>
+          </p:cNvSpPr>
+          <p:nvPr>
+            <p:ph type="sldImg"/>
+          </p:nvPr>
+        </p:nvSpPr>
+        <p:spPr/>
+      </p:sp>
+      <p:sp>
+        <p:nvSpPr>
+          <p:cNvPr id="3" name="Notes Placeholder 2"/>
+          <p:cNvSpPr>
+            <a:spLocks noGrp="1"/>
+          </p:cNvSpPr>
+          <p:nvPr>
+            <p:ph type="body" idx="1"/>
+          </p:nvPr>
+        </p:nvSpPr>
+        <p:spPr/>
+        <p:txBody>
+          <a:bodyPr/>
+          <a:lstStyle/>
+          <a:p>
+            <a:r>
+              <a:rPr lang="en-US" dirty="0"/>
+              <a:t>This analysis looked at salaries of full-time employees at US-based companies. These salaries ranged from $5,679 USD all the way to $600,000 USD depending on experience level, job title, and employee residence, with a mean of $144,638 USD. </a:t>
+            </a:r>
+          </a:p>
+        </p:txBody>
+      </p:sp>
+      <p:sp>
+        <p:nvSpPr>
+          <p:cNvPr id="4" name="Slide Number Placeholder 3"/>
+          <p:cNvSpPr>
+            <a:spLocks noGrp="1"/>
+          </p:cNvSpPr>
+          <p:nvPr>
+            <p:ph type="sldNum" sz="quarter" idx="5"/>
+          </p:nvPr>
+        </p:nvSpPr>
+        <p:spPr/>
+        <p:txBody>
+          <a:bodyPr/>
+          <a:lstStyle/>
+          <a:p>
+            <a:fld id="{755601EB-3C8F-D646-B9C1-A038CD3E4673}" type="slidenum">
+              <a:rPr lang="en-US" smtClean="0"/>
+              <a:t>1</a:t>
+            </a:fld>
+            <a:endParaRPr lang="en-US"/>
+          </a:p>
+        </p:txBody>
+      </p:sp>
+    </p:spTree>
+    <p:extLst>
+      <p:ext uri="{BB962C8B-B14F-4D97-AF65-F5344CB8AC3E}">
+        <p14:creationId xmlns:p14="http://schemas.microsoft.com/office/powerpoint/2010/main" val="71287032"/>
+      </p:ext>
+    </p:extLst>
+  </p:cSld>
+  <p:clrMapOvr>
+    <a:masterClrMapping/>
+  </p:clrMapOvr>
+</p:notes>
+</file>
+
+<file path=ppt/notesSlides/notesSlide2.xml><?xml version="1.0" encoding="utf-8"?>
+<p:notes xmlns:a="http://schemas.openxmlformats.org/drawingml/2006/main" xmlns:r="http://schemas.openxmlformats.org/officeDocument/2006/relationships" xmlns:p="http://schemas.openxmlformats.org/presentationml/2006/main">
+  <p:cSld>
+    <p:spTree>
+      <p:nvGrpSpPr>
+        <p:cNvPr id="1" name=""/>
+        <p:cNvGrpSpPr/>
+        <p:nvPr/>
+      </p:nvGrpSpPr>
+      <p:grpSpPr>
+        <a:xfrm>
+          <a:off x="0" y="0"/>
+          <a:ext cx="0" cy="0"/>
+          <a:chOff x="0" y="0"/>
+          <a:chExt cx="0" cy="0"/>
+        </a:xfrm>
+      </p:grpSpPr>
+      <p:sp>
+        <p:nvSpPr>
+          <p:cNvPr id="2" name="Slide Image Placeholder 1"/>
+          <p:cNvSpPr>
+            <a:spLocks noGrp="1" noRot="1" noChangeAspect="1"/>
+          </p:cNvSpPr>
+          <p:nvPr>
+            <p:ph type="sldImg"/>
+          </p:nvPr>
+        </p:nvSpPr>
+        <p:spPr/>
+      </p:sp>
+      <p:sp>
+        <p:nvSpPr>
+          <p:cNvPr id="3" name="Notes Placeholder 2"/>
+          <p:cNvSpPr>
+            <a:spLocks noGrp="1"/>
+          </p:cNvSpPr>
+          <p:nvPr>
+            <p:ph type="body" idx="1"/>
+          </p:nvPr>
+        </p:nvSpPr>
+        <p:spPr/>
+        <p:txBody>
+          <a:bodyPr/>
+          <a:lstStyle/>
+          <a:p>
+            <a:r>
+              <a:rPr lang="en-US" dirty="0"/>
+              <a:t>Data science salaries have been growing since 2020. Based on extrapolation from the linear model, the median salary for a data scientist in 2023 will be roughly $156,000 USD. This trend is increasing over time, and may continue to grow in the future as inflation rises. </a:t>
+            </a:r>
+          </a:p>
+        </p:txBody>
+      </p:sp>
+      <p:sp>
+        <p:nvSpPr>
+          <p:cNvPr id="4" name="Slide Number Placeholder 3"/>
+          <p:cNvSpPr>
+            <a:spLocks noGrp="1"/>
+          </p:cNvSpPr>
+          <p:nvPr>
+            <p:ph type="sldNum" sz="quarter" idx="5"/>
+          </p:nvPr>
+        </p:nvSpPr>
+        <p:spPr/>
+        <p:txBody>
+          <a:bodyPr/>
+          <a:lstStyle/>
+          <a:p>
+            <a:fld id="{755601EB-3C8F-D646-B9C1-A038CD3E4673}" type="slidenum">
+              <a:rPr lang="en-US" smtClean="0"/>
+              <a:t>2</a:t>
+            </a:fld>
+            <a:endParaRPr lang="en-US"/>
+          </a:p>
+        </p:txBody>
+      </p:sp>
+    </p:spTree>
+    <p:extLst>
+      <p:ext uri="{BB962C8B-B14F-4D97-AF65-F5344CB8AC3E}">
+        <p14:creationId xmlns:p14="http://schemas.microsoft.com/office/powerpoint/2010/main" val="3639378767"/>
+      </p:ext>
+    </p:extLst>
+  </p:cSld>
+  <p:clrMapOvr>
+    <a:masterClrMapping/>
+  </p:clrMapOvr>
+</p:notes>
+</file>
+
+<file path=ppt/notesSlides/notesSlide3.xml><?xml version="1.0" encoding="utf-8"?>
+<p:notes xmlns:a="http://schemas.openxmlformats.org/drawingml/2006/main" xmlns:r="http://schemas.openxmlformats.org/officeDocument/2006/relationships" xmlns:p="http://schemas.openxmlformats.org/presentationml/2006/main">
+  <p:cSld>
+    <p:spTree>
+      <p:nvGrpSpPr>
+        <p:cNvPr id="1" name=""/>
+        <p:cNvGrpSpPr/>
+        <p:nvPr/>
+      </p:nvGrpSpPr>
+      <p:grpSpPr>
+        <a:xfrm>
+          <a:off x="0" y="0"/>
+          <a:ext cx="0" cy="0"/>
+          <a:chOff x="0" y="0"/>
+          <a:chExt cx="0" cy="0"/>
+        </a:xfrm>
+      </p:grpSpPr>
+      <p:sp>
+        <p:nvSpPr>
+          <p:cNvPr id="2" name="Slide Image Placeholder 1"/>
+          <p:cNvSpPr>
+            <a:spLocks noGrp="1" noRot="1" noChangeAspect="1"/>
+          </p:cNvSpPr>
+          <p:nvPr>
+            <p:ph type="sldImg"/>
+          </p:nvPr>
+        </p:nvSpPr>
+        <p:spPr/>
+      </p:sp>
+      <p:sp>
+        <p:nvSpPr>
+          <p:cNvPr id="3" name="Notes Placeholder 2"/>
+          <p:cNvSpPr>
+            <a:spLocks noGrp="1"/>
+          </p:cNvSpPr>
+          <p:nvPr>
+            <p:ph type="body" idx="1"/>
+          </p:nvPr>
+        </p:nvSpPr>
+        <p:spPr/>
+        <p:txBody>
+          <a:bodyPr/>
+          <a:lstStyle/>
+          <a:p>
+            <a:r>
+              <a:rPr lang="en-US" dirty="0"/>
+              <a:t>Based on my findings, remote work ratio does not impact salary. However, offshore hiring does, and is significantly less expensive. However, there may be a language barrier and the employee would have to work remotely and/or be flown onsite. </a:t>
+            </a:r>
+          </a:p>
+        </p:txBody>
+      </p:sp>
+      <p:sp>
+        <p:nvSpPr>
+          <p:cNvPr id="4" name="Slide Number Placeholder 3"/>
+          <p:cNvSpPr>
+            <a:spLocks noGrp="1"/>
+          </p:cNvSpPr>
+          <p:nvPr>
+            <p:ph type="sldNum" sz="quarter" idx="5"/>
+          </p:nvPr>
+        </p:nvSpPr>
+        <p:spPr/>
+        <p:txBody>
+          <a:bodyPr/>
+          <a:lstStyle/>
+          <a:p>
+            <a:fld id="{755601EB-3C8F-D646-B9C1-A038CD3E4673}" type="slidenum">
+              <a:rPr lang="en-US" smtClean="0"/>
+              <a:t>3</a:t>
+            </a:fld>
+            <a:endParaRPr lang="en-US"/>
+          </a:p>
+        </p:txBody>
+      </p:sp>
+    </p:spTree>
+    <p:extLst>
+      <p:ext uri="{BB962C8B-B14F-4D97-AF65-F5344CB8AC3E}">
+        <p14:creationId xmlns:p14="http://schemas.microsoft.com/office/powerpoint/2010/main" val="285781993"/>
+      </p:ext>
+    </p:extLst>
+  </p:cSld>
+  <p:clrMapOvr>
+    <a:masterClrMapping/>
+  </p:clrMapOvr>
+</p:notes>
+</file>
+
+<file path=ppt/notesSlides/notesSlide4.xml><?xml version="1.0" encoding="utf-8"?>
+<p:notes xmlns:a="http://schemas.openxmlformats.org/drawingml/2006/main" xmlns:r="http://schemas.openxmlformats.org/officeDocument/2006/relationships" xmlns:p="http://schemas.openxmlformats.org/presentationml/2006/main">
+  <p:cSld>
+    <p:spTree>
+      <p:nvGrpSpPr>
+        <p:cNvPr id="1" name=""/>
+        <p:cNvGrpSpPr/>
+        <p:nvPr/>
+      </p:nvGrpSpPr>
+      <p:grpSpPr>
+        <a:xfrm>
+          <a:off x="0" y="0"/>
+          <a:ext cx="0" cy="0"/>
+          <a:chOff x="0" y="0"/>
+          <a:chExt cx="0" cy="0"/>
+        </a:xfrm>
+      </p:grpSpPr>
+      <p:sp>
+        <p:nvSpPr>
+          <p:cNvPr id="2" name="Slide Image Placeholder 1"/>
+          <p:cNvSpPr>
+            <a:spLocks noGrp="1" noRot="1" noChangeAspect="1"/>
+          </p:cNvSpPr>
+          <p:nvPr>
+            <p:ph type="sldImg"/>
+          </p:nvPr>
+        </p:nvSpPr>
+        <p:spPr/>
+      </p:sp>
+      <p:sp>
+        <p:nvSpPr>
+          <p:cNvPr id="3" name="Notes Placeholder 2"/>
+          <p:cNvSpPr>
+            <a:spLocks noGrp="1"/>
+          </p:cNvSpPr>
+          <p:nvPr>
+            <p:ph type="body" idx="1"/>
+          </p:nvPr>
+        </p:nvSpPr>
+        <p:spPr/>
+        <p:txBody>
+          <a:bodyPr/>
+          <a:lstStyle/>
+          <a:p>
+            <a:r>
+              <a:rPr lang="en-US" dirty="0"/>
+              <a:t>Salaries increase linearly as you move up in experience level. Based on the job description and the need to hire someone who can lead a team in the future, I would recommend hiring at the Senior-level / Expert experience level, which has a median salary of $146,900 USD. </a:t>
+            </a:r>
+          </a:p>
+        </p:txBody>
+      </p:sp>
+      <p:sp>
+        <p:nvSpPr>
+          <p:cNvPr id="4" name="Slide Number Placeholder 3"/>
+          <p:cNvSpPr>
+            <a:spLocks noGrp="1"/>
+          </p:cNvSpPr>
+          <p:nvPr>
+            <p:ph type="sldNum" sz="quarter" idx="5"/>
+          </p:nvPr>
+        </p:nvSpPr>
+        <p:spPr/>
+        <p:txBody>
+          <a:bodyPr/>
+          <a:lstStyle/>
+          <a:p>
+            <a:fld id="{755601EB-3C8F-D646-B9C1-A038CD3E4673}" type="slidenum">
+              <a:rPr lang="en-US" smtClean="0"/>
+              <a:t>4</a:t>
+            </a:fld>
+            <a:endParaRPr lang="en-US"/>
+          </a:p>
+        </p:txBody>
+      </p:sp>
+    </p:spTree>
+    <p:extLst>
+      <p:ext uri="{BB962C8B-B14F-4D97-AF65-F5344CB8AC3E}">
+        <p14:creationId xmlns:p14="http://schemas.microsoft.com/office/powerpoint/2010/main" val="3167245060"/>
+      </p:ext>
+    </p:extLst>
+  </p:cSld>
+  <p:clrMapOvr>
+    <a:masterClrMapping/>
+  </p:clrMapOvr>
+</p:notes>
+</file>
+
+<file path=ppt/notesSlides/notesSlide5.xml><?xml version="1.0" encoding="utf-8"?>
+<p:notes xmlns:a="http://schemas.openxmlformats.org/drawingml/2006/main" xmlns:r="http://schemas.openxmlformats.org/officeDocument/2006/relationships" xmlns:p="http://schemas.openxmlformats.org/presentationml/2006/main">
+  <p:cSld>
+    <p:spTree>
+      <p:nvGrpSpPr>
+        <p:cNvPr id="1" name=""/>
+        <p:cNvGrpSpPr/>
+        <p:nvPr/>
+      </p:nvGrpSpPr>
+      <p:grpSpPr>
+        <a:xfrm>
+          <a:off x="0" y="0"/>
+          <a:ext cx="0" cy="0"/>
+          <a:chOff x="0" y="0"/>
+          <a:chExt cx="0" cy="0"/>
+        </a:xfrm>
+      </p:grpSpPr>
+      <p:sp>
+        <p:nvSpPr>
+          <p:cNvPr id="2" name="Slide Image Placeholder 1"/>
+          <p:cNvSpPr>
+            <a:spLocks noGrp="1" noRot="1" noChangeAspect="1"/>
+          </p:cNvSpPr>
+          <p:nvPr>
+            <p:ph type="sldImg"/>
+          </p:nvPr>
+        </p:nvSpPr>
+        <p:spPr/>
+      </p:sp>
+      <p:sp>
+        <p:nvSpPr>
+          <p:cNvPr id="3" name="Notes Placeholder 2"/>
+          <p:cNvSpPr>
+            <a:spLocks noGrp="1"/>
+          </p:cNvSpPr>
+          <p:nvPr>
+            <p:ph type="body" idx="1"/>
+          </p:nvPr>
+        </p:nvSpPr>
+        <p:spPr/>
+        <p:txBody>
+          <a:bodyPr/>
+          <a:lstStyle/>
+          <a:p>
+            <a:r>
+              <a:rPr lang="en-US" dirty="0"/>
+              <a:t>Based on extrapolation from the filtered linear model, the median salary for a senior/expert level data scientist from a medium sized US based company in 2023 will be roughly $115,000 USD. This trend is decreasing, potentially due to market rebounding after COVID. </a:t>
+            </a:r>
+          </a:p>
+          <a:p>
+            <a:r>
+              <a:rPr lang="en-US" dirty="0"/>
+              <a:t>Overall, based on all of the above data, I would recommend a minimum salary of $140,000 (USD) up to a maximum of the 3rd quantile salary from 2022 of $169,000 (USD) in order to obtain the most competitive talent, capable of spearheading data science in the company and leading a team in the future. This number could be reduced by roughly $20,000 or more, depending on where in the world the candidate is located, if hiring offshore talent. </a:t>
+            </a:r>
+          </a:p>
+        </p:txBody>
+      </p:sp>
+      <p:sp>
+        <p:nvSpPr>
+          <p:cNvPr id="4" name="Slide Number Placeholder 3"/>
+          <p:cNvSpPr>
+            <a:spLocks noGrp="1"/>
+          </p:cNvSpPr>
+          <p:nvPr>
+            <p:ph type="sldNum" sz="quarter" idx="5"/>
+          </p:nvPr>
+        </p:nvSpPr>
+        <p:spPr/>
+        <p:txBody>
+          <a:bodyPr/>
+          <a:lstStyle/>
+          <a:p>
+            <a:fld id="{755601EB-3C8F-D646-B9C1-A038CD3E4673}" type="slidenum">
+              <a:rPr lang="en-US" smtClean="0"/>
+              <a:t>5</a:t>
+            </a:fld>
+            <a:endParaRPr lang="en-US"/>
+          </a:p>
+        </p:txBody>
+      </p:sp>
+    </p:spTree>
+    <p:extLst>
+      <p:ext uri="{BB962C8B-B14F-4D97-AF65-F5344CB8AC3E}">
+        <p14:creationId xmlns:p14="http://schemas.microsoft.com/office/powerpoint/2010/main" val="4253101049"/>
+      </p:ext>
+    </p:extLst>
+  </p:cSld>
+  <p:clrMapOvr>
+    <a:masterClrMapping/>
+  </p:clrMapOvr>
+</p:notes>
 </file>
 
 <file path=ppt/slideLayouts/slideLayout1.xml><?xml version="1.0" encoding="utf-8"?>
@@ -254,7 +1056,7 @@
           <a:p>
             <a:fld id="{E76E4575-C09C-B342-8A7F-AC19BE29436D}" type="datetimeFigureOut">
               <a:rPr lang="en-US" smtClean="0"/>
-              <a:t>8/3/23</a:t>
+              <a:t>8/4/23</a:t>
             </a:fld>
             <a:endParaRPr lang="en-US"/>
           </a:p>
@@ -452,7 +1254,7 @@
           <a:p>
             <a:fld id="{E76E4575-C09C-B342-8A7F-AC19BE29436D}" type="datetimeFigureOut">
               <a:rPr lang="en-US" smtClean="0"/>
-              <a:t>8/3/23</a:t>
+              <a:t>8/4/23</a:t>
             </a:fld>
             <a:endParaRPr lang="en-US"/>
           </a:p>
@@ -660,7 +1462,7 @@
           <a:p>
             <a:fld id="{E76E4575-C09C-B342-8A7F-AC19BE29436D}" type="datetimeFigureOut">
               <a:rPr lang="en-US" smtClean="0"/>
-              <a:t>8/3/23</a:t>
+              <a:t>8/4/23</a:t>
             </a:fld>
             <a:endParaRPr lang="en-US"/>
           </a:p>
@@ -858,7 +1660,7 @@
           <a:p>
             <a:fld id="{E76E4575-C09C-B342-8A7F-AC19BE29436D}" type="datetimeFigureOut">
               <a:rPr lang="en-US" smtClean="0"/>
-              <a:t>8/3/23</a:t>
+              <a:t>8/4/23</a:t>
             </a:fld>
             <a:endParaRPr lang="en-US"/>
           </a:p>
@@ -1133,7 +1935,7 @@
           <a:p>
             <a:fld id="{E76E4575-C09C-B342-8A7F-AC19BE29436D}" type="datetimeFigureOut">
               <a:rPr lang="en-US" smtClean="0"/>
-              <a:t>8/3/23</a:t>
+              <a:t>8/4/23</a:t>
             </a:fld>
             <a:endParaRPr lang="en-US"/>
           </a:p>
@@ -1398,7 +2200,7 @@
           <a:p>
             <a:fld id="{E76E4575-C09C-B342-8A7F-AC19BE29436D}" type="datetimeFigureOut">
               <a:rPr lang="en-US" smtClean="0"/>
-              <a:t>8/3/23</a:t>
+              <a:t>8/4/23</a:t>
             </a:fld>
             <a:endParaRPr lang="en-US"/>
           </a:p>
@@ -1810,7 +2612,7 @@
           <a:p>
             <a:fld id="{E76E4575-C09C-B342-8A7F-AC19BE29436D}" type="datetimeFigureOut">
               <a:rPr lang="en-US" smtClean="0"/>
-              <a:t>8/3/23</a:t>
+              <a:t>8/4/23</a:t>
             </a:fld>
             <a:endParaRPr lang="en-US"/>
           </a:p>
@@ -1951,7 +2753,7 @@
           <a:p>
             <a:fld id="{E76E4575-C09C-B342-8A7F-AC19BE29436D}" type="datetimeFigureOut">
               <a:rPr lang="en-US" smtClean="0"/>
-              <a:t>8/3/23</a:t>
+              <a:t>8/4/23</a:t>
             </a:fld>
             <a:endParaRPr lang="en-US"/>
           </a:p>
@@ -2064,7 +2866,7 @@
           <a:p>
             <a:fld id="{E76E4575-C09C-B342-8A7F-AC19BE29436D}" type="datetimeFigureOut">
               <a:rPr lang="en-US" smtClean="0"/>
-              <a:t>8/3/23</a:t>
+              <a:t>8/4/23</a:t>
             </a:fld>
             <a:endParaRPr lang="en-US"/>
           </a:p>
@@ -2375,7 +3177,7 @@
           <a:p>
             <a:fld id="{E76E4575-C09C-B342-8A7F-AC19BE29436D}" type="datetimeFigureOut">
               <a:rPr lang="en-US" smtClean="0"/>
-              <a:t>8/3/23</a:t>
+              <a:t>8/4/23</a:t>
             </a:fld>
             <a:endParaRPr lang="en-US"/>
           </a:p>
@@ -2663,7 +3465,7 @@
           <a:p>
             <a:fld id="{E76E4575-C09C-B342-8A7F-AC19BE29436D}" type="datetimeFigureOut">
               <a:rPr lang="en-US" smtClean="0"/>
-              <a:t>8/3/23</a:t>
+              <a:t>8/4/23</a:t>
             </a:fld>
             <a:endParaRPr lang="en-US"/>
           </a:p>
@@ -2904,7 +3706,7 @@
           <a:p>
             <a:fld id="{E76E4575-C09C-B342-8A7F-AC19BE29436D}" type="datetimeFigureOut">
               <a:rPr lang="en-US" smtClean="0"/>
-              <a:t>8/3/23</a:t>
+              <a:t>8/4/23</a:t>
             </a:fld>
             <a:endParaRPr lang="en-US"/>
           </a:p>
@@ -3331,10 +4133,10 @@
       </p:grpSpPr>
       <p:sp useBgFill="1">
         <p:nvSpPr>
-          <p:cNvPr id="10" name="Rectangle 9">
-            <a:extLst>
-              <a:ext uri="{FF2B5EF4-FFF2-40B4-BE49-F238E27FC236}">
-                <a16:creationId xmlns:a16="http://schemas.microsoft.com/office/drawing/2014/main" id="{A8384FB5-9ADC-4DDC-881B-597D56F5B15D}"/>
+          <p:cNvPr id="33" name="Rectangle 22">
+            <a:extLst>
+              <a:ext uri="{FF2B5EF4-FFF2-40B4-BE49-F238E27FC236}">
+                <a16:creationId xmlns:a16="http://schemas.microsoft.com/office/drawing/2014/main" id="{665DBBEF-238B-476B-96AB-8AAC3224ECEA}"/>
               </a:ext>
               <a:ext uri="{C183D7F6-B498-43B3-948B-1728B52AA6E4}">
                 <adec:decorative xmlns:adec="http://schemas.microsoft.com/office/drawing/2017/decorative" val="1"/>
@@ -3360,95 +4162,6 @@
           <a:prstGeom prst="rect">
             <a:avLst/>
           </a:prstGeom>
-          <a:ln w="12700" cap="flat" cmpd="sng" algn="ctr">
-            <a:noFill/>
-            <a:prstDash val="solid"/>
-            <a:miter lim="800000"/>
-          </a:ln>
-          <a:effectLst/>
-          <a:extLst>
-            <a:ext uri="{91240B29-F687-4F45-9708-019B960494DF}">
-              <a14:hiddenLine xmlns:a14="http://schemas.microsoft.com/office/drawing/2010/main" w="12700" cap="flat" cmpd="sng" algn="ctr">
-                <a:solidFill>
-                  <a:schemeClr val="accent1">
-                    <a:shade val="50000"/>
-                  </a:schemeClr>
-                </a:solidFill>
-                <a:prstDash val="solid"/>
-                <a:miter lim="800000"/>
-              </a14:hiddenLine>
-            </a:ext>
-          </a:extLst>
-        </p:spPr>
-        <p:style>
-          <a:lnRef idx="2">
-            <a:schemeClr val="accent1">
-              <a:shade val="50000"/>
-            </a:schemeClr>
-          </a:lnRef>
-          <a:fillRef idx="1">
-            <a:schemeClr val="accent1"/>
-          </a:fillRef>
-          <a:effectRef idx="0">
-            <a:schemeClr val="accent1"/>
-          </a:effectRef>
-          <a:fontRef idx="minor">
-            <a:schemeClr val="lt1"/>
-          </a:fontRef>
-        </p:style>
-        <p:txBody>
-          <a:bodyPr rtlCol="0" anchor="ctr"/>
-          <a:lstStyle/>
-          <a:p>
-            <a:pPr algn="ctr"/>
-            <a:endParaRPr lang="en-US"/>
-          </a:p>
-        </p:txBody>
-      </p:sp>
-      <p:sp>
-        <p:nvSpPr>
-          <p:cNvPr id="12" name="Rectangle 11">
-            <a:extLst>
-              <a:ext uri="{FF2B5EF4-FFF2-40B4-BE49-F238E27FC236}">
-                <a16:creationId xmlns:a16="http://schemas.microsoft.com/office/drawing/2014/main" id="{91E5A9A7-95C6-4F4F-B00E-C82E07FE62EF}"/>
-              </a:ext>
-              <a:ext uri="{C183D7F6-B498-43B3-948B-1728B52AA6E4}">
-                <adec:decorative xmlns:adec="http://schemas.microsoft.com/office/drawing/2017/decorative" val="1"/>
-              </a:ext>
-            </a:extLst>
-          </p:cNvPr>
-          <p:cNvSpPr>
-            <a:spLocks noGrp="1" noRot="1" noChangeAspect="1" noMove="1" noResize="1" noEditPoints="1" noAdjustHandles="1" noChangeArrowheads="1" noChangeShapeType="1" noTextEdit="1"/>
-          </p:cNvSpPr>
-          <p:nvPr>
-            <p:extLst>
-              <p:ext uri="{386F3935-93C4-4BCD-93E2-E3B085C9AB24}">
-                <p16:designElem xmlns:p16="http://schemas.microsoft.com/office/powerpoint/2015/main" val="1"/>
-              </p:ext>
-            </p:extLst>
-          </p:nvPr>
-        </p:nvSpPr>
-        <p:spPr>
-          <a:xfrm rot="5400000" flipH="1">
-            <a:off x="-1417539" y="1417538"/>
-            <a:ext cx="6875818" cy="4040744"/>
-          </a:xfrm>
-          <a:prstGeom prst="rect">
-            <a:avLst/>
-          </a:prstGeom>
-          <a:gradFill>
-            <a:gsLst>
-              <a:gs pos="0">
-                <a:srgbClr val="000000"/>
-              </a:gs>
-              <a:gs pos="100000">
-                <a:schemeClr val="accent1">
-                  <a:lumMod val="75000"/>
-                </a:schemeClr>
-              </a:gs>
-            </a:gsLst>
-            <a:lin ang="18600000" scaled="0"/>
-          </a:gradFill>
           <a:ln>
             <a:noFill/>
           </a:ln>
@@ -3474,16 +4187,182 @@
           <a:lstStyle/>
           <a:p>
             <a:pPr algn="ctr"/>
+            <a:endParaRPr lang="en-US"/>
+          </a:p>
+        </p:txBody>
+      </p:sp>
+      <p:sp>
+        <p:nvSpPr>
+          <p:cNvPr id="2" name="Title 1">
+            <a:extLst>
+              <a:ext uri="{FF2B5EF4-FFF2-40B4-BE49-F238E27FC236}">
+                <a16:creationId xmlns:a16="http://schemas.microsoft.com/office/drawing/2014/main" id="{3A842068-F03F-0B3B-E922-AC812E02E9DF}"/>
+              </a:ext>
+            </a:extLst>
+          </p:cNvPr>
+          <p:cNvSpPr>
+            <a:spLocks noGrp="1"/>
+          </p:cNvSpPr>
+          <p:nvPr>
+            <p:ph type="ctrTitle"/>
+          </p:nvPr>
+        </p:nvSpPr>
+        <p:spPr>
+          <a:xfrm>
+            <a:off x="638882" y="212653"/>
+            <a:ext cx="3571810" cy="3573516"/>
+          </a:xfrm>
+        </p:spPr>
+        <p:txBody>
+          <a:bodyPr>
+            <a:normAutofit/>
+          </a:bodyPr>
+          <a:lstStyle/>
+          <a:p>
+            <a:pPr algn="l" defTabSz="841248"/>
+            <a:r>
+              <a:rPr lang="en-US" sz="4600" kern="1200" dirty="0">
+                <a:latin typeface="+mn-lt"/>
+                <a:ea typeface="+mj-ea"/>
+                <a:cs typeface="+mj-cs"/>
+              </a:rPr>
+              <a:t>Data Science Salary Analysis: </a:t>
+            </a:r>
+            <a:br>
+              <a:rPr lang="en-US" sz="4600" kern="1200" dirty="0">
+                <a:latin typeface="+mn-lt"/>
+                <a:ea typeface="+mj-ea"/>
+                <a:cs typeface="+mj-cs"/>
+              </a:rPr>
+            </a:br>
+            <a:r>
+              <a:rPr lang="en-US" sz="4600" kern="1200" dirty="0">
+                <a:latin typeface="+mn-lt"/>
+                <a:ea typeface="+mj-ea"/>
+                <a:cs typeface="+mj-cs"/>
+              </a:rPr>
+              <a:t>Attracting Top Talent</a:t>
+            </a:r>
+            <a:endParaRPr lang="en-US" sz="4600" dirty="0">
+              <a:latin typeface="+mn-lt"/>
+            </a:endParaRPr>
+          </a:p>
+        </p:txBody>
+      </p:sp>
+      <p:sp>
+        <p:nvSpPr>
+          <p:cNvPr id="3" name="Subtitle 2">
+            <a:extLst>
+              <a:ext uri="{FF2B5EF4-FFF2-40B4-BE49-F238E27FC236}">
+                <a16:creationId xmlns:a16="http://schemas.microsoft.com/office/drawing/2014/main" id="{97E639D3-F98F-E914-8B97-233FB03F88A2}"/>
+              </a:ext>
+            </a:extLst>
+          </p:cNvPr>
+          <p:cNvSpPr>
+            <a:spLocks noGrp="1"/>
+          </p:cNvSpPr>
+          <p:nvPr>
+            <p:ph type="subTitle" idx="1"/>
+          </p:nvPr>
+        </p:nvSpPr>
+        <p:spPr>
+          <a:xfrm>
+            <a:off x="638882" y="3898900"/>
+            <a:ext cx="3571810" cy="2819400"/>
+          </a:xfrm>
+        </p:spPr>
+        <p:txBody>
+          <a:bodyPr>
+            <a:normAutofit/>
+          </a:bodyPr>
+          <a:lstStyle/>
+          <a:p>
+            <a:pPr algn="l" defTabSz="841248">
+              <a:spcBef>
+                <a:spcPts val="920"/>
+              </a:spcBef>
+            </a:pPr>
+            <a:r>
+              <a:rPr lang="en-US" kern="1200" dirty="0">
+                <a:latin typeface="+mn-lt"/>
+                <a:ea typeface="+mn-ea"/>
+                <a:cs typeface="+mn-cs"/>
+              </a:rPr>
+              <a:t>Adeline Casali, DSE5002</a:t>
+            </a:r>
+          </a:p>
+          <a:p>
+            <a:pPr algn="l" defTabSz="841248">
+              <a:spcBef>
+                <a:spcPts val="920"/>
+              </a:spcBef>
+            </a:pPr>
+            <a:endParaRPr lang="en-US" kern="1200" dirty="0">
+              <a:latin typeface="+mn-lt"/>
+              <a:ea typeface="+mn-ea"/>
+              <a:cs typeface="+mn-cs"/>
+            </a:endParaRPr>
+          </a:p>
+          <a:p>
+            <a:pPr algn="l" defTabSz="841248">
+              <a:spcBef>
+                <a:spcPts val="920"/>
+              </a:spcBef>
+            </a:pPr>
+            <a:r>
+              <a:rPr lang="en-US" dirty="0"/>
+              <a:t>Minimum: $5,679</a:t>
+            </a:r>
+          </a:p>
+          <a:p>
+            <a:pPr algn="l" defTabSz="841248">
+              <a:spcBef>
+                <a:spcPts val="920"/>
+              </a:spcBef>
+            </a:pPr>
+            <a:r>
+              <a:rPr lang="en-US" dirty="0"/>
+              <a:t>Median: $136,300</a:t>
+            </a:r>
+          </a:p>
+          <a:p>
+            <a:pPr algn="l" defTabSz="841248">
+              <a:spcBef>
+                <a:spcPts val="920"/>
+              </a:spcBef>
+            </a:pPr>
+            <a:r>
+              <a:rPr lang="en-US" dirty="0"/>
+              <a:t>Mean: $144,638</a:t>
+            </a:r>
+          </a:p>
+          <a:p>
+            <a:pPr algn="l" defTabSz="841248">
+              <a:spcBef>
+                <a:spcPts val="920"/>
+              </a:spcBef>
+            </a:pPr>
+            <a:r>
+              <a:rPr lang="en-US" dirty="0"/>
+              <a:t>Maximum: $600,000</a:t>
+            </a:r>
+          </a:p>
+          <a:p>
+            <a:pPr algn="l" defTabSz="841248">
+              <a:spcBef>
+                <a:spcPts val="920"/>
+              </a:spcBef>
+            </a:pPr>
             <a:endParaRPr lang="en-US" dirty="0"/>
           </a:p>
         </p:txBody>
       </p:sp>
       <p:sp>
         <p:nvSpPr>
-          <p:cNvPr id="14" name="Rectangle 13">
-            <a:extLst>
-              <a:ext uri="{FF2B5EF4-FFF2-40B4-BE49-F238E27FC236}">
-                <a16:creationId xmlns:a16="http://schemas.microsoft.com/office/drawing/2014/main" id="{D07DD2DE-F619-49DD-B5E7-03A290FF4ED1}"/>
+          <p:cNvPr id="34" name="sketch line">
+            <a:extLst>
+              <a:ext uri="{FF2B5EF4-FFF2-40B4-BE49-F238E27FC236}">
+                <a16:creationId xmlns:a16="http://schemas.microsoft.com/office/drawing/2014/main" id="{3FCFB1DE-0B7E-48CC-BA90-B2AB0889F9D6}"/>
               </a:ext>
               <a:ext uri="{C183D7F6-B498-43B3-948B-1728B52AA6E4}">
                 <adec:decorative xmlns:adec="http://schemas.microsoft.com/office/drawing/2017/decorative" val="1"/>
@@ -3502,182 +4381,37 @@
           </p:nvPr>
         </p:nvSpPr>
         <p:spPr>
-          <a:xfrm rot="16200000">
-            <a:off x="-158495" y="2660473"/>
-            <a:ext cx="4355594" cy="4038603"/>
-          </a:xfrm>
-          <a:prstGeom prst="rect">
-            <a:avLst/>
-          </a:prstGeom>
-          <a:gradFill>
-            <a:gsLst>
-              <a:gs pos="0">
-                <a:schemeClr val="accent1">
-                  <a:alpha val="50000"/>
-                </a:schemeClr>
-              </a:gs>
-              <a:gs pos="100000">
-                <a:schemeClr val="accent1">
-                  <a:lumMod val="50000"/>
-                  <a:alpha val="0"/>
-                </a:schemeClr>
-              </a:gs>
-            </a:gsLst>
-            <a:lin ang="11400000" scaled="0"/>
-          </a:gradFill>
-          <a:ln>
-            <a:noFill/>
-          </a:ln>
-        </p:spPr>
-        <p:style>
-          <a:lnRef idx="2">
-            <a:schemeClr val="accent1">
-              <a:shade val="50000"/>
-            </a:schemeClr>
-          </a:lnRef>
-          <a:fillRef idx="1">
-            <a:schemeClr val="accent1"/>
-          </a:fillRef>
-          <a:effectRef idx="0">
-            <a:schemeClr val="accent1"/>
-          </a:effectRef>
-          <a:fontRef idx="minor">
-            <a:schemeClr val="lt1"/>
-          </a:fontRef>
-        </p:style>
-        <p:txBody>
-          <a:bodyPr rtlCol="0" anchor="ctr"/>
-          <a:lstStyle/>
-          <a:p>
-            <a:pPr algn="ctr"/>
-            <a:endParaRPr lang="en-US"/>
-          </a:p>
-        </p:txBody>
-      </p:sp>
-      <p:sp>
-        <p:nvSpPr>
-          <p:cNvPr id="16" name="Rectangle 15">
-            <a:extLst>
-              <a:ext uri="{FF2B5EF4-FFF2-40B4-BE49-F238E27FC236}">
-                <a16:creationId xmlns:a16="http://schemas.microsoft.com/office/drawing/2014/main" id="{85149191-5F60-4A28-AAFF-039F96B0F3EC}"/>
-              </a:ext>
-              <a:ext uri="{C183D7F6-B498-43B3-948B-1728B52AA6E4}">
-                <adec:decorative xmlns:adec="http://schemas.microsoft.com/office/drawing/2017/decorative" val="1"/>
-              </a:ext>
-            </a:extLst>
-          </p:cNvPr>
-          <p:cNvSpPr>
-            <a:spLocks noGrp="1" noRot="1" noChangeAspect="1" noMove="1" noResize="1" noEditPoints="1" noAdjustHandles="1" noChangeArrowheads="1" noChangeShapeType="1" noTextEdit="1"/>
-          </p:cNvSpPr>
-          <p:nvPr>
-            <p:extLst>
-              <p:ext uri="{386F3935-93C4-4BCD-93E2-E3B085C9AB24}">
-                <p16:designElem xmlns:p16="http://schemas.microsoft.com/office/powerpoint/2015/main" val="1"/>
-              </p:ext>
-            </p:extLst>
-          </p:nvPr>
-        </p:nvSpPr>
-        <p:spPr>
-          <a:xfrm rot="16200000" flipH="1">
-            <a:off x="-1180882" y="1638085"/>
-            <a:ext cx="6857572" cy="3581401"/>
-          </a:xfrm>
-          <a:prstGeom prst="rect">
-            <a:avLst/>
-          </a:prstGeom>
-          <a:gradFill>
-            <a:gsLst>
-              <a:gs pos="0">
-                <a:srgbClr val="000000">
-                  <a:alpha val="59000"/>
-                </a:srgbClr>
-              </a:gs>
-              <a:gs pos="69000">
-                <a:schemeClr val="accent1">
-                  <a:alpha val="0"/>
-                </a:schemeClr>
-              </a:gs>
-            </a:gsLst>
-            <a:lin ang="13200000" scaled="0"/>
-          </a:gradFill>
-          <a:ln>
-            <a:noFill/>
-          </a:ln>
-        </p:spPr>
-        <p:style>
-          <a:lnRef idx="2">
-            <a:schemeClr val="accent1">
-              <a:shade val="50000"/>
-            </a:schemeClr>
-          </a:lnRef>
-          <a:fillRef idx="1">
-            <a:schemeClr val="accent1"/>
-          </a:fillRef>
-          <a:effectRef idx="0">
-            <a:schemeClr val="accent1"/>
-          </a:effectRef>
-          <a:fontRef idx="minor">
-            <a:schemeClr val="lt1"/>
-          </a:fontRef>
-        </p:style>
-        <p:txBody>
-          <a:bodyPr rtlCol="0" anchor="ctr"/>
-          <a:lstStyle/>
-          <a:p>
-            <a:pPr algn="ctr"/>
-            <a:endParaRPr lang="en-US" dirty="0"/>
-          </a:p>
-        </p:txBody>
-      </p:sp>
-      <p:sp>
-        <p:nvSpPr>
-          <p:cNvPr id="18" name="Freeform: Shape 17">
-            <a:extLst>
-              <a:ext uri="{FF2B5EF4-FFF2-40B4-BE49-F238E27FC236}">
-                <a16:creationId xmlns:a16="http://schemas.microsoft.com/office/drawing/2014/main" id="{F8260ED5-17F7-4158-B241-D51DD4CF1B7E}"/>
-              </a:ext>
-              <a:ext uri="{C183D7F6-B498-43B3-948B-1728B52AA6E4}">
-                <adec:decorative xmlns:adec="http://schemas.microsoft.com/office/drawing/2017/decorative" val="1"/>
-              </a:ext>
-            </a:extLst>
-          </p:cNvPr>
-          <p:cNvSpPr>
-            <a:spLocks noGrp="1" noRot="1" noChangeAspect="1" noMove="1" noResize="1" noEditPoints="1" noAdjustHandles="1" noChangeArrowheads="1" noChangeShapeType="1" noTextEdit="1"/>
-          </p:cNvSpPr>
-          <p:nvPr>
-            <p:extLst>
-              <p:ext uri="{386F3935-93C4-4BCD-93E2-E3B085C9AB24}">
-                <p16:designElem xmlns:p16="http://schemas.microsoft.com/office/powerpoint/2015/main" val="1"/>
-              </p:ext>
-            </p:extLst>
-          </p:nvPr>
-        </p:nvSpPr>
-        <p:spPr>
-          <a:xfrm rot="6097846">
-            <a:off x="-747355" y="1201312"/>
-            <a:ext cx="4808302" cy="4088666"/>
+          <a:xfrm>
+            <a:off x="643278" y="4409267"/>
+            <a:ext cx="3255095" cy="18288"/>
           </a:xfrm>
           <a:custGeom>
             <a:avLst/>
             <a:gdLst>
-              <a:gd name="connsiteX0" fmla="*/ 48844 w 4808302"/>
-              <a:gd name="connsiteY0" fmla="*/ 2888671 h 4088666"/>
-              <a:gd name="connsiteX1" fmla="*/ 0 w 4808302"/>
-              <a:gd name="connsiteY1" fmla="*/ 2404151 h 4088666"/>
-              <a:gd name="connsiteX2" fmla="*/ 2404151 w 4808302"/>
-              <a:gd name="connsiteY2" fmla="*/ 0 h 4088666"/>
-              <a:gd name="connsiteX3" fmla="*/ 4808302 w 4808302"/>
-              <a:gd name="connsiteY3" fmla="*/ 2404151 h 4088666"/>
-              <a:gd name="connsiteX4" fmla="*/ 4700216 w 4808302"/>
-              <a:gd name="connsiteY4" fmla="*/ 3119072 h 4088666"/>
-              <a:gd name="connsiteX5" fmla="*/ 4643143 w 4808302"/>
-              <a:gd name="connsiteY5" fmla="*/ 3275009 h 4088666"/>
-              <a:gd name="connsiteX6" fmla="*/ 690093 w 4808302"/>
-              <a:gd name="connsiteY6" fmla="*/ 4088666 h 4088666"/>
-              <a:gd name="connsiteX7" fmla="*/ 548991 w 4808302"/>
-              <a:gd name="connsiteY7" fmla="*/ 3933414 h 4088666"/>
-              <a:gd name="connsiteX8" fmla="*/ 48844 w 4808302"/>
-              <a:gd name="connsiteY8" fmla="*/ 2888671 h 4088666"/>
+              <a:gd name="connsiteX0" fmla="*/ 0 w 3255095"/>
+              <a:gd name="connsiteY0" fmla="*/ 0 h 18288"/>
+              <a:gd name="connsiteX1" fmla="*/ 618468 w 3255095"/>
+              <a:gd name="connsiteY1" fmla="*/ 0 h 18288"/>
+              <a:gd name="connsiteX2" fmla="*/ 1269487 w 3255095"/>
+              <a:gd name="connsiteY2" fmla="*/ 0 h 18288"/>
+              <a:gd name="connsiteX3" fmla="*/ 1953057 w 3255095"/>
+              <a:gd name="connsiteY3" fmla="*/ 0 h 18288"/>
+              <a:gd name="connsiteX4" fmla="*/ 2636627 w 3255095"/>
+              <a:gd name="connsiteY4" fmla="*/ 0 h 18288"/>
+              <a:gd name="connsiteX5" fmla="*/ 3255095 w 3255095"/>
+              <a:gd name="connsiteY5" fmla="*/ 0 h 18288"/>
+              <a:gd name="connsiteX6" fmla="*/ 3255095 w 3255095"/>
+              <a:gd name="connsiteY6" fmla="*/ 18288 h 18288"/>
+              <a:gd name="connsiteX7" fmla="*/ 2538974 w 3255095"/>
+              <a:gd name="connsiteY7" fmla="*/ 18288 h 18288"/>
+              <a:gd name="connsiteX8" fmla="*/ 1822853 w 3255095"/>
+              <a:gd name="connsiteY8" fmla="*/ 18288 h 18288"/>
+              <a:gd name="connsiteX9" fmla="*/ 1171834 w 3255095"/>
+              <a:gd name="connsiteY9" fmla="*/ 18288 h 18288"/>
+              <a:gd name="connsiteX10" fmla="*/ 0 w 3255095"/>
+              <a:gd name="connsiteY10" fmla="*/ 18288 h 18288"/>
+              <a:gd name="connsiteX11" fmla="*/ 0 w 3255095"/>
+              <a:gd name="connsiteY11" fmla="*/ 0 h 18288"/>
             </a:gdLst>
             <a:ahLst/>
             <a:cxnLst>
@@ -3708,69 +4442,998 @@
               <a:cxn ang="0">
                 <a:pos x="connsiteX8" y="connsiteY8"/>
               </a:cxn>
+              <a:cxn ang="0">
+                <a:pos x="connsiteX9" y="connsiteY9"/>
+              </a:cxn>
+              <a:cxn ang="0">
+                <a:pos x="connsiteX10" y="connsiteY10"/>
+              </a:cxn>
+              <a:cxn ang="0">
+                <a:pos x="connsiteX11" y="connsiteY11"/>
+              </a:cxn>
             </a:cxnLst>
             <a:rect l="l" t="t" r="r" b="b"/>
             <a:pathLst>
-              <a:path w="4808302" h="4088666">
+              <a:path w="3255095" h="18288" fill="none" extrusionOk="0">
                 <a:moveTo>
-                  <a:pt x="48844" y="2888671"/>
+                  <a:pt x="0" y="0"/>
                 </a:moveTo>
                 <a:cubicBezTo>
-                  <a:pt x="16818" y="2732167"/>
-                  <a:pt x="0" y="2570123"/>
-                  <a:pt x="0" y="2404151"/>
+                  <a:pt x="240201" y="-22123"/>
+                  <a:pt x="462021" y="-19623"/>
+                  <a:pt x="618468" y="0"/>
                 </a:cubicBezTo>
                 <a:cubicBezTo>
-                  <a:pt x="0" y="1076375"/>
-                  <a:pt x="1076375" y="0"/>
-                  <a:pt x="2404151" y="0"/>
+                  <a:pt x="774915" y="19623"/>
+                  <a:pt x="974734" y="2035"/>
+                  <a:pt x="1269487" y="0"/>
                 </a:cubicBezTo>
                 <a:cubicBezTo>
-                  <a:pt x="3731927" y="0"/>
-                  <a:pt x="4808302" y="1076375"/>
-                  <a:pt x="4808302" y="2404151"/>
+                  <a:pt x="1564240" y="-2035"/>
+                  <a:pt x="1733579" y="10639"/>
+                  <a:pt x="1953057" y="0"/>
                 </a:cubicBezTo>
                 <a:cubicBezTo>
-                  <a:pt x="4808302" y="2653109"/>
-                  <a:pt x="4770461" y="2893229"/>
-                  <a:pt x="4700216" y="3119072"/>
+                  <a:pt x="2172535" y="-10639"/>
+                  <a:pt x="2453962" y="14018"/>
+                  <a:pt x="2636627" y="0"/>
                 </a:cubicBezTo>
-                <a:lnTo>
-                  <a:pt x="4643143" y="3275009"/>
-                </a:lnTo>
-                <a:lnTo>
-                  <a:pt x="690093" y="4088666"/>
-                </a:lnTo>
-                <a:lnTo>
-                  <a:pt x="548991" y="3933414"/>
-                </a:lnTo>
                 <a:cubicBezTo>
-                  <a:pt x="304015" y="3636572"/>
-                  <a:pt x="128908" y="3279932"/>
-                  <a:pt x="48844" y="2888671"/>
+                  <a:pt x="2819292" y="-14018"/>
+                  <a:pt x="3121375" y="5399"/>
+                  <a:pt x="3255095" y="0"/>
+                </a:cubicBezTo>
+                <a:cubicBezTo>
+                  <a:pt x="3254386" y="8157"/>
+                  <a:pt x="3254682" y="12125"/>
+                  <a:pt x="3255095" y="18288"/>
+                </a:cubicBezTo>
+                <a:cubicBezTo>
+                  <a:pt x="3088545" y="23203"/>
+                  <a:pt x="2687475" y="7419"/>
+                  <a:pt x="2538974" y="18288"/>
+                </a:cubicBezTo>
+                <a:cubicBezTo>
+                  <a:pt x="2390473" y="29157"/>
+                  <a:pt x="2137381" y="-8959"/>
+                  <a:pt x="1822853" y="18288"/>
+                </a:cubicBezTo>
+                <a:cubicBezTo>
+                  <a:pt x="1508325" y="45535"/>
+                  <a:pt x="1466437" y="20385"/>
+                  <a:pt x="1171834" y="18288"/>
+                </a:cubicBezTo>
+                <a:cubicBezTo>
+                  <a:pt x="877231" y="16191"/>
+                  <a:pt x="561097" y="37643"/>
+                  <a:pt x="0" y="18288"/>
+                </a:cubicBezTo>
+                <a:cubicBezTo>
+                  <a:pt x="-46" y="12483"/>
+                  <a:pt x="-203" y="6491"/>
+                  <a:pt x="0" y="0"/>
+                </a:cubicBezTo>
+                <a:close/>
+              </a:path>
+              <a:path w="3255095" h="18288" stroke="0" extrusionOk="0">
+                <a:moveTo>
+                  <a:pt x="0" y="0"/>
+                </a:moveTo>
+                <a:cubicBezTo>
+                  <a:pt x="291965" y="19429"/>
+                  <a:pt x="363155" y="8568"/>
+                  <a:pt x="618468" y="0"/>
+                </a:cubicBezTo>
+                <a:cubicBezTo>
+                  <a:pt x="873781" y="-8568"/>
+                  <a:pt x="904459" y="-19505"/>
+                  <a:pt x="1171834" y="0"/>
+                </a:cubicBezTo>
+                <a:cubicBezTo>
+                  <a:pt x="1439209" y="19505"/>
+                  <a:pt x="1744369" y="9790"/>
+                  <a:pt x="1887955" y="0"/>
+                </a:cubicBezTo>
+                <a:cubicBezTo>
+                  <a:pt x="2031541" y="-9790"/>
+                  <a:pt x="2346378" y="21240"/>
+                  <a:pt x="2506423" y="0"/>
+                </a:cubicBezTo>
+                <a:cubicBezTo>
+                  <a:pt x="2666468" y="-21240"/>
+                  <a:pt x="2990257" y="30414"/>
+                  <a:pt x="3255095" y="0"/>
+                </a:cubicBezTo>
+                <a:cubicBezTo>
+                  <a:pt x="3254831" y="4493"/>
+                  <a:pt x="3255479" y="9472"/>
+                  <a:pt x="3255095" y="18288"/>
+                </a:cubicBezTo>
+                <a:cubicBezTo>
+                  <a:pt x="3120743" y="16690"/>
+                  <a:pt x="2759628" y="42462"/>
+                  <a:pt x="2604076" y="18288"/>
+                </a:cubicBezTo>
+                <a:cubicBezTo>
+                  <a:pt x="2448524" y="-5886"/>
+                  <a:pt x="2184336" y="19599"/>
+                  <a:pt x="1887955" y="18288"/>
+                </a:cubicBezTo>
+                <a:cubicBezTo>
+                  <a:pt x="1591574" y="16977"/>
+                  <a:pt x="1548845" y="6870"/>
+                  <a:pt x="1334589" y="18288"/>
+                </a:cubicBezTo>
+                <a:cubicBezTo>
+                  <a:pt x="1120333" y="29706"/>
+                  <a:pt x="996014" y="9662"/>
+                  <a:pt x="683570" y="18288"/>
+                </a:cubicBezTo>
+                <a:cubicBezTo>
+                  <a:pt x="371126" y="26914"/>
+                  <a:pt x="198687" y="16167"/>
+                  <a:pt x="0" y="18288"/>
+                </a:cubicBezTo>
+                <a:cubicBezTo>
+                  <a:pt x="843" y="9577"/>
+                  <a:pt x="371" y="6900"/>
+                  <a:pt x="0" y="0"/>
                 </a:cubicBezTo>
                 <a:close/>
               </a:path>
             </a:pathLst>
           </a:custGeom>
-          <a:gradFill>
-            <a:gsLst>
-              <a:gs pos="39000">
-                <a:schemeClr val="accent1">
-                  <a:lumMod val="60000"/>
-                  <a:lumOff val="40000"/>
-                  <a:alpha val="0"/>
-                </a:schemeClr>
-              </a:gs>
-              <a:gs pos="100000">
-                <a:schemeClr val="accent1">
-                  <a:lumMod val="75000"/>
-                  <a:alpha val="26000"/>
-                </a:schemeClr>
-              </a:gs>
-            </a:gsLst>
-            <a:lin ang="18600000" scaled="0"/>
-          </a:gradFill>
+          <a:solidFill>
+            <a:schemeClr val="accent2"/>
+          </a:solidFill>
+          <a:ln w="38100" cap="rnd">
+            <a:solidFill>
+              <a:schemeClr val="accent2"/>
+            </a:solidFill>
+            <a:round/>
+            <a:extLst>
+              <a:ext uri="{C807C97D-BFC1-408E-A445-0C87EB9F89A2}">
+                <ask:lineSketchStyleProps xmlns:ask="http://schemas.microsoft.com/office/drawing/2018/sketchyshapes" sd="1219033472">
+                  <a:prstGeom prst="rect">
+                    <a:avLst/>
+                  </a:prstGeom>
+                  <ask:type>
+                    <ask:lineSketchFreehand/>
+                  </ask:type>
+                </ask:lineSketchStyleProps>
+              </a:ext>
+            </a:extLst>
+          </a:ln>
+        </p:spPr>
+        <p:style>
+          <a:lnRef idx="2">
+            <a:schemeClr val="accent1">
+              <a:shade val="50000"/>
+            </a:schemeClr>
+          </a:lnRef>
+          <a:fillRef idx="1">
+            <a:schemeClr val="accent1"/>
+          </a:fillRef>
+          <a:effectRef idx="0">
+            <a:schemeClr val="accent1"/>
+          </a:effectRef>
+          <a:fontRef idx="minor">
+            <a:schemeClr val="lt1"/>
+          </a:fontRef>
+        </p:style>
+        <p:txBody>
+          <a:bodyPr rtlCol="0" anchor="ctr"/>
+          <a:lstStyle/>
+          <a:p>
+            <a:pPr algn="ctr"/>
+            <a:endParaRPr lang="en-US"/>
+          </a:p>
+        </p:txBody>
+      </p:sp>
+      <p:pic>
+        <p:nvPicPr>
+          <p:cNvPr id="13" name="Picture 12" descr="A graph of salary and salary&#10;&#10;Description automatically generated">
+            <a:extLst>
+              <a:ext uri="{FF2B5EF4-FFF2-40B4-BE49-F238E27FC236}">
+                <a16:creationId xmlns:a16="http://schemas.microsoft.com/office/drawing/2014/main" id="{DC20703D-094F-3D49-6350-C1315A30011F}"/>
+              </a:ext>
+            </a:extLst>
+          </p:cNvPr>
+          <p:cNvPicPr>
+            <a:picLocks noChangeAspect="1"/>
+          </p:cNvPicPr>
+          <p:nvPr/>
+        </p:nvPicPr>
+        <p:blipFill>
+          <a:blip r:embed="rId3"/>
+          <a:stretch>
+            <a:fillRect/>
+          </a:stretch>
+        </p:blipFill>
+        <p:spPr>
+          <a:xfrm>
+            <a:off x="4356100" y="718821"/>
+            <a:ext cx="7512812" cy="5615826"/>
+          </a:xfrm>
+          <a:prstGeom prst="rect">
+            <a:avLst/>
+          </a:prstGeom>
+        </p:spPr>
+      </p:pic>
+    </p:spTree>
+    <p:extLst>
+      <p:ext uri="{BB962C8B-B14F-4D97-AF65-F5344CB8AC3E}">
+        <p14:creationId xmlns:p14="http://schemas.microsoft.com/office/powerpoint/2010/main" val="465740915"/>
+      </p:ext>
+    </p:extLst>
+  </p:cSld>
+  <p:clrMapOvr>
+    <a:masterClrMapping/>
+  </p:clrMapOvr>
+</p:sld>
+</file>
+
+<file path=ppt/slides/slide2.xml><?xml version="1.0" encoding="utf-8"?>
+<p:sld xmlns:a="http://schemas.openxmlformats.org/drawingml/2006/main" xmlns:r="http://schemas.openxmlformats.org/officeDocument/2006/relationships" xmlns:p="http://schemas.openxmlformats.org/presentationml/2006/main">
+  <p:cSld>
+    <p:bg>
+      <p:bgPr>
+        <a:solidFill>
+          <a:schemeClr val="bg1"/>
+        </a:solidFill>
+        <a:effectLst/>
+      </p:bgPr>
+    </p:bg>
+    <p:spTree>
+      <p:nvGrpSpPr>
+        <p:cNvPr id="1" name=""/>
+        <p:cNvGrpSpPr/>
+        <p:nvPr/>
+      </p:nvGrpSpPr>
+      <p:grpSpPr>
+        <a:xfrm>
+          <a:off x="0" y="0"/>
+          <a:ext cx="0" cy="0"/>
+          <a:chOff x="0" y="0"/>
+          <a:chExt cx="0" cy="0"/>
+        </a:xfrm>
+      </p:grpSpPr>
+      <p:sp>
+        <p:nvSpPr>
+          <p:cNvPr id="2" name="Title 1">
+            <a:extLst>
+              <a:ext uri="{FF2B5EF4-FFF2-40B4-BE49-F238E27FC236}">
+                <a16:creationId xmlns:a16="http://schemas.microsoft.com/office/drawing/2014/main" id="{628EFD6F-FE3F-CF44-5C9D-E699E179BA90}"/>
+              </a:ext>
+            </a:extLst>
+          </p:cNvPr>
+          <p:cNvSpPr>
+            <a:spLocks noGrp="1"/>
+          </p:cNvSpPr>
+          <p:nvPr>
+            <p:ph type="title"/>
+          </p:nvPr>
+        </p:nvSpPr>
+        <p:spPr>
+          <a:xfrm>
+            <a:off x="841247" y="978619"/>
+            <a:ext cx="3410712" cy="1106424"/>
+          </a:xfrm>
+        </p:spPr>
+        <p:txBody>
+          <a:bodyPr vert="horz" lIns="91440" tIns="45720" rIns="91440" bIns="45720" rtlCol="0" anchor="ctr">
+            <a:normAutofit/>
+          </a:bodyPr>
+          <a:lstStyle/>
+          <a:p>
+            <a:r>
+              <a:rPr lang="en-US" sz="2800" kern="1200">
+                <a:solidFill>
+                  <a:schemeClr val="tx1"/>
+                </a:solidFill>
+                <a:latin typeface="+mj-lt"/>
+                <a:ea typeface="+mj-ea"/>
+                <a:cs typeface="+mj-cs"/>
+              </a:rPr>
+              <a:t>Data Science Salary Trends Over Time</a:t>
+            </a:r>
+          </a:p>
+        </p:txBody>
+      </p:sp>
+      <p:sp>
+        <p:nvSpPr>
+          <p:cNvPr id="6" name="TextBox 5">
+            <a:extLst>
+              <a:ext uri="{FF2B5EF4-FFF2-40B4-BE49-F238E27FC236}">
+                <a16:creationId xmlns:a16="http://schemas.microsoft.com/office/drawing/2014/main" id="{D94F1670-E3A8-392B-84D4-E17424C5BB62}"/>
+              </a:ext>
+            </a:extLst>
+          </p:cNvPr>
+          <p:cNvSpPr txBox="1"/>
+          <p:nvPr/>
+        </p:nvSpPr>
+        <p:spPr>
+          <a:xfrm>
+            <a:off x="841248" y="2252870"/>
+            <a:ext cx="3412219" cy="3560251"/>
+          </a:xfrm>
+          <a:prstGeom prst="rect">
+            <a:avLst/>
+          </a:prstGeom>
+        </p:spPr>
+        <p:txBody>
+          <a:bodyPr vert="horz" lIns="91440" tIns="45720" rIns="91440" bIns="45720" rtlCol="0">
+            <a:normAutofit/>
+          </a:bodyPr>
+          <a:lstStyle/>
+          <a:p>
+            <a:pPr indent="-228600">
+              <a:lnSpc>
+                <a:spcPct val="90000"/>
+              </a:lnSpc>
+              <a:spcAft>
+                <a:spcPts val="600"/>
+              </a:spcAft>
+              <a:buFont typeface="Arial" panose="020B0604020202020204" pitchFamily="34" charset="0"/>
+              <a:buChar char="•"/>
+            </a:pPr>
+            <a:r>
+              <a:rPr lang="en-US" sz="1700" dirty="0"/>
+              <a:t>Data science salaries have been growing: </a:t>
+            </a:r>
+          </a:p>
+          <a:p>
+            <a:pPr indent="-228600">
+              <a:lnSpc>
+                <a:spcPct val="90000"/>
+              </a:lnSpc>
+              <a:spcAft>
+                <a:spcPts val="600"/>
+              </a:spcAft>
+              <a:buFont typeface="Arial" panose="020B0604020202020204" pitchFamily="34" charset="0"/>
+              <a:buChar char="•"/>
+            </a:pPr>
+            <a:endParaRPr lang="en-US" sz="1700" dirty="0"/>
+          </a:p>
+          <a:p>
+            <a:pPr indent="-228600">
+              <a:lnSpc>
+                <a:spcPct val="90000"/>
+              </a:lnSpc>
+              <a:spcAft>
+                <a:spcPts val="600"/>
+              </a:spcAft>
+              <a:buFont typeface="Arial" panose="020B0604020202020204" pitchFamily="34" charset="0"/>
+              <a:buChar char="•"/>
+            </a:pPr>
+            <a:endParaRPr lang="en-US" sz="1700" dirty="0"/>
+          </a:p>
+          <a:p>
+            <a:pPr indent="-228600">
+              <a:lnSpc>
+                <a:spcPct val="90000"/>
+              </a:lnSpc>
+              <a:spcAft>
+                <a:spcPts val="600"/>
+              </a:spcAft>
+              <a:buFont typeface="Arial" panose="020B0604020202020204" pitchFamily="34" charset="0"/>
+              <a:buChar char="•"/>
+            </a:pPr>
+            <a:endParaRPr lang="en-US" sz="1700" dirty="0"/>
+          </a:p>
+          <a:p>
+            <a:pPr indent="-228600">
+              <a:lnSpc>
+                <a:spcPct val="90000"/>
+              </a:lnSpc>
+              <a:spcAft>
+                <a:spcPts val="600"/>
+              </a:spcAft>
+              <a:buFont typeface="Arial" panose="020B0604020202020204" pitchFamily="34" charset="0"/>
+              <a:buChar char="•"/>
+            </a:pPr>
+            <a:endParaRPr lang="en-US" sz="1700" dirty="0"/>
+          </a:p>
+          <a:p>
+            <a:pPr indent="-228600">
+              <a:lnSpc>
+                <a:spcPct val="90000"/>
+              </a:lnSpc>
+              <a:spcAft>
+                <a:spcPts val="600"/>
+              </a:spcAft>
+              <a:buFont typeface="Arial" panose="020B0604020202020204" pitchFamily="34" charset="0"/>
+              <a:buChar char="•"/>
+            </a:pPr>
+            <a:endParaRPr lang="en-US" sz="1700" dirty="0"/>
+          </a:p>
+          <a:p>
+            <a:pPr indent="-228600">
+              <a:lnSpc>
+                <a:spcPct val="90000"/>
+              </a:lnSpc>
+              <a:spcAft>
+                <a:spcPts val="600"/>
+              </a:spcAft>
+              <a:buFont typeface="Arial" panose="020B0604020202020204" pitchFamily="34" charset="0"/>
+              <a:buChar char="•"/>
+            </a:pPr>
+            <a:endParaRPr lang="en-US" sz="1700" dirty="0"/>
+          </a:p>
+          <a:p>
+            <a:pPr indent="-228600">
+              <a:lnSpc>
+                <a:spcPct val="90000"/>
+              </a:lnSpc>
+              <a:spcAft>
+                <a:spcPts val="600"/>
+              </a:spcAft>
+              <a:buFont typeface="Arial" panose="020B0604020202020204" pitchFamily="34" charset="0"/>
+              <a:buChar char="•"/>
+            </a:pPr>
+            <a:r>
+              <a:rPr lang="en-US" sz="1700" dirty="0"/>
+              <a:t>Based on extrapolation from the linear model, the median salary for a data scientist in 2023 will be roughly $156,000 USD. </a:t>
+            </a:r>
+          </a:p>
+        </p:txBody>
+      </p:sp>
+      <p:graphicFrame>
+        <p:nvGraphicFramePr>
+          <p:cNvPr id="7" name="Table 7">
+            <a:extLst>
+              <a:ext uri="{FF2B5EF4-FFF2-40B4-BE49-F238E27FC236}">
+                <a16:creationId xmlns:a16="http://schemas.microsoft.com/office/drawing/2014/main" id="{1CB6CEC8-FA05-50D1-00B4-499BD434B9B1}"/>
+              </a:ext>
+            </a:extLst>
+          </p:cNvPr>
+          <p:cNvGraphicFramePr>
+            <a:graphicFrameLocks noGrp="1"/>
+          </p:cNvGraphicFramePr>
+          <p:nvPr>
+            <p:extLst>
+              <p:ext uri="{D42A27DB-BD31-4B8C-83A1-F6EECF244321}">
+                <p14:modId xmlns:p14="http://schemas.microsoft.com/office/powerpoint/2010/main" val="1094144227"/>
+              </p:ext>
+            </p:extLst>
+          </p:nvPr>
+        </p:nvGraphicFramePr>
+        <p:xfrm>
+          <a:off x="1435721" y="2912546"/>
+          <a:ext cx="2233754" cy="1583496"/>
+        </p:xfrm>
+        <a:graphic>
+          <a:graphicData uri="http://schemas.openxmlformats.org/drawingml/2006/table">
+            <a:tbl>
+              <a:tblPr firstRow="1" bandRow="1">
+                <a:tableStyleId>{073A0DAA-6AF3-43AB-8588-CEC1D06C72B9}</a:tableStyleId>
+              </a:tblPr>
+              <a:tblGrid>
+                <a:gridCol w="1116877">
+                  <a:extLst>
+                    <a:ext uri="{9D8B030D-6E8A-4147-A177-3AD203B41FA5}">
+                      <a16:colId xmlns:a16="http://schemas.microsoft.com/office/drawing/2014/main" val="4256427502"/>
+                    </a:ext>
+                  </a:extLst>
+                </a:gridCol>
+                <a:gridCol w="1116877">
+                  <a:extLst>
+                    <a:ext uri="{9D8B030D-6E8A-4147-A177-3AD203B41FA5}">
+                      <a16:colId xmlns:a16="http://schemas.microsoft.com/office/drawing/2014/main" val="3270047028"/>
+                    </a:ext>
+                  </a:extLst>
+                </a:gridCol>
+              </a:tblGrid>
+              <a:tr h="395874">
+                <a:tc>
+                  <a:txBody>
+                    <a:bodyPr/>
+                    <a:lstStyle/>
+                    <a:p>
+                      <a:r>
+                        <a:rPr lang="en-US" dirty="0"/>
+                        <a:t>Year</a:t>
+                      </a:r>
+                    </a:p>
+                  </a:txBody>
+                  <a:tcPr/>
+                </a:tc>
+                <a:tc>
+                  <a:txBody>
+                    <a:bodyPr/>
+                    <a:lstStyle/>
+                    <a:p>
+                      <a:r>
+                        <a:rPr lang="en-US" dirty="0"/>
+                        <a:t>Median </a:t>
+                      </a:r>
+                    </a:p>
+                  </a:txBody>
+                  <a:tcPr/>
+                </a:tc>
+                <a:extLst>
+                  <a:ext uri="{0D108BD9-81ED-4DB2-BD59-A6C34878D82A}">
+                    <a16:rowId xmlns:a16="http://schemas.microsoft.com/office/drawing/2014/main" val="2405256195"/>
+                  </a:ext>
+                </a:extLst>
+              </a:tr>
+              <a:tr h="395874">
+                <a:tc>
+                  <a:txBody>
+                    <a:bodyPr/>
+                    <a:lstStyle/>
+                    <a:p>
+                      <a:r>
+                        <a:rPr lang="en-US" dirty="0"/>
+                        <a:t>2020</a:t>
+                      </a:r>
+                    </a:p>
+                  </a:txBody>
+                  <a:tcPr/>
+                </a:tc>
+                <a:tc>
+                  <a:txBody>
+                    <a:bodyPr/>
+                    <a:lstStyle/>
+                    <a:p>
+                      <a:r>
+                        <a:rPr lang="en-US" dirty="0"/>
+                        <a:t>$114,000</a:t>
+                      </a:r>
+                    </a:p>
+                  </a:txBody>
+                  <a:tcPr/>
+                </a:tc>
+                <a:extLst>
+                  <a:ext uri="{0D108BD9-81ED-4DB2-BD59-A6C34878D82A}">
+                    <a16:rowId xmlns:a16="http://schemas.microsoft.com/office/drawing/2014/main" val="4169719082"/>
+                  </a:ext>
+                </a:extLst>
+              </a:tr>
+              <a:tr h="395874">
+                <a:tc>
+                  <a:txBody>
+                    <a:bodyPr/>
+                    <a:lstStyle/>
+                    <a:p>
+                      <a:r>
+                        <a:rPr lang="en-US" dirty="0"/>
+                        <a:t>2021</a:t>
+                      </a:r>
+                    </a:p>
+                  </a:txBody>
+                  <a:tcPr/>
+                </a:tc>
+                <a:tc>
+                  <a:txBody>
+                    <a:bodyPr/>
+                    <a:lstStyle/>
+                    <a:p>
+                      <a:r>
+                        <a:rPr lang="en-US" dirty="0"/>
+                        <a:t>$130,000</a:t>
+                      </a:r>
+                    </a:p>
+                  </a:txBody>
+                  <a:tcPr/>
+                </a:tc>
+                <a:extLst>
+                  <a:ext uri="{0D108BD9-81ED-4DB2-BD59-A6C34878D82A}">
+                    <a16:rowId xmlns:a16="http://schemas.microsoft.com/office/drawing/2014/main" val="874051458"/>
+                  </a:ext>
+                </a:extLst>
+              </a:tr>
+              <a:tr h="395874">
+                <a:tc>
+                  <a:txBody>
+                    <a:bodyPr/>
+                    <a:lstStyle/>
+                    <a:p>
+                      <a:r>
+                        <a:rPr lang="en-US" dirty="0"/>
+                        <a:t>2022</a:t>
+                      </a:r>
+                    </a:p>
+                  </a:txBody>
+                  <a:tcPr/>
+                </a:tc>
+                <a:tc>
+                  <a:txBody>
+                    <a:bodyPr/>
+                    <a:lstStyle/>
+                    <a:p>
+                      <a:r>
+                        <a:rPr lang="en-US" dirty="0"/>
+                        <a:t>$140,000</a:t>
+                      </a:r>
+                    </a:p>
+                  </a:txBody>
+                  <a:tcPr/>
+                </a:tc>
+                <a:extLst>
+                  <a:ext uri="{0D108BD9-81ED-4DB2-BD59-A6C34878D82A}">
+                    <a16:rowId xmlns:a16="http://schemas.microsoft.com/office/drawing/2014/main" val="3678881637"/>
+                  </a:ext>
+                </a:extLst>
+              </a:tr>
+            </a:tbl>
+          </a:graphicData>
+        </a:graphic>
+      </p:graphicFrame>
+      <p:pic>
+        <p:nvPicPr>
+          <p:cNvPr id="9" name="Picture 8" descr="A graph showing the rise of a number of companies&#10;&#10;Description automatically generated">
+            <a:extLst>
+              <a:ext uri="{FF2B5EF4-FFF2-40B4-BE49-F238E27FC236}">
+                <a16:creationId xmlns:a16="http://schemas.microsoft.com/office/drawing/2014/main" id="{8AAE862A-EEC5-6DA8-002E-8E4BC253A8FC}"/>
+              </a:ext>
+            </a:extLst>
+          </p:cNvPr>
+          <p:cNvPicPr>
+            <a:picLocks noChangeAspect="1"/>
+          </p:cNvPicPr>
+          <p:nvPr/>
+        </p:nvPicPr>
+        <p:blipFill>
+          <a:blip r:embed="rId3"/>
+          <a:stretch>
+            <a:fillRect/>
+          </a:stretch>
+        </p:blipFill>
+        <p:spPr>
+          <a:xfrm>
+            <a:off x="4800348" y="690183"/>
+            <a:ext cx="7182940" cy="5349532"/>
+          </a:xfrm>
+          <a:prstGeom prst="rect">
+            <a:avLst/>
+          </a:prstGeom>
+        </p:spPr>
+      </p:pic>
+      <p:cxnSp>
+        <p:nvCxnSpPr>
+          <p:cNvPr id="14" name="Straight Connector 13">
+            <a:extLst>
+              <a:ext uri="{FF2B5EF4-FFF2-40B4-BE49-F238E27FC236}">
+                <a16:creationId xmlns:a16="http://schemas.microsoft.com/office/drawing/2014/main" id="{5E3504D2-4014-611B-0F07-EBB7720EAB6B}"/>
+              </a:ext>
+            </a:extLst>
+          </p:cNvPr>
+          <p:cNvCxnSpPr>
+            <a:cxnSpLocks/>
+          </p:cNvCxnSpPr>
+          <p:nvPr/>
+        </p:nvCxnSpPr>
+        <p:spPr>
+          <a:xfrm>
+            <a:off x="4533900" y="501650"/>
+            <a:ext cx="0" cy="5854700"/>
+          </a:xfrm>
+          <a:prstGeom prst="line">
+            <a:avLst/>
+          </a:prstGeom>
+          <a:ln w="38100"/>
+        </p:spPr>
+        <p:style>
+          <a:lnRef idx="1">
+            <a:schemeClr val="accent2"/>
+          </a:lnRef>
+          <a:fillRef idx="0">
+            <a:schemeClr val="accent2"/>
+          </a:fillRef>
+          <a:effectRef idx="0">
+            <a:schemeClr val="accent2"/>
+          </a:effectRef>
+          <a:fontRef idx="minor">
+            <a:schemeClr val="tx1"/>
+          </a:fontRef>
+        </p:style>
+      </p:cxnSp>
+    </p:spTree>
+    <p:extLst>
+      <p:ext uri="{BB962C8B-B14F-4D97-AF65-F5344CB8AC3E}">
+        <p14:creationId xmlns:p14="http://schemas.microsoft.com/office/powerpoint/2010/main" val="441034007"/>
+      </p:ext>
+    </p:extLst>
+  </p:cSld>
+  <p:clrMapOvr>
+    <a:masterClrMapping/>
+  </p:clrMapOvr>
+</p:sld>
+</file>
+
+<file path=ppt/slides/slide3.xml><?xml version="1.0" encoding="utf-8"?>
+<p:sld xmlns:a="http://schemas.openxmlformats.org/drawingml/2006/main" xmlns:r="http://schemas.openxmlformats.org/officeDocument/2006/relationships" xmlns:p="http://schemas.openxmlformats.org/presentationml/2006/main">
+  <p:cSld>
+    <p:spTree>
+      <p:nvGrpSpPr>
+        <p:cNvPr id="1" name=""/>
+        <p:cNvGrpSpPr/>
+        <p:nvPr/>
+      </p:nvGrpSpPr>
+      <p:grpSpPr>
+        <a:xfrm>
+          <a:off x="0" y="0"/>
+          <a:ext cx="0" cy="0"/>
+          <a:chOff x="0" y="0"/>
+          <a:chExt cx="0" cy="0"/>
+        </a:xfrm>
+      </p:grpSpPr>
+      <p:sp>
+        <p:nvSpPr>
+          <p:cNvPr id="2" name="Title 1">
+            <a:extLst>
+              <a:ext uri="{FF2B5EF4-FFF2-40B4-BE49-F238E27FC236}">
+                <a16:creationId xmlns:a16="http://schemas.microsoft.com/office/drawing/2014/main" id="{7CA64095-729E-2980-4F95-B011FB5E2CE7}"/>
+              </a:ext>
+            </a:extLst>
+          </p:cNvPr>
+          <p:cNvSpPr>
+            <a:spLocks noGrp="1"/>
+          </p:cNvSpPr>
+          <p:nvPr>
+            <p:ph type="title"/>
+          </p:nvPr>
+        </p:nvSpPr>
+        <p:spPr>
+          <a:xfrm>
+            <a:off x="838200" y="0"/>
+            <a:ext cx="10515600" cy="1325563"/>
+          </a:xfrm>
+        </p:spPr>
+        <p:txBody>
+          <a:bodyPr/>
+          <a:lstStyle/>
+          <a:p>
+            <a:r>
+              <a:rPr lang="en-US" dirty="0"/>
+              <a:t>Factors Influencing Salaries</a:t>
+            </a:r>
+          </a:p>
+        </p:txBody>
+      </p:sp>
+      <p:pic>
+        <p:nvPicPr>
+          <p:cNvPr id="5" name="Picture 4" descr="A graph showing a number of employees&#10;&#10;Description automatically generated with medium confidence">
+            <a:extLst>
+              <a:ext uri="{FF2B5EF4-FFF2-40B4-BE49-F238E27FC236}">
+                <a16:creationId xmlns:a16="http://schemas.microsoft.com/office/drawing/2014/main" id="{EE85EE18-9EC4-8F0E-DA8C-3B4B2866EF9F}"/>
+              </a:ext>
+            </a:extLst>
+          </p:cNvPr>
+          <p:cNvPicPr>
+            <a:picLocks noChangeAspect="1"/>
+          </p:cNvPicPr>
+          <p:nvPr/>
+        </p:nvPicPr>
+        <p:blipFill>
+          <a:blip r:embed="rId3"/>
+          <a:stretch>
+            <a:fillRect/>
+          </a:stretch>
+        </p:blipFill>
+        <p:spPr>
+          <a:xfrm>
+            <a:off x="6159499" y="1187449"/>
+            <a:ext cx="5567667" cy="4146549"/>
+          </a:xfrm>
+          <a:prstGeom prst="rect">
+            <a:avLst/>
+          </a:prstGeom>
+        </p:spPr>
+      </p:pic>
+      <p:pic>
+        <p:nvPicPr>
+          <p:cNvPr id="7" name="Picture 6" descr="A graph of a remote work ratio&#10;&#10;Description automatically generated">
+            <a:extLst>
+              <a:ext uri="{FF2B5EF4-FFF2-40B4-BE49-F238E27FC236}">
+                <a16:creationId xmlns:a16="http://schemas.microsoft.com/office/drawing/2014/main" id="{DCDC3B4C-7172-EC2E-3AA7-7ECDCE175721}"/>
+              </a:ext>
+            </a:extLst>
+          </p:cNvPr>
+          <p:cNvPicPr>
+            <a:picLocks noChangeAspect="1"/>
+          </p:cNvPicPr>
+          <p:nvPr/>
+        </p:nvPicPr>
+        <p:blipFill>
+          <a:blip r:embed="rId4"/>
+          <a:stretch>
+            <a:fillRect/>
+          </a:stretch>
+        </p:blipFill>
+        <p:spPr>
+          <a:xfrm>
+            <a:off x="337833" y="1187450"/>
+            <a:ext cx="5567668" cy="4146550"/>
+          </a:xfrm>
+          <a:prstGeom prst="rect">
+            <a:avLst/>
+          </a:prstGeom>
+        </p:spPr>
+      </p:pic>
+      <p:sp>
+        <p:nvSpPr>
+          <p:cNvPr id="8" name="TextBox 7">
+            <a:extLst>
+              <a:ext uri="{FF2B5EF4-FFF2-40B4-BE49-F238E27FC236}">
+                <a16:creationId xmlns:a16="http://schemas.microsoft.com/office/drawing/2014/main" id="{FD94A07D-14CC-F3DD-25F2-53F99B7C22E9}"/>
+              </a:ext>
+            </a:extLst>
+          </p:cNvPr>
+          <p:cNvSpPr txBox="1"/>
+          <p:nvPr/>
+        </p:nvSpPr>
+        <p:spPr>
+          <a:xfrm>
+            <a:off x="584201" y="5550092"/>
+            <a:ext cx="5321300" cy="923330"/>
+          </a:xfrm>
+          <a:prstGeom prst="rect">
+            <a:avLst/>
+          </a:prstGeom>
+          <a:noFill/>
+        </p:spPr>
+        <p:txBody>
+          <a:bodyPr wrap="square" rtlCol="0">
+            <a:spAutoFit/>
+          </a:bodyPr>
+          <a:lstStyle/>
+          <a:p>
+            <a:r>
+              <a:rPr lang="en-US" dirty="0"/>
+              <a:t>P-value of 0.481 is greater than the significance level of 0.05, so remote work ratio is not going to be deciding factor for hiring and salary recommendations. </a:t>
+            </a:r>
+          </a:p>
+        </p:txBody>
+      </p:sp>
+      <p:sp>
+        <p:nvSpPr>
+          <p:cNvPr id="11" name="TextBox 10">
+            <a:extLst>
+              <a:ext uri="{FF2B5EF4-FFF2-40B4-BE49-F238E27FC236}">
+                <a16:creationId xmlns:a16="http://schemas.microsoft.com/office/drawing/2014/main" id="{C795E9BB-B639-3A11-EA27-3E4C2D6ECE77}"/>
+              </a:ext>
+            </a:extLst>
+          </p:cNvPr>
+          <p:cNvSpPr txBox="1"/>
+          <p:nvPr/>
+        </p:nvSpPr>
+        <p:spPr>
+          <a:xfrm>
+            <a:off x="6413499" y="5550092"/>
+            <a:ext cx="5194300" cy="923330"/>
+          </a:xfrm>
+          <a:prstGeom prst="rect">
+            <a:avLst/>
+          </a:prstGeom>
+          <a:noFill/>
+        </p:spPr>
+        <p:txBody>
+          <a:bodyPr wrap="square" rtlCol="0">
+            <a:spAutoFit/>
+          </a:bodyPr>
+          <a:lstStyle/>
+          <a:p>
+            <a:r>
+              <a:rPr lang="en-US"/>
+              <a:t>P-value is </a:t>
+            </a:r>
+            <a:r>
+              <a:rPr lang="en-US" dirty="0"/>
+              <a:t>less than significance level of 0.05, so there is a significant difference, and it is less expensive to hire offshore. </a:t>
+            </a:r>
+          </a:p>
+        </p:txBody>
+      </p:sp>
+      <p:cxnSp>
+        <p:nvCxnSpPr>
+          <p:cNvPr id="15" name="Straight Connector 14">
+            <a:extLst>
+              <a:ext uri="{FF2B5EF4-FFF2-40B4-BE49-F238E27FC236}">
+                <a16:creationId xmlns:a16="http://schemas.microsoft.com/office/drawing/2014/main" id="{00FDA3F1-9D16-A7B5-C84F-DBEDB5C2D705}"/>
+              </a:ext>
+            </a:extLst>
+          </p:cNvPr>
+          <p:cNvCxnSpPr>
+            <a:cxnSpLocks/>
+          </p:cNvCxnSpPr>
+          <p:nvPr/>
+        </p:nvCxnSpPr>
+        <p:spPr>
+          <a:xfrm>
+            <a:off x="584200" y="1054100"/>
+            <a:ext cx="6858000" cy="0"/>
+          </a:xfrm>
+          <a:prstGeom prst="line">
+            <a:avLst/>
+          </a:prstGeom>
+          <a:ln w="38100"/>
+        </p:spPr>
+        <p:style>
+          <a:lnRef idx="1">
+            <a:schemeClr val="accent2"/>
+          </a:lnRef>
+          <a:fillRef idx="0">
+            <a:schemeClr val="accent2"/>
+          </a:fillRef>
+          <a:effectRef idx="0">
+            <a:schemeClr val="accent2"/>
+          </a:effectRef>
+          <a:fontRef idx="minor">
+            <a:schemeClr val="tx1"/>
+          </a:fontRef>
+        </p:style>
+      </p:cxnSp>
+    </p:spTree>
+    <p:extLst>
+      <p:ext uri="{BB962C8B-B14F-4D97-AF65-F5344CB8AC3E}">
+        <p14:creationId xmlns:p14="http://schemas.microsoft.com/office/powerpoint/2010/main" val="1310168661"/>
+      </p:ext>
+    </p:extLst>
+  </p:cSld>
+  <p:clrMapOvr>
+    <a:masterClrMapping/>
+  </p:clrMapOvr>
+</p:sld>
+</file>
+
+<file path=ppt/slides/slide4.xml><?xml version="1.0" encoding="utf-8"?>
+<p:sld xmlns:a="http://schemas.openxmlformats.org/drawingml/2006/main" xmlns:r="http://schemas.openxmlformats.org/officeDocument/2006/relationships" xmlns:p="http://schemas.openxmlformats.org/presentationml/2006/main">
+  <p:cSld>
+    <p:bg>
+      <p:bgPr>
+        <a:solidFill>
+          <a:schemeClr val="bg1"/>
+        </a:solidFill>
+        <a:effectLst/>
+      </p:bgPr>
+    </p:bg>
+    <p:spTree>
+      <p:nvGrpSpPr>
+        <p:cNvPr id="1" name=""/>
+        <p:cNvGrpSpPr/>
+        <p:nvPr/>
+      </p:nvGrpSpPr>
+      <p:grpSpPr>
+        <a:xfrm>
+          <a:off x="0" y="0"/>
+          <a:ext cx="0" cy="0"/>
+          <a:chOff x="0" y="0"/>
+          <a:chExt cx="0" cy="0"/>
+        </a:xfrm>
+      </p:grpSpPr>
+      <p:sp useBgFill="1">
+        <p:nvSpPr>
+          <p:cNvPr id="12" name="Rectangle 11">
+            <a:extLst>
+              <a:ext uri="{FF2B5EF4-FFF2-40B4-BE49-F238E27FC236}">
+                <a16:creationId xmlns:a16="http://schemas.microsoft.com/office/drawing/2014/main" id="{2B97F24A-32CE-4C1C-A50D-3016B394DCFB}"/>
+              </a:ext>
+              <a:ext uri="{C183D7F6-B498-43B3-948B-1728B52AA6E4}">
+                <adec:decorative xmlns:adec="http://schemas.microsoft.com/office/drawing/2017/decorative" val="1"/>
+              </a:ext>
+            </a:extLst>
+          </p:cNvPr>
+          <p:cNvSpPr>
+            <a:spLocks noGrp="1" noRot="1" noChangeAspect="1" noMove="1" noResize="1" noEditPoints="1" noAdjustHandles="1" noChangeArrowheads="1" noChangeShapeType="1" noTextEdit="1"/>
+          </p:cNvSpPr>
+          <p:nvPr>
+            <p:extLst>
+              <p:ext uri="{386F3935-93C4-4BCD-93E2-E3B085C9AB24}">
+                <p16:designElem xmlns:p16="http://schemas.microsoft.com/office/powerpoint/2015/main" val="1"/>
+              </p:ext>
+            </p:extLst>
+          </p:nvPr>
+        </p:nvSpPr>
+        <p:spPr>
+          <a:xfrm>
+            <a:off x="0" y="0"/>
+            <a:ext cx="12192000" cy="6858000"/>
+          </a:xfrm>
+          <a:prstGeom prst="rect">
+            <a:avLst/>
+          </a:prstGeom>
           <a:ln>
             <a:noFill/>
           </a:ln>
@@ -3792,117 +5455,1110 @@
           </a:fontRef>
         </p:style>
         <p:txBody>
+          <a:bodyPr rtlCol="0" anchor="ctr"/>
+          <a:lstStyle/>
+          <a:p>
+            <a:pPr algn="ctr"/>
+            <a:endParaRPr lang="en-US"/>
+          </a:p>
+        </p:txBody>
+      </p:sp>
+      <p:sp>
+        <p:nvSpPr>
+          <p:cNvPr id="2" name="Title 1">
+            <a:extLst>
+              <a:ext uri="{FF2B5EF4-FFF2-40B4-BE49-F238E27FC236}">
+                <a16:creationId xmlns:a16="http://schemas.microsoft.com/office/drawing/2014/main" id="{34486E84-548B-CCAF-CB24-4BDEB59578CC}"/>
+              </a:ext>
+            </a:extLst>
+          </p:cNvPr>
+          <p:cNvSpPr>
+            <a:spLocks noGrp="1"/>
+          </p:cNvSpPr>
+          <p:nvPr>
+            <p:ph type="title"/>
+          </p:nvPr>
+        </p:nvSpPr>
+        <p:spPr>
+          <a:xfrm>
+            <a:off x="630936" y="639520"/>
+            <a:ext cx="3429000" cy="1719072"/>
+          </a:xfrm>
+        </p:spPr>
+        <p:txBody>
+          <a:bodyPr vert="horz" lIns="91440" tIns="45720" rIns="91440" bIns="45720" rtlCol="0" anchor="b">
+            <a:normAutofit/>
+          </a:bodyPr>
+          <a:lstStyle/>
+          <a:p>
+            <a:r>
+              <a:rPr lang="en-US" sz="3800" kern="1200">
+                <a:solidFill>
+                  <a:schemeClr val="tx1"/>
+                </a:solidFill>
+                <a:latin typeface="+mj-lt"/>
+                <a:ea typeface="+mj-ea"/>
+                <a:cs typeface="+mj-cs"/>
+              </a:rPr>
+              <a:t>Salary Differences by Experience Level</a:t>
+            </a:r>
+          </a:p>
+        </p:txBody>
+      </p:sp>
+      <p:sp>
+        <p:nvSpPr>
+          <p:cNvPr id="14" name="sketch line">
+            <a:extLst>
+              <a:ext uri="{FF2B5EF4-FFF2-40B4-BE49-F238E27FC236}">
+                <a16:creationId xmlns:a16="http://schemas.microsoft.com/office/drawing/2014/main" id="{CD8B4F24-440B-49E9-B85D-733523DC064B}"/>
+              </a:ext>
+              <a:ext uri="{C183D7F6-B498-43B3-948B-1728B52AA6E4}">
+                <adec:decorative xmlns:adec="http://schemas.microsoft.com/office/drawing/2017/decorative" val="1"/>
+              </a:ext>
+            </a:extLst>
+          </p:cNvPr>
+          <p:cNvSpPr>
+            <a:spLocks noGrp="1" noRot="1" noChangeAspect="1" noMove="1" noResize="1" noEditPoints="1" noAdjustHandles="1" noChangeArrowheads="1" noChangeShapeType="1" noTextEdit="1"/>
+          </p:cNvSpPr>
+          <p:nvPr>
+            <p:extLst>
+              <p:ext uri="{386F3935-93C4-4BCD-93E2-E3B085C9AB24}">
+                <p16:designElem xmlns:p16="http://schemas.microsoft.com/office/powerpoint/2015/main" val="1"/>
+              </p:ext>
+            </p:extLst>
+          </p:nvPr>
+        </p:nvSpPr>
+        <p:spPr>
+          <a:xfrm>
+            <a:off x="643278" y="2573756"/>
+            <a:ext cx="3255095" cy="18288"/>
+          </a:xfrm>
+          <a:custGeom>
+            <a:avLst/>
+            <a:gdLst>
+              <a:gd name="connsiteX0" fmla="*/ 0 w 3255095"/>
+              <a:gd name="connsiteY0" fmla="*/ 0 h 18288"/>
+              <a:gd name="connsiteX1" fmla="*/ 618468 w 3255095"/>
+              <a:gd name="connsiteY1" fmla="*/ 0 h 18288"/>
+              <a:gd name="connsiteX2" fmla="*/ 1269487 w 3255095"/>
+              <a:gd name="connsiteY2" fmla="*/ 0 h 18288"/>
+              <a:gd name="connsiteX3" fmla="*/ 1953057 w 3255095"/>
+              <a:gd name="connsiteY3" fmla="*/ 0 h 18288"/>
+              <a:gd name="connsiteX4" fmla="*/ 2636627 w 3255095"/>
+              <a:gd name="connsiteY4" fmla="*/ 0 h 18288"/>
+              <a:gd name="connsiteX5" fmla="*/ 3255095 w 3255095"/>
+              <a:gd name="connsiteY5" fmla="*/ 0 h 18288"/>
+              <a:gd name="connsiteX6" fmla="*/ 3255095 w 3255095"/>
+              <a:gd name="connsiteY6" fmla="*/ 18288 h 18288"/>
+              <a:gd name="connsiteX7" fmla="*/ 2538974 w 3255095"/>
+              <a:gd name="connsiteY7" fmla="*/ 18288 h 18288"/>
+              <a:gd name="connsiteX8" fmla="*/ 1822853 w 3255095"/>
+              <a:gd name="connsiteY8" fmla="*/ 18288 h 18288"/>
+              <a:gd name="connsiteX9" fmla="*/ 1171834 w 3255095"/>
+              <a:gd name="connsiteY9" fmla="*/ 18288 h 18288"/>
+              <a:gd name="connsiteX10" fmla="*/ 0 w 3255095"/>
+              <a:gd name="connsiteY10" fmla="*/ 18288 h 18288"/>
+              <a:gd name="connsiteX11" fmla="*/ 0 w 3255095"/>
+              <a:gd name="connsiteY11" fmla="*/ 0 h 18288"/>
+            </a:gdLst>
+            <a:ahLst/>
+            <a:cxnLst>
+              <a:cxn ang="0">
+                <a:pos x="connsiteX0" y="connsiteY0"/>
+              </a:cxn>
+              <a:cxn ang="0">
+                <a:pos x="connsiteX1" y="connsiteY1"/>
+              </a:cxn>
+              <a:cxn ang="0">
+                <a:pos x="connsiteX2" y="connsiteY2"/>
+              </a:cxn>
+              <a:cxn ang="0">
+                <a:pos x="connsiteX3" y="connsiteY3"/>
+              </a:cxn>
+              <a:cxn ang="0">
+                <a:pos x="connsiteX4" y="connsiteY4"/>
+              </a:cxn>
+              <a:cxn ang="0">
+                <a:pos x="connsiteX5" y="connsiteY5"/>
+              </a:cxn>
+              <a:cxn ang="0">
+                <a:pos x="connsiteX6" y="connsiteY6"/>
+              </a:cxn>
+              <a:cxn ang="0">
+                <a:pos x="connsiteX7" y="connsiteY7"/>
+              </a:cxn>
+              <a:cxn ang="0">
+                <a:pos x="connsiteX8" y="connsiteY8"/>
+              </a:cxn>
+              <a:cxn ang="0">
+                <a:pos x="connsiteX9" y="connsiteY9"/>
+              </a:cxn>
+              <a:cxn ang="0">
+                <a:pos x="connsiteX10" y="connsiteY10"/>
+              </a:cxn>
+              <a:cxn ang="0">
+                <a:pos x="connsiteX11" y="connsiteY11"/>
+              </a:cxn>
+            </a:cxnLst>
+            <a:rect l="l" t="t" r="r" b="b"/>
+            <a:pathLst>
+              <a:path w="3255095" h="18288" fill="none" extrusionOk="0">
+                <a:moveTo>
+                  <a:pt x="0" y="0"/>
+                </a:moveTo>
+                <a:cubicBezTo>
+                  <a:pt x="240201" y="-22123"/>
+                  <a:pt x="462021" y="-19623"/>
+                  <a:pt x="618468" y="0"/>
+                </a:cubicBezTo>
+                <a:cubicBezTo>
+                  <a:pt x="774915" y="19623"/>
+                  <a:pt x="974734" y="2035"/>
+                  <a:pt x="1269487" y="0"/>
+                </a:cubicBezTo>
+                <a:cubicBezTo>
+                  <a:pt x="1564240" y="-2035"/>
+                  <a:pt x="1733579" y="10639"/>
+                  <a:pt x="1953057" y="0"/>
+                </a:cubicBezTo>
+                <a:cubicBezTo>
+                  <a:pt x="2172535" y="-10639"/>
+                  <a:pt x="2453962" y="14018"/>
+                  <a:pt x="2636627" y="0"/>
+                </a:cubicBezTo>
+                <a:cubicBezTo>
+                  <a:pt x="2819292" y="-14018"/>
+                  <a:pt x="3121375" y="5399"/>
+                  <a:pt x="3255095" y="0"/>
+                </a:cubicBezTo>
+                <a:cubicBezTo>
+                  <a:pt x="3254386" y="8157"/>
+                  <a:pt x="3254682" y="12125"/>
+                  <a:pt x="3255095" y="18288"/>
+                </a:cubicBezTo>
+                <a:cubicBezTo>
+                  <a:pt x="3088545" y="23203"/>
+                  <a:pt x="2687475" y="7419"/>
+                  <a:pt x="2538974" y="18288"/>
+                </a:cubicBezTo>
+                <a:cubicBezTo>
+                  <a:pt x="2390473" y="29157"/>
+                  <a:pt x="2137381" y="-8959"/>
+                  <a:pt x="1822853" y="18288"/>
+                </a:cubicBezTo>
+                <a:cubicBezTo>
+                  <a:pt x="1508325" y="45535"/>
+                  <a:pt x="1466437" y="20385"/>
+                  <a:pt x="1171834" y="18288"/>
+                </a:cubicBezTo>
+                <a:cubicBezTo>
+                  <a:pt x="877231" y="16191"/>
+                  <a:pt x="561097" y="37643"/>
+                  <a:pt x="0" y="18288"/>
+                </a:cubicBezTo>
+                <a:cubicBezTo>
+                  <a:pt x="-46" y="12483"/>
+                  <a:pt x="-203" y="6491"/>
+                  <a:pt x="0" y="0"/>
+                </a:cubicBezTo>
+                <a:close/>
+              </a:path>
+              <a:path w="3255095" h="18288" stroke="0" extrusionOk="0">
+                <a:moveTo>
+                  <a:pt x="0" y="0"/>
+                </a:moveTo>
+                <a:cubicBezTo>
+                  <a:pt x="291965" y="19429"/>
+                  <a:pt x="363155" y="8568"/>
+                  <a:pt x="618468" y="0"/>
+                </a:cubicBezTo>
+                <a:cubicBezTo>
+                  <a:pt x="873781" y="-8568"/>
+                  <a:pt x="904459" y="-19505"/>
+                  <a:pt x="1171834" y="0"/>
+                </a:cubicBezTo>
+                <a:cubicBezTo>
+                  <a:pt x="1439209" y="19505"/>
+                  <a:pt x="1744369" y="9790"/>
+                  <a:pt x="1887955" y="0"/>
+                </a:cubicBezTo>
+                <a:cubicBezTo>
+                  <a:pt x="2031541" y="-9790"/>
+                  <a:pt x="2346378" y="21240"/>
+                  <a:pt x="2506423" y="0"/>
+                </a:cubicBezTo>
+                <a:cubicBezTo>
+                  <a:pt x="2666468" y="-21240"/>
+                  <a:pt x="2990257" y="30414"/>
+                  <a:pt x="3255095" y="0"/>
+                </a:cubicBezTo>
+                <a:cubicBezTo>
+                  <a:pt x="3254831" y="4493"/>
+                  <a:pt x="3255479" y="9472"/>
+                  <a:pt x="3255095" y="18288"/>
+                </a:cubicBezTo>
+                <a:cubicBezTo>
+                  <a:pt x="3120743" y="16690"/>
+                  <a:pt x="2759628" y="42462"/>
+                  <a:pt x="2604076" y="18288"/>
+                </a:cubicBezTo>
+                <a:cubicBezTo>
+                  <a:pt x="2448524" y="-5886"/>
+                  <a:pt x="2184336" y="19599"/>
+                  <a:pt x="1887955" y="18288"/>
+                </a:cubicBezTo>
+                <a:cubicBezTo>
+                  <a:pt x="1591574" y="16977"/>
+                  <a:pt x="1548845" y="6870"/>
+                  <a:pt x="1334589" y="18288"/>
+                </a:cubicBezTo>
+                <a:cubicBezTo>
+                  <a:pt x="1120333" y="29706"/>
+                  <a:pt x="996014" y="9662"/>
+                  <a:pt x="683570" y="18288"/>
+                </a:cubicBezTo>
+                <a:cubicBezTo>
+                  <a:pt x="371126" y="26914"/>
+                  <a:pt x="198687" y="16167"/>
+                  <a:pt x="0" y="18288"/>
+                </a:cubicBezTo>
+                <a:cubicBezTo>
+                  <a:pt x="843" y="9577"/>
+                  <a:pt x="371" y="6900"/>
+                  <a:pt x="0" y="0"/>
+                </a:cubicBezTo>
+                <a:close/>
+              </a:path>
+            </a:pathLst>
+          </a:custGeom>
+          <a:solidFill>
+            <a:schemeClr val="accent2"/>
+          </a:solidFill>
+          <a:ln w="38100" cap="rnd">
+            <a:solidFill>
+              <a:schemeClr val="accent2"/>
+            </a:solidFill>
+            <a:round/>
+            <a:extLst>
+              <a:ext uri="{C807C97D-BFC1-408E-A445-0C87EB9F89A2}">
+                <ask:lineSketchStyleProps xmlns:ask="http://schemas.microsoft.com/office/drawing/2018/sketchyshapes" sd="1219033472">
+                  <a:prstGeom prst="rect">
+                    <a:avLst/>
+                  </a:prstGeom>
+                  <ask:type>
+                    <ask:lineSketchFreehand/>
+                  </ask:type>
+                </ask:lineSketchStyleProps>
+              </a:ext>
+            </a:extLst>
+          </a:ln>
+        </p:spPr>
+        <p:style>
+          <a:lnRef idx="2">
+            <a:schemeClr val="accent1">
+              <a:shade val="50000"/>
+            </a:schemeClr>
+          </a:lnRef>
+          <a:fillRef idx="1">
+            <a:schemeClr val="accent1"/>
+          </a:fillRef>
+          <a:effectRef idx="0">
+            <a:schemeClr val="accent1"/>
+          </a:effectRef>
+          <a:fontRef idx="minor">
+            <a:schemeClr val="lt1"/>
+          </a:fontRef>
+        </p:style>
+        <p:txBody>
+          <a:bodyPr rtlCol="0" anchor="ctr"/>
+          <a:lstStyle/>
+          <a:p>
+            <a:pPr algn="ctr"/>
+            <a:endParaRPr lang="en-US"/>
+          </a:p>
+        </p:txBody>
+      </p:sp>
+      <p:sp>
+        <p:nvSpPr>
+          <p:cNvPr id="7" name="TextBox 6">
+            <a:extLst>
+              <a:ext uri="{FF2B5EF4-FFF2-40B4-BE49-F238E27FC236}">
+                <a16:creationId xmlns:a16="http://schemas.microsoft.com/office/drawing/2014/main" id="{FFFBA7DC-52DA-E2FF-9EA1-2920FE13566A}"/>
+              </a:ext>
+            </a:extLst>
+          </p:cNvPr>
+          <p:cNvSpPr txBox="1"/>
+          <p:nvPr/>
+        </p:nvSpPr>
+        <p:spPr>
+          <a:xfrm>
+            <a:off x="439547" y="3635476"/>
+            <a:ext cx="4127500" cy="1945640"/>
+          </a:xfrm>
+          <a:prstGeom prst="rect">
+            <a:avLst/>
+          </a:prstGeom>
+        </p:spPr>
+        <p:txBody>
+          <a:bodyPr vert="horz" lIns="91440" tIns="45720" rIns="91440" bIns="45720" rtlCol="0" anchor="t">
+            <a:normAutofit/>
+          </a:bodyPr>
+          <a:lstStyle/>
+          <a:p>
+            <a:pPr>
+              <a:lnSpc>
+                <a:spcPct val="90000"/>
+              </a:lnSpc>
+              <a:spcAft>
+                <a:spcPts val="600"/>
+              </a:spcAft>
+            </a:pPr>
+            <a:r>
+              <a:rPr lang="en-US" sz="2000" b="1" dirty="0"/>
+              <a:t>Median Salaries</a:t>
+            </a:r>
+            <a:endParaRPr lang="en-US" sz="2000" dirty="0"/>
+          </a:p>
+          <a:p>
+            <a:pPr indent="-228600">
+              <a:lnSpc>
+                <a:spcPct val="90000"/>
+              </a:lnSpc>
+              <a:spcAft>
+                <a:spcPts val="600"/>
+              </a:spcAft>
+              <a:buFont typeface="Arial" panose="020B0604020202020204" pitchFamily="34" charset="0"/>
+              <a:buChar char="•"/>
+            </a:pPr>
+            <a:r>
+              <a:rPr lang="en-US" sz="2000" dirty="0"/>
+              <a:t>Entry-level / Junior: $90,000</a:t>
+            </a:r>
+          </a:p>
+          <a:p>
+            <a:pPr indent="-228600">
+              <a:lnSpc>
+                <a:spcPct val="90000"/>
+              </a:lnSpc>
+              <a:spcAft>
+                <a:spcPts val="600"/>
+              </a:spcAft>
+              <a:buFont typeface="Arial" panose="020B0604020202020204" pitchFamily="34" charset="0"/>
+              <a:buChar char="•"/>
+            </a:pPr>
+            <a:r>
+              <a:rPr lang="en-US" sz="2000" dirty="0"/>
+              <a:t>Mid-level / Intermediate: $112,000</a:t>
+            </a:r>
+          </a:p>
+          <a:p>
+            <a:pPr indent="-228600">
+              <a:lnSpc>
+                <a:spcPct val="90000"/>
+              </a:lnSpc>
+              <a:spcAft>
+                <a:spcPts val="600"/>
+              </a:spcAft>
+              <a:buFont typeface="Arial" panose="020B0604020202020204" pitchFamily="34" charset="0"/>
+              <a:buChar char="•"/>
+            </a:pPr>
+            <a:r>
+              <a:rPr lang="en-US" sz="2000" dirty="0"/>
+              <a:t>Senior-level / Expert: $146,900</a:t>
+            </a:r>
+          </a:p>
+          <a:p>
+            <a:pPr indent="-228600">
+              <a:lnSpc>
+                <a:spcPct val="90000"/>
+              </a:lnSpc>
+              <a:spcAft>
+                <a:spcPts val="600"/>
+              </a:spcAft>
+              <a:buFont typeface="Arial" panose="020B0604020202020204" pitchFamily="34" charset="0"/>
+              <a:buChar char="•"/>
+            </a:pPr>
+            <a:r>
+              <a:rPr lang="en-US" sz="2000" dirty="0"/>
+              <a:t>Executive-level / Director: $216,000</a:t>
+            </a:r>
+          </a:p>
+        </p:txBody>
+      </p:sp>
+      <p:pic>
+        <p:nvPicPr>
+          <p:cNvPr id="5" name="Content Placeholder 4" descr="A graph showing a number of colored squares&#10;&#10;Description automatically generated with medium confidence">
+            <a:extLst>
+              <a:ext uri="{FF2B5EF4-FFF2-40B4-BE49-F238E27FC236}">
+                <a16:creationId xmlns:a16="http://schemas.microsoft.com/office/drawing/2014/main" id="{FBFC163B-841E-060F-50C6-2127C82457A1}"/>
+              </a:ext>
+            </a:extLst>
+          </p:cNvPr>
+          <p:cNvPicPr>
+            <a:picLocks noGrp="1" noChangeAspect="1"/>
+          </p:cNvPicPr>
+          <p:nvPr>
+            <p:ph idx="1"/>
+          </p:nvPr>
+        </p:nvPicPr>
+        <p:blipFill>
+          <a:blip r:embed="rId3"/>
+          <a:stretch>
+            <a:fillRect/>
+          </a:stretch>
+        </p:blipFill>
+        <p:spPr>
+          <a:xfrm>
+            <a:off x="4848733" y="848735"/>
+            <a:ext cx="6903720" cy="5160530"/>
+          </a:xfrm>
+          <a:prstGeom prst="rect">
+            <a:avLst/>
+          </a:prstGeom>
+        </p:spPr>
+      </p:pic>
+    </p:spTree>
+    <p:extLst>
+      <p:ext uri="{BB962C8B-B14F-4D97-AF65-F5344CB8AC3E}">
+        <p14:creationId xmlns:p14="http://schemas.microsoft.com/office/powerpoint/2010/main" val="3222306215"/>
+      </p:ext>
+    </p:extLst>
+  </p:cSld>
+  <p:clrMapOvr>
+    <a:masterClrMapping/>
+  </p:clrMapOvr>
+</p:sld>
+</file>
+
+<file path=ppt/slides/slide5.xml><?xml version="1.0" encoding="utf-8"?>
+<p:sld xmlns:a="http://schemas.openxmlformats.org/drawingml/2006/main" xmlns:r="http://schemas.openxmlformats.org/officeDocument/2006/relationships" xmlns:p="http://schemas.openxmlformats.org/presentationml/2006/main">
+  <p:cSld>
+    <p:bg>
+      <p:bgPr>
+        <a:solidFill>
+          <a:schemeClr val="bg1"/>
+        </a:solidFill>
+        <a:effectLst/>
+      </p:bgPr>
+    </p:bg>
+    <p:spTree>
+      <p:nvGrpSpPr>
+        <p:cNvPr id="1" name=""/>
+        <p:cNvGrpSpPr/>
+        <p:nvPr/>
+      </p:nvGrpSpPr>
+      <p:grpSpPr>
+        <a:xfrm>
+          <a:off x="0" y="0"/>
+          <a:ext cx="0" cy="0"/>
+          <a:chOff x="0" y="0"/>
+          <a:chExt cx="0" cy="0"/>
+        </a:xfrm>
+      </p:grpSpPr>
+      <p:sp useBgFill="1">
+        <p:nvSpPr>
+          <p:cNvPr id="23" name="Rectangle 22">
+            <a:extLst>
+              <a:ext uri="{FF2B5EF4-FFF2-40B4-BE49-F238E27FC236}">
+                <a16:creationId xmlns:a16="http://schemas.microsoft.com/office/drawing/2014/main" id="{5DCB5928-DC7D-4612-9922-441966E15627}"/>
+              </a:ext>
+              <a:ext uri="{C183D7F6-B498-43B3-948B-1728B52AA6E4}">
+                <adec:decorative xmlns:adec="http://schemas.microsoft.com/office/drawing/2017/decorative" val="1"/>
+              </a:ext>
+            </a:extLst>
+          </p:cNvPr>
+          <p:cNvSpPr>
+            <a:spLocks noGrp="1" noRot="1" noChangeAspect="1" noMove="1" noResize="1" noEditPoints="1" noAdjustHandles="1" noChangeArrowheads="1" noChangeShapeType="1" noTextEdit="1"/>
+          </p:cNvSpPr>
+          <p:nvPr>
+            <p:extLst>
+              <p:ext uri="{386F3935-93C4-4BCD-93E2-E3B085C9AB24}">
+                <p16:designElem xmlns:p16="http://schemas.microsoft.com/office/powerpoint/2015/main" val="1"/>
+              </p:ext>
+            </p:extLst>
+          </p:nvPr>
+        </p:nvSpPr>
+        <p:spPr>
+          <a:xfrm>
+            <a:off x="0" y="0"/>
+            <a:ext cx="12192000" cy="6858000"/>
+          </a:xfrm>
+          <a:prstGeom prst="rect">
+            <a:avLst/>
+          </a:prstGeom>
+          <a:ln>
+            <a:noFill/>
+          </a:ln>
+        </p:spPr>
+        <p:style>
+          <a:lnRef idx="2">
+            <a:schemeClr val="accent1">
+              <a:shade val="50000"/>
+            </a:schemeClr>
+          </a:lnRef>
+          <a:fillRef idx="1">
+            <a:schemeClr val="accent1"/>
+          </a:fillRef>
+          <a:effectRef idx="0">
+            <a:schemeClr val="accent1"/>
+          </a:effectRef>
+          <a:fontRef idx="minor">
+            <a:schemeClr val="lt1"/>
+          </a:fontRef>
+        </p:style>
+        <p:txBody>
+          <a:bodyPr rtlCol="0" anchor="ctr"/>
+          <a:lstStyle/>
+          <a:p>
+            <a:pPr algn="ctr"/>
+            <a:endParaRPr lang="en-US"/>
+          </a:p>
+        </p:txBody>
+      </p:sp>
+      <p:sp useBgFill="1">
+        <p:nvSpPr>
+          <p:cNvPr id="25" name="Freeform: Shape 24">
+            <a:extLst>
+              <a:ext uri="{FF2B5EF4-FFF2-40B4-BE49-F238E27FC236}">
+                <a16:creationId xmlns:a16="http://schemas.microsoft.com/office/drawing/2014/main" id="{682C1161-1736-45EC-99B7-33F3CAE9D517}"/>
+              </a:ext>
+              <a:ext uri="{C183D7F6-B498-43B3-948B-1728B52AA6E4}">
+                <adec:decorative xmlns:adec="http://schemas.microsoft.com/office/drawing/2017/decorative" val="1"/>
+              </a:ext>
+            </a:extLst>
+          </p:cNvPr>
+          <p:cNvSpPr>
+            <a:spLocks noGrp="1" noRot="1" noChangeAspect="1" noMove="1" noResize="1" noEditPoints="1" noAdjustHandles="1" noChangeArrowheads="1" noChangeShapeType="1" noTextEdit="1"/>
+          </p:cNvSpPr>
+          <p:nvPr>
+            <p:extLst>
+              <p:ext uri="{386F3935-93C4-4BCD-93E2-E3B085C9AB24}">
+                <p16:designElem xmlns:p16="http://schemas.microsoft.com/office/powerpoint/2015/main" val="1"/>
+              </p:ext>
+            </p:extLst>
+          </p:nvPr>
+        </p:nvSpPr>
+        <p:spPr>
+          <a:xfrm>
+            <a:off x="0" y="0"/>
+            <a:ext cx="4959047" cy="6858000"/>
+          </a:xfrm>
+          <a:custGeom>
+            <a:avLst/>
+            <a:gdLst>
+              <a:gd name="connsiteX0" fmla="*/ 0 w 4959047"/>
+              <a:gd name="connsiteY0" fmla="*/ 0 h 6858000"/>
+              <a:gd name="connsiteX1" fmla="*/ 4110127 w 4959047"/>
+              <a:gd name="connsiteY1" fmla="*/ 0 h 6858000"/>
+              <a:gd name="connsiteX2" fmla="*/ 4179024 w 4959047"/>
+              <a:gd name="connsiteY2" fmla="*/ 123368 h 6858000"/>
+              <a:gd name="connsiteX3" fmla="*/ 4959047 w 4959047"/>
+              <a:gd name="connsiteY3" fmla="*/ 3429000 h 6858000"/>
+              <a:gd name="connsiteX4" fmla="*/ 4179024 w 4959047"/>
+              <a:gd name="connsiteY4" fmla="*/ 6734633 h 6858000"/>
+              <a:gd name="connsiteX5" fmla="*/ 4110127 w 4959047"/>
+              <a:gd name="connsiteY5" fmla="*/ 6858000 h 6858000"/>
+              <a:gd name="connsiteX6" fmla="*/ 0 w 4959047"/>
+              <a:gd name="connsiteY6" fmla="*/ 6858000 h 6858000"/>
+            </a:gdLst>
+            <a:ahLst/>
+            <a:cxnLst>
+              <a:cxn ang="0">
+                <a:pos x="connsiteX0" y="connsiteY0"/>
+              </a:cxn>
+              <a:cxn ang="0">
+                <a:pos x="connsiteX1" y="connsiteY1"/>
+              </a:cxn>
+              <a:cxn ang="0">
+                <a:pos x="connsiteX2" y="connsiteY2"/>
+              </a:cxn>
+              <a:cxn ang="0">
+                <a:pos x="connsiteX3" y="connsiteY3"/>
+              </a:cxn>
+              <a:cxn ang="0">
+                <a:pos x="connsiteX4" y="connsiteY4"/>
+              </a:cxn>
+              <a:cxn ang="0">
+                <a:pos x="connsiteX5" y="connsiteY5"/>
+              </a:cxn>
+              <a:cxn ang="0">
+                <a:pos x="connsiteX6" y="connsiteY6"/>
+              </a:cxn>
+            </a:cxnLst>
+            <a:rect l="l" t="t" r="r" b="b"/>
+            <a:pathLst>
+              <a:path w="4959047" h="6858000">
+                <a:moveTo>
+                  <a:pt x="0" y="0"/>
+                </a:moveTo>
+                <a:lnTo>
+                  <a:pt x="4110127" y="0"/>
+                </a:lnTo>
+                <a:lnTo>
+                  <a:pt x="4179024" y="123368"/>
+                </a:lnTo>
+                <a:cubicBezTo>
+                  <a:pt x="4668929" y="1045156"/>
+                  <a:pt x="4959047" y="2189404"/>
+                  <a:pt x="4959047" y="3429000"/>
+                </a:cubicBezTo>
+                <a:cubicBezTo>
+                  <a:pt x="4959047" y="4668597"/>
+                  <a:pt x="4668929" y="5812845"/>
+                  <a:pt x="4179024" y="6734633"/>
+                </a:cubicBezTo>
+                <a:lnTo>
+                  <a:pt x="4110127" y="6858000"/>
+                </a:lnTo>
+                <a:lnTo>
+                  <a:pt x="0" y="6858000"/>
+                </a:lnTo>
+                <a:close/>
+              </a:path>
+            </a:pathLst>
+          </a:custGeom>
+          <a:ln w="9525">
+            <a:solidFill>
+              <a:srgbClr val="E6E6E6"/>
+            </a:solidFill>
+          </a:ln>
+          <a:effectLst>
+            <a:outerShdw blurRad="76200" dist="38100" algn="l" rotWithShape="0">
+              <a:schemeClr val="bg1">
+                <a:lumMod val="85000"/>
+                <a:alpha val="50000"/>
+              </a:schemeClr>
+            </a:outerShdw>
+          </a:effectLst>
+        </p:spPr>
+        <p:style>
+          <a:lnRef idx="2">
+            <a:schemeClr val="accent1">
+              <a:shade val="50000"/>
+            </a:schemeClr>
+          </a:lnRef>
+          <a:fillRef idx="1">
+            <a:schemeClr val="accent1"/>
+          </a:fillRef>
+          <a:effectRef idx="0">
+            <a:schemeClr val="accent1"/>
+          </a:effectRef>
+          <a:fontRef idx="minor">
+            <a:schemeClr val="lt1"/>
+          </a:fontRef>
+        </p:style>
+        <p:txBody>
           <a:bodyPr wrap="square" rtlCol="0" anchor="ctr">
             <a:noAutofit/>
           </a:bodyPr>
           <a:lstStyle/>
           <a:p>
-            <a:pPr algn="ctr"/>
-            <a:endParaRPr lang="en-US" dirty="0"/>
-          </a:p>
-        </p:txBody>
-      </p:sp>
-      <p:sp>
-        <p:nvSpPr>
-          <p:cNvPr id="2" name="Title 1">
-            <a:extLst>
-              <a:ext uri="{FF2B5EF4-FFF2-40B4-BE49-F238E27FC236}">
-                <a16:creationId xmlns:a16="http://schemas.microsoft.com/office/drawing/2014/main" id="{3A842068-F03F-0B3B-E922-AC812E02E9DF}"/>
-              </a:ext>
-            </a:extLst>
-          </p:cNvPr>
-          <p:cNvSpPr>
-            <a:spLocks noGrp="1"/>
-          </p:cNvSpPr>
-          <p:nvPr>
-            <p:ph type="ctrTitle"/>
+            <a:pPr marL="0" marR="0" lvl="0" indent="0" algn="ctr" defTabSz="914400" rtl="0" eaLnBrk="1" fontAlgn="auto" latinLnBrk="0" hangingPunct="1">
+              <a:lnSpc>
+                <a:spcPct val="100000"/>
+              </a:lnSpc>
+              <a:spcBef>
+                <a:spcPts val="0"/>
+              </a:spcBef>
+              <a:spcAft>
+                <a:spcPts val="0"/>
+              </a:spcAft>
+              <a:buClrTx/>
+              <a:buSzTx/>
+              <a:buFontTx/>
+              <a:buNone/>
+              <a:tabLst/>
+              <a:defRPr/>
+            </a:pPr>
+            <a:endParaRPr kumimoji="0" lang="en-US" sz="1800" b="0" i="0" u="none" strike="noStrike" kern="1200" cap="none" spc="0" normalizeH="0" baseline="0" noProof="0">
+              <a:ln>
+                <a:noFill/>
+              </a:ln>
+              <a:solidFill>
+                <a:prstClr val="white"/>
+              </a:solidFill>
+              <a:effectLst/>
+              <a:uLnTx/>
+              <a:uFillTx/>
+              <a:latin typeface="Calibri" panose="020F0502020204030204"/>
+              <a:ea typeface="+mn-ea"/>
+              <a:cs typeface="+mn-cs"/>
+            </a:endParaRPr>
+          </a:p>
+        </p:txBody>
+      </p:sp>
+      <p:sp useBgFill="1">
+        <p:nvSpPr>
+          <p:cNvPr id="27" name="Freeform: Shape 26">
+            <a:extLst>
+              <a:ext uri="{FF2B5EF4-FFF2-40B4-BE49-F238E27FC236}">
+                <a16:creationId xmlns:a16="http://schemas.microsoft.com/office/drawing/2014/main" id="{84D4DDB8-B68F-45B0-9F62-C4279996F672}"/>
+              </a:ext>
+              <a:ext uri="{C183D7F6-B498-43B3-948B-1728B52AA6E4}">
+                <adec:decorative xmlns:adec="http://schemas.microsoft.com/office/drawing/2017/decorative" val="1"/>
+              </a:ext>
+            </a:extLst>
+          </p:cNvPr>
+          <p:cNvSpPr>
+            <a:spLocks noGrp="1" noRot="1" noChangeAspect="1" noMove="1" noResize="1" noEditPoints="1" noAdjustHandles="1" noChangeArrowheads="1" noChangeShapeType="1" noTextEdit="1"/>
+          </p:cNvSpPr>
+          <p:nvPr>
+            <p:extLst>
+              <p:ext uri="{386F3935-93C4-4BCD-93E2-E3B085C9AB24}">
+                <p16:designElem xmlns:p16="http://schemas.microsoft.com/office/powerpoint/2015/main" val="1"/>
+              </p:ext>
+            </p:extLst>
           </p:nvPr>
         </p:nvSpPr>
         <p:spPr>
           <a:xfrm>
-            <a:off x="660041" y="2767106"/>
-            <a:ext cx="2880828" cy="3071906"/>
+            <a:off x="0" y="0"/>
+            <a:ext cx="4948887" cy="6858000"/>
+          </a:xfrm>
+          <a:custGeom>
+            <a:avLst/>
+            <a:gdLst>
+              <a:gd name="connsiteX0" fmla="*/ 0 w 4948887"/>
+              <a:gd name="connsiteY0" fmla="*/ 0 h 6858000"/>
+              <a:gd name="connsiteX1" fmla="*/ 4099967 w 4948887"/>
+              <a:gd name="connsiteY1" fmla="*/ 0 h 6858000"/>
+              <a:gd name="connsiteX2" fmla="*/ 4168864 w 4948887"/>
+              <a:gd name="connsiteY2" fmla="*/ 123368 h 6858000"/>
+              <a:gd name="connsiteX3" fmla="*/ 4948887 w 4948887"/>
+              <a:gd name="connsiteY3" fmla="*/ 3429000 h 6858000"/>
+              <a:gd name="connsiteX4" fmla="*/ 4168864 w 4948887"/>
+              <a:gd name="connsiteY4" fmla="*/ 6734633 h 6858000"/>
+              <a:gd name="connsiteX5" fmla="*/ 4099967 w 4948887"/>
+              <a:gd name="connsiteY5" fmla="*/ 6858000 h 6858000"/>
+              <a:gd name="connsiteX6" fmla="*/ 0 w 4948887"/>
+              <a:gd name="connsiteY6" fmla="*/ 6858000 h 6858000"/>
+            </a:gdLst>
+            <a:ahLst/>
+            <a:cxnLst>
+              <a:cxn ang="0">
+                <a:pos x="connsiteX0" y="connsiteY0"/>
+              </a:cxn>
+              <a:cxn ang="0">
+                <a:pos x="connsiteX1" y="connsiteY1"/>
+              </a:cxn>
+              <a:cxn ang="0">
+                <a:pos x="connsiteX2" y="connsiteY2"/>
+              </a:cxn>
+              <a:cxn ang="0">
+                <a:pos x="connsiteX3" y="connsiteY3"/>
+              </a:cxn>
+              <a:cxn ang="0">
+                <a:pos x="connsiteX4" y="connsiteY4"/>
+              </a:cxn>
+              <a:cxn ang="0">
+                <a:pos x="connsiteX5" y="connsiteY5"/>
+              </a:cxn>
+              <a:cxn ang="0">
+                <a:pos x="connsiteX6" y="connsiteY6"/>
+              </a:cxn>
+            </a:cxnLst>
+            <a:rect l="l" t="t" r="r" b="b"/>
+            <a:pathLst>
+              <a:path w="4948887" h="6858000">
+                <a:moveTo>
+                  <a:pt x="0" y="0"/>
+                </a:moveTo>
+                <a:lnTo>
+                  <a:pt x="4099967" y="0"/>
+                </a:lnTo>
+                <a:lnTo>
+                  <a:pt x="4168864" y="123368"/>
+                </a:lnTo>
+                <a:cubicBezTo>
+                  <a:pt x="4658769" y="1045156"/>
+                  <a:pt x="4948887" y="2189404"/>
+                  <a:pt x="4948887" y="3429000"/>
+                </a:cubicBezTo>
+                <a:cubicBezTo>
+                  <a:pt x="4948887" y="4668597"/>
+                  <a:pt x="4658769" y="5812845"/>
+                  <a:pt x="4168864" y="6734633"/>
+                </a:cubicBezTo>
+                <a:lnTo>
+                  <a:pt x="4099967" y="6858000"/>
+                </a:lnTo>
+                <a:lnTo>
+                  <a:pt x="0" y="6858000"/>
+                </a:lnTo>
+                <a:close/>
+              </a:path>
+            </a:pathLst>
+          </a:custGeom>
+          <a:ln w="9525">
+            <a:noFill/>
+          </a:ln>
+          <a:effectLst/>
+        </p:spPr>
+        <p:style>
+          <a:lnRef idx="2">
+            <a:schemeClr val="accent1">
+              <a:shade val="50000"/>
+            </a:schemeClr>
+          </a:lnRef>
+          <a:fillRef idx="1">
+            <a:schemeClr val="accent1"/>
+          </a:fillRef>
+          <a:effectRef idx="0">
+            <a:schemeClr val="accent1"/>
+          </a:effectRef>
+          <a:fontRef idx="minor">
+            <a:schemeClr val="lt1"/>
+          </a:fontRef>
+        </p:style>
+        <p:txBody>
+          <a:bodyPr wrap="square" rtlCol="0" anchor="ctr">
+            <a:noAutofit/>
+          </a:bodyPr>
+          <a:lstStyle/>
+          <a:p>
+            <a:pPr marL="0" marR="0" lvl="0" indent="0" algn="ctr" defTabSz="914400" rtl="0" eaLnBrk="1" fontAlgn="auto" latinLnBrk="0" hangingPunct="1">
+              <a:lnSpc>
+                <a:spcPct val="100000"/>
+              </a:lnSpc>
+              <a:spcBef>
+                <a:spcPts val="0"/>
+              </a:spcBef>
+              <a:spcAft>
+                <a:spcPts val="0"/>
+              </a:spcAft>
+              <a:buClrTx/>
+              <a:buSzTx/>
+              <a:buFontTx/>
+              <a:buNone/>
+              <a:tabLst/>
+              <a:defRPr/>
+            </a:pPr>
+            <a:endParaRPr kumimoji="0" lang="en-US" sz="1800" b="0" i="0" u="none" strike="noStrike" kern="1200" cap="none" spc="0" normalizeH="0" baseline="0" noProof="0">
+              <a:ln>
+                <a:noFill/>
+              </a:ln>
+              <a:solidFill>
+                <a:prstClr val="white"/>
+              </a:solidFill>
+              <a:effectLst/>
+              <a:uLnTx/>
+              <a:uFillTx/>
+              <a:latin typeface="Calibri" panose="020F0502020204030204"/>
+              <a:ea typeface="+mn-ea"/>
+              <a:cs typeface="+mn-cs"/>
+            </a:endParaRPr>
+          </a:p>
+        </p:txBody>
+      </p:sp>
+      <p:sp>
+        <p:nvSpPr>
+          <p:cNvPr id="2" name="Title 1">
+            <a:extLst>
+              <a:ext uri="{FF2B5EF4-FFF2-40B4-BE49-F238E27FC236}">
+                <a16:creationId xmlns:a16="http://schemas.microsoft.com/office/drawing/2014/main" id="{4E5C2F53-6A55-78D2-A9C7-DEA2D1F2844B}"/>
+              </a:ext>
+            </a:extLst>
+          </p:cNvPr>
+          <p:cNvSpPr>
+            <a:spLocks noGrp="1"/>
+          </p:cNvSpPr>
+          <p:nvPr>
+            <p:ph type="title"/>
+          </p:nvPr>
+        </p:nvSpPr>
+        <p:spPr>
+          <a:xfrm>
+            <a:off x="477981" y="1122363"/>
+            <a:ext cx="4023360" cy="3204134"/>
           </a:xfrm>
         </p:spPr>
         <p:txBody>
-          <a:bodyPr anchor="t">
+          <a:bodyPr vert="horz" lIns="91440" tIns="45720" rIns="91440" bIns="45720" rtlCol="0" anchor="b">
             <a:normAutofit/>
           </a:bodyPr>
           <a:lstStyle/>
           <a:p>
-            <a:pPr algn="l"/>
-            <a:r>
-              <a:rPr lang="en-US" sz="4000">
+            <a:r>
+              <a:rPr lang="en-US" sz="4100" kern="1200" dirty="0">
                 <a:solidFill>
-                  <a:srgbClr val="FFFFFF"/>
+                  <a:schemeClr val="tx1"/>
                 </a:solidFill>
+                <a:latin typeface="+mj-lt"/>
+                <a:ea typeface="+mj-ea"/>
+                <a:cs typeface="+mj-cs"/>
               </a:rPr>
-              <a:t>Data Science Salary Analysis: </a:t>
-            </a:r>
-            <a:br>
-              <a:rPr lang="en-US" sz="4000">
-                <a:solidFill>
-                  <a:srgbClr val="FFFFFF"/>
-                </a:solidFill>
-              </a:rPr>
-            </a:br>
-            <a:r>
-              <a:rPr lang="en-US" sz="4000">
-                <a:solidFill>
-                  <a:srgbClr val="FFFFFF"/>
-                </a:solidFill>
-              </a:rPr>
-              <a:t>Attracting Top Talent</a:t>
-            </a:r>
-          </a:p>
-        </p:txBody>
-      </p:sp>
-      <p:sp>
-        <p:nvSpPr>
-          <p:cNvPr id="3" name="Subtitle 2">
-            <a:extLst>
-              <a:ext uri="{FF2B5EF4-FFF2-40B4-BE49-F238E27FC236}">
-                <a16:creationId xmlns:a16="http://schemas.microsoft.com/office/drawing/2014/main" id="{97E639D3-F98F-E914-8B97-233FB03F88A2}"/>
-              </a:ext>
-            </a:extLst>
-          </p:cNvPr>
-          <p:cNvSpPr>
-            <a:spLocks noGrp="1"/>
-          </p:cNvSpPr>
-          <p:nvPr>
-            <p:ph type="subTitle" idx="1"/>
+              <a:t>Salary Recommendation: $140,000 - $169,000</a:t>
+            </a:r>
+          </a:p>
+        </p:txBody>
+      </p:sp>
+      <p:sp>
+        <p:nvSpPr>
+          <p:cNvPr id="29" name="Rectangle 28">
+            <a:extLst>
+              <a:ext uri="{FF2B5EF4-FFF2-40B4-BE49-F238E27FC236}">
+                <a16:creationId xmlns:a16="http://schemas.microsoft.com/office/drawing/2014/main" id="{AF2F604E-43BE-4DC3-B983-E071523364F8}"/>
+              </a:ext>
+              <a:ext uri="{C183D7F6-B498-43B3-948B-1728B52AA6E4}">
+                <adec:decorative xmlns:adec="http://schemas.microsoft.com/office/drawing/2017/decorative" val="1"/>
+              </a:ext>
+            </a:extLst>
+          </p:cNvPr>
+          <p:cNvSpPr>
+            <a:spLocks noGrp="1" noRot="1" noChangeAspect="1" noMove="1" noResize="1" noEditPoints="1" noAdjustHandles="1" noChangeArrowheads="1" noChangeShapeType="1" noTextEdit="1"/>
+          </p:cNvSpPr>
+          <p:nvPr>
+            <p:extLst>
+              <p:ext uri="{386F3935-93C4-4BCD-93E2-E3B085C9AB24}">
+                <p16:designElem xmlns:p16="http://schemas.microsoft.com/office/powerpoint/2015/main" val="1"/>
+              </p:ext>
+            </p:extLst>
+          </p:nvPr>
+        </p:nvSpPr>
+        <p:spPr>
+          <a:xfrm rot="5400000">
+            <a:off x="759921" y="346791"/>
+            <a:ext cx="146304" cy="704088"/>
+          </a:xfrm>
+          <a:prstGeom prst="rect">
+            <a:avLst/>
+          </a:prstGeom>
+          <a:solidFill>
+            <a:schemeClr val="accent2"/>
+          </a:solidFill>
+          <a:ln>
+            <a:noFill/>
+          </a:ln>
+        </p:spPr>
+        <p:style>
+          <a:lnRef idx="2">
+            <a:schemeClr val="accent1">
+              <a:shade val="50000"/>
+            </a:schemeClr>
+          </a:lnRef>
+          <a:fillRef idx="1">
+            <a:schemeClr val="accent1"/>
+          </a:fillRef>
+          <a:effectRef idx="0">
+            <a:schemeClr val="accent1"/>
+          </a:effectRef>
+          <a:fontRef idx="minor">
+            <a:schemeClr val="lt1"/>
+          </a:fontRef>
+        </p:style>
+        <p:txBody>
+          <a:bodyPr rtlCol="0" anchor="ctr"/>
+          <a:lstStyle/>
+          <a:p>
+            <a:pPr algn="ctr"/>
+            <a:endParaRPr lang="en-US">
+              <a:solidFill>
+                <a:prstClr val="white"/>
+              </a:solidFill>
+              <a:latin typeface="Calibri" panose="020F0502020204030204"/>
+            </a:endParaRPr>
+          </a:p>
+        </p:txBody>
+      </p:sp>
+      <p:sp>
+        <p:nvSpPr>
+          <p:cNvPr id="31" name="Rectangle 30">
+            <a:extLst>
+              <a:ext uri="{FF2B5EF4-FFF2-40B4-BE49-F238E27FC236}">
+                <a16:creationId xmlns:a16="http://schemas.microsoft.com/office/drawing/2014/main" id="{08C9B587-E65E-4B52-B37C-ABEBB6E87928}"/>
+              </a:ext>
+              <a:ext uri="{C183D7F6-B498-43B3-948B-1728B52AA6E4}">
+                <adec:decorative xmlns:adec="http://schemas.microsoft.com/office/drawing/2017/decorative" val="1"/>
+              </a:ext>
+            </a:extLst>
+          </p:cNvPr>
+          <p:cNvSpPr>
+            <a:spLocks noGrp="1" noRot="1" noChangeAspect="1" noMove="1" noResize="1" noEditPoints="1" noAdjustHandles="1" noChangeArrowheads="1" noChangeShapeType="1" noTextEdit="1"/>
+          </p:cNvSpPr>
+          <p:nvPr>
+            <p:extLst>
+              <p:ext uri="{386F3935-93C4-4BCD-93E2-E3B085C9AB24}">
+                <p16:designElem xmlns:p16="http://schemas.microsoft.com/office/powerpoint/2015/main" val="1"/>
+              </p:ext>
+            </p:extLst>
           </p:nvPr>
         </p:nvSpPr>
         <p:spPr>
           <a:xfrm>
-            <a:off x="660042" y="806824"/>
-            <a:ext cx="2919738" cy="1494117"/>
+            <a:off x="481029" y="4546920"/>
+            <a:ext cx="4023360" cy="18288"/>
           </a:xfrm>
+          <a:prstGeom prst="rect">
+            <a:avLst/>
+          </a:prstGeom>
+          <a:solidFill>
+            <a:srgbClr val="D5D5D5"/>
+          </a:solidFill>
+          <a:ln w="3175">
+            <a:noFill/>
+          </a:ln>
+          <a:effectLst/>
         </p:spPr>
-        <p:txBody>
-          <a:bodyPr anchor="b">
-            <a:normAutofit/>
-          </a:bodyPr>
-          <a:lstStyle/>
-          <a:p>
-            <a:pPr algn="l"/>
-            <a:r>
-              <a:rPr lang="en-US" sz="2000">
-                <a:solidFill>
-                  <a:srgbClr val="FFFFFF"/>
-                </a:solidFill>
-              </a:rPr>
-              <a:t>Adeline Casali, DSE5002</a:t>
-            </a:r>
+        <p:style>
+          <a:lnRef idx="2">
+            <a:schemeClr val="accent1">
+              <a:shade val="50000"/>
+            </a:schemeClr>
+          </a:lnRef>
+          <a:fillRef idx="1">
+            <a:schemeClr val="accent1"/>
+          </a:fillRef>
+          <a:effectRef idx="0">
+            <a:schemeClr val="accent1"/>
+          </a:effectRef>
+          <a:fontRef idx="minor">
+            <a:schemeClr val="lt1"/>
+          </a:fontRef>
+        </p:style>
+        <p:txBody>
+          <a:bodyPr rtlCol="0" anchor="ctr"/>
+          <a:lstStyle/>
+          <a:p>
+            <a:pPr marL="0" marR="0" lvl="0" indent="0" algn="ctr" defTabSz="914400" rtl="0" eaLnBrk="1" fontAlgn="auto" latinLnBrk="0" hangingPunct="1">
+              <a:lnSpc>
+                <a:spcPct val="100000"/>
+              </a:lnSpc>
+              <a:spcBef>
+                <a:spcPts val="0"/>
+              </a:spcBef>
+              <a:spcAft>
+                <a:spcPts val="0"/>
+              </a:spcAft>
+              <a:buClrTx/>
+              <a:buSzTx/>
+              <a:buFontTx/>
+              <a:buNone/>
+              <a:tabLst/>
+              <a:defRPr/>
+            </a:pPr>
+            <a:endParaRPr kumimoji="0" lang="en-US" sz="1800" b="0" i="0" u="none" strike="noStrike" kern="1200" cap="none" spc="0" normalizeH="0" baseline="0" noProof="0">
+              <a:ln>
+                <a:noFill/>
+              </a:ln>
+              <a:solidFill>
+                <a:prstClr val="white"/>
+              </a:solidFill>
+              <a:effectLst/>
+              <a:uLnTx/>
+              <a:uFillTx/>
+              <a:latin typeface="Calibri" panose="020F0502020204030204"/>
+              <a:ea typeface="+mn-ea"/>
+              <a:cs typeface="+mn-cs"/>
+            </a:endParaRPr>
           </a:p>
         </p:txBody>
       </p:sp>
       <p:pic>
         <p:nvPicPr>
-          <p:cNvPr id="5" name="Picture 4" descr="A graph of salary&#10;&#10;Description automatically generated">
-            <a:extLst>
-              <a:ext uri="{FF2B5EF4-FFF2-40B4-BE49-F238E27FC236}">
-                <a16:creationId xmlns:a16="http://schemas.microsoft.com/office/drawing/2014/main" id="{7BEB672E-7F40-6A93-8E03-0E6E44B9F7A3}"/>
+          <p:cNvPr id="9" name="Picture 8" descr="A graph showing a graph of a number of people&#10;&#10;Description automatically generated with medium confidence">
+            <a:extLst>
+              <a:ext uri="{FF2B5EF4-FFF2-40B4-BE49-F238E27FC236}">
+                <a16:creationId xmlns:a16="http://schemas.microsoft.com/office/drawing/2014/main" id="{AF2B0DEE-050A-F3A6-5E5C-5F9460418946}"/>
               </a:ext>
             </a:extLst>
           </p:cNvPr>
@@ -3912,237 +6568,25 @@
           <p:nvPr/>
         </p:nvPicPr>
         <p:blipFill>
-          <a:blip r:embed="rId2"/>
+          <a:blip r:embed="rId3"/>
           <a:stretch>
             <a:fillRect/>
           </a:stretch>
         </p:blipFill>
         <p:spPr>
           <a:xfrm>
-            <a:off x="4143840" y="1814864"/>
-            <a:ext cx="6463200" cy="4831241"/>
+            <a:off x="5414356" y="958072"/>
+            <a:ext cx="6408836" cy="4790604"/>
           </a:xfrm>
           <a:prstGeom prst="rect">
             <a:avLst/>
           </a:prstGeom>
         </p:spPr>
       </p:pic>
-      <p:graphicFrame>
-        <p:nvGraphicFramePr>
-          <p:cNvPr id="7" name="Table 7">
-            <a:extLst>
-              <a:ext uri="{FF2B5EF4-FFF2-40B4-BE49-F238E27FC236}">
-                <a16:creationId xmlns:a16="http://schemas.microsoft.com/office/drawing/2014/main" id="{49E19639-AD47-A16A-7707-6AF1297F11A9}"/>
-              </a:ext>
-            </a:extLst>
-          </p:cNvPr>
-          <p:cNvGraphicFramePr>
-            <a:graphicFrameLocks noGrp="1"/>
-          </p:cNvGraphicFramePr>
-          <p:nvPr>
-            <p:extLst>
-              <p:ext uri="{D42A27DB-BD31-4B8C-83A1-F6EECF244321}">
-                <p14:modId xmlns:p14="http://schemas.microsoft.com/office/powerpoint/2010/main" val="3321931922"/>
-              </p:ext>
-            </p:extLst>
-          </p:nvPr>
-        </p:nvGraphicFramePr>
-        <p:xfrm>
-          <a:off x="8705088" y="211896"/>
-          <a:ext cx="3238176" cy="1828800"/>
-        </p:xfrm>
-        <a:graphic>
-          <a:graphicData uri="http://schemas.openxmlformats.org/drawingml/2006/table">
-            <a:tbl>
-              <a:tblPr firstRow="1" bandRow="1">
-                <a:tableStyleId>{5C22544A-7EE6-4342-B048-85BDC9FD1C3A}</a:tableStyleId>
-              </a:tblPr>
-              <a:tblGrid>
-                <a:gridCol w="1619088">
-                  <a:extLst>
-                    <a:ext uri="{9D8B030D-6E8A-4147-A177-3AD203B41FA5}">
-                      <a16:colId xmlns:a16="http://schemas.microsoft.com/office/drawing/2014/main" val="2364674308"/>
-                    </a:ext>
-                  </a:extLst>
-                </a:gridCol>
-                <a:gridCol w="1619088">
-                  <a:extLst>
-                    <a:ext uri="{9D8B030D-6E8A-4147-A177-3AD203B41FA5}">
-                      <a16:colId xmlns:a16="http://schemas.microsoft.com/office/drawing/2014/main" val="1418458252"/>
-                    </a:ext>
-                  </a:extLst>
-                </a:gridCol>
-              </a:tblGrid>
-              <a:tr h="312408">
-                <a:tc>
-                  <a:txBody>
-                    <a:bodyPr/>
-                    <a:lstStyle/>
-                    <a:p>
-                      <a:endParaRPr lang="en-US" dirty="0"/>
-                    </a:p>
-                  </a:txBody>
-                  <a:tcPr/>
-                </a:tc>
-                <a:tc>
-                  <a:txBody>
-                    <a:bodyPr/>
-                    <a:lstStyle/>
-                    <a:p>
-                      <a:r>
-                        <a:rPr lang="en-US" dirty="0"/>
-                        <a:t>Salary in USD</a:t>
-                      </a:r>
-                    </a:p>
-                  </a:txBody>
-                  <a:tcPr/>
-                </a:tc>
-                <a:extLst>
-                  <a:ext uri="{0D108BD9-81ED-4DB2-BD59-A6C34878D82A}">
-                    <a16:rowId xmlns:a16="http://schemas.microsoft.com/office/drawing/2014/main" val="3892380934"/>
-                  </a:ext>
-                </a:extLst>
-              </a:tr>
-              <a:tr h="312408">
-                <a:tc>
-                  <a:txBody>
-                    <a:bodyPr/>
-                    <a:lstStyle/>
-                    <a:p>
-                      <a:r>
-                        <a:rPr lang="en-US" dirty="0"/>
-                        <a:t>Minimum</a:t>
-                      </a:r>
-                    </a:p>
-                  </a:txBody>
-                  <a:tcPr/>
-                </a:tc>
-                <a:tc>
-                  <a:txBody>
-                    <a:bodyPr/>
-                    <a:lstStyle/>
-                    <a:p>
-                      <a:r>
-                        <a:rPr lang="en-US" dirty="0"/>
-                        <a:t>5,679</a:t>
-                      </a:r>
-                    </a:p>
-                  </a:txBody>
-                  <a:tcPr/>
-                </a:tc>
-                <a:extLst>
-                  <a:ext uri="{0D108BD9-81ED-4DB2-BD59-A6C34878D82A}">
-                    <a16:rowId xmlns:a16="http://schemas.microsoft.com/office/drawing/2014/main" val="641111717"/>
-                  </a:ext>
-                </a:extLst>
-              </a:tr>
-              <a:tr h="312408">
-                <a:tc>
-                  <a:txBody>
-                    <a:bodyPr/>
-                    <a:lstStyle/>
-                    <a:p>
-                      <a:r>
-                        <a:rPr lang="en-US" dirty="0"/>
-                        <a:t>Median</a:t>
-                      </a:r>
-                    </a:p>
-                  </a:txBody>
-                  <a:tcPr/>
-                </a:tc>
-                <a:tc>
-                  <a:txBody>
-                    <a:bodyPr/>
-                    <a:lstStyle/>
-                    <a:p>
-                      <a:r>
-                        <a:rPr lang="en-US" dirty="0"/>
-                        <a:t>135,000</a:t>
-                      </a:r>
-                    </a:p>
-                  </a:txBody>
-                  <a:tcPr/>
-                </a:tc>
-                <a:extLst>
-                  <a:ext uri="{0D108BD9-81ED-4DB2-BD59-A6C34878D82A}">
-                    <a16:rowId xmlns:a16="http://schemas.microsoft.com/office/drawing/2014/main" val="2414179572"/>
-                  </a:ext>
-                </a:extLst>
-              </a:tr>
-              <a:tr h="312408">
-                <a:tc>
-                  <a:txBody>
-                    <a:bodyPr/>
-                    <a:lstStyle/>
-                    <a:p>
-                      <a:r>
-                        <a:rPr lang="en-US" dirty="0"/>
-                        <a:t>Mean</a:t>
-                      </a:r>
-                    </a:p>
-                  </a:txBody>
-                  <a:tcPr/>
-                </a:tc>
-                <a:tc>
-                  <a:txBody>
-                    <a:bodyPr/>
-                    <a:lstStyle/>
-                    <a:p>
-                      <a:r>
-                        <a:rPr lang="en-US" dirty="0"/>
-                        <a:t>144,055</a:t>
-                      </a:r>
-                    </a:p>
-                  </a:txBody>
-                  <a:tcPr/>
-                </a:tc>
-                <a:extLst>
-                  <a:ext uri="{0D108BD9-81ED-4DB2-BD59-A6C34878D82A}">
-                    <a16:rowId xmlns:a16="http://schemas.microsoft.com/office/drawing/2014/main" val="3985389974"/>
-                  </a:ext>
-                </a:extLst>
-              </a:tr>
-              <a:tr h="312408">
-                <a:tc>
-                  <a:txBody>
-                    <a:bodyPr/>
-                    <a:lstStyle/>
-                    <a:p>
-                      <a:r>
-                        <a:rPr lang="en-US" dirty="0"/>
-                        <a:t>Maximum</a:t>
-                      </a:r>
-                    </a:p>
-                  </a:txBody>
-                  <a:tcPr/>
-                </a:tc>
-                <a:tc>
-                  <a:txBody>
-                    <a:bodyPr/>
-                    <a:lstStyle/>
-                    <a:p>
-                      <a:r>
-                        <a:rPr lang="en-US" dirty="0"/>
-                        <a:t>600,000</a:t>
-                      </a:r>
-                    </a:p>
-                  </a:txBody>
-                  <a:tcPr/>
-                </a:tc>
-                <a:extLst>
-                  <a:ext uri="{0D108BD9-81ED-4DB2-BD59-A6C34878D82A}">
-                    <a16:rowId xmlns:a16="http://schemas.microsoft.com/office/drawing/2014/main" val="1277129094"/>
-                  </a:ext>
-                </a:extLst>
-              </a:tr>
-            </a:tbl>
-          </a:graphicData>
-        </a:graphic>
-      </p:graphicFrame>
     </p:spTree>
     <p:extLst>
       <p:ext uri="{BB962C8B-B14F-4D97-AF65-F5344CB8AC3E}">
-        <p14:creationId xmlns:p14="http://schemas.microsoft.com/office/powerpoint/2010/main" val="465740915"/>
+        <p14:creationId xmlns:p14="http://schemas.microsoft.com/office/powerpoint/2010/main" val="1607370943"/>
       </p:ext>
     </p:extLst>
   </p:cSld>
@@ -4445,4 +6889,299 @@
     </a:ext>
   </a:extLst>
 </a:theme>
+</file>
+
+<file path=ppt/theme/theme2.xml><?xml version="1.0" encoding="utf-8"?>
+<a:theme xmlns:a="http://schemas.openxmlformats.org/drawingml/2006/main" name="Office Theme">
+  <a:themeElements>
+    <a:clrScheme name="Office">
+      <a:dk1>
+        <a:sysClr val="windowText" lastClr="000000"/>
+      </a:dk1>
+      <a:lt1>
+        <a:sysClr val="window" lastClr="FFFFFF"/>
+      </a:lt1>
+      <a:dk2>
+        <a:srgbClr val="44546A"/>
+      </a:dk2>
+      <a:lt2>
+        <a:srgbClr val="E7E6E6"/>
+      </a:lt2>
+      <a:accent1>
+        <a:srgbClr val="4472C4"/>
+      </a:accent1>
+      <a:accent2>
+        <a:srgbClr val="ED7D31"/>
+      </a:accent2>
+      <a:accent3>
+        <a:srgbClr val="A5A5A5"/>
+      </a:accent3>
+      <a:accent4>
+        <a:srgbClr val="FFC000"/>
+      </a:accent4>
+      <a:accent5>
+        <a:srgbClr val="5B9BD5"/>
+      </a:accent5>
+      <a:accent6>
+        <a:srgbClr val="70AD47"/>
+      </a:accent6>
+      <a:hlink>
+        <a:srgbClr val="0563C1"/>
+      </a:hlink>
+      <a:folHlink>
+        <a:srgbClr val="954F72"/>
+      </a:folHlink>
+    </a:clrScheme>
+    <a:fontScheme name="Office">
+      <a:majorFont>
+        <a:latin typeface="Calibri Light" panose="020F0302020204030204"/>
+        <a:ea typeface=""/>
+        <a:cs typeface=""/>
+        <a:font script="Jpan" typeface="游ゴシック Light"/>
+        <a:font script="Hang" typeface="맑은 고딕"/>
+        <a:font script="Hans" typeface="等线 Light"/>
+        <a:font script="Hant" typeface="新細明體"/>
+        <a:font script="Arab" typeface="Times New Roman"/>
+        <a:font script="Hebr" typeface="Times New Roman"/>
+        <a:font script="Thai" typeface="Angsana New"/>
+        <a:font script="Ethi" typeface="Nyala"/>
+        <a:font script="Beng" typeface="Vrinda"/>
+        <a:font script="Gujr" typeface="Shruti"/>
+        <a:font script="Khmr" typeface="MoolBoran"/>
+        <a:font script="Knda" typeface="Tunga"/>
+        <a:font script="Guru" typeface="Raavi"/>
+        <a:font script="Cans" typeface="Euphemia"/>
+        <a:font script="Cher" typeface="Plantagenet Cherokee"/>
+        <a:font script="Yiii" typeface="Microsoft Yi Baiti"/>
+        <a:font script="Tibt" typeface="Microsoft Himalaya"/>
+        <a:font script="Thaa" typeface="MV Boli"/>
+        <a:font script="Deva" typeface="Mangal"/>
+        <a:font script="Telu" typeface="Gautami"/>
+        <a:font script="Taml" typeface="Latha"/>
+        <a:font script="Syrc" typeface="Estrangelo Edessa"/>
+        <a:font script="Orya" typeface="Kalinga"/>
+        <a:font script="Mlym" typeface="Kartika"/>
+        <a:font script="Laoo" typeface="DokChampa"/>
+        <a:font script="Sinh" typeface="Iskoola Pota"/>
+        <a:font script="Mong" typeface="Mongolian Baiti"/>
+        <a:font script="Viet" typeface="Times New Roman"/>
+        <a:font script="Uigh" typeface="Microsoft Uighur"/>
+        <a:font script="Geor" typeface="Sylfaen"/>
+        <a:font script="Armn" typeface="Arial"/>
+        <a:font script="Bugi" typeface="Leelawadee UI"/>
+        <a:font script="Bopo" typeface="Microsoft JhengHei"/>
+        <a:font script="Java" typeface="Javanese Text"/>
+        <a:font script="Lisu" typeface="Segoe UI"/>
+        <a:font script="Mymr" typeface="Myanmar Text"/>
+        <a:font script="Nkoo" typeface="Ebrima"/>
+        <a:font script="Olck" typeface="Nirmala UI"/>
+        <a:font script="Osma" typeface="Ebrima"/>
+        <a:font script="Phag" typeface="Phagspa"/>
+        <a:font script="Syrn" typeface="Estrangelo Edessa"/>
+        <a:font script="Syrj" typeface="Estrangelo Edessa"/>
+        <a:font script="Syre" typeface="Estrangelo Edessa"/>
+        <a:font script="Sora" typeface="Nirmala UI"/>
+        <a:font script="Tale" typeface="Microsoft Tai Le"/>
+        <a:font script="Talu" typeface="Microsoft New Tai Lue"/>
+        <a:font script="Tfng" typeface="Ebrima"/>
+      </a:majorFont>
+      <a:minorFont>
+        <a:latin typeface="Calibri" panose="020F0502020204030204"/>
+        <a:ea typeface=""/>
+        <a:cs typeface=""/>
+        <a:font script="Jpan" typeface="游ゴシック"/>
+        <a:font script="Hang" typeface="맑은 고딕"/>
+        <a:font script="Hans" typeface="等线"/>
+        <a:font script="Hant" typeface="新細明體"/>
+        <a:font script="Arab" typeface="Arial"/>
+        <a:font script="Hebr" typeface="Arial"/>
+        <a:font script="Thai" typeface="Cordia New"/>
+        <a:font script="Ethi" typeface="Nyala"/>
+        <a:font script="Beng" typeface="Vrinda"/>
+        <a:font script="Gujr" typeface="Shruti"/>
+        <a:font script="Khmr" typeface="DaunPenh"/>
+        <a:font script="Knda" typeface="Tunga"/>
+        <a:font script="Guru" typeface="Raavi"/>
+        <a:font script="Cans" typeface="Euphemia"/>
+        <a:font script="Cher" typeface="Plantagenet Cherokee"/>
+        <a:font script="Yiii" typeface="Microsoft Yi Baiti"/>
+        <a:font script="Tibt" typeface="Microsoft Himalaya"/>
+        <a:font script="Thaa" typeface="MV Boli"/>
+        <a:font script="Deva" typeface="Mangal"/>
+        <a:font script="Telu" typeface="Gautami"/>
+        <a:font script="Taml" typeface="Latha"/>
+        <a:font script="Syrc" typeface="Estrangelo Edessa"/>
+        <a:font script="Orya" typeface="Kalinga"/>
+        <a:font script="Mlym" typeface="Kartika"/>
+        <a:font script="Laoo" typeface="DokChampa"/>
+        <a:font script="Sinh" typeface="Iskoola Pota"/>
+        <a:font script="Mong" typeface="Mongolian Baiti"/>
+        <a:font script="Viet" typeface="Arial"/>
+        <a:font script="Uigh" typeface="Microsoft Uighur"/>
+        <a:font script="Geor" typeface="Sylfaen"/>
+        <a:font script="Armn" typeface="Arial"/>
+        <a:font script="Bugi" typeface="Leelawadee UI"/>
+        <a:font script="Bopo" typeface="Microsoft JhengHei"/>
+        <a:font script="Java" typeface="Javanese Text"/>
+        <a:font script="Lisu" typeface="Segoe UI"/>
+        <a:font script="Mymr" typeface="Myanmar Text"/>
+        <a:font script="Nkoo" typeface="Ebrima"/>
+        <a:font script="Olck" typeface="Nirmala UI"/>
+        <a:font script="Osma" typeface="Ebrima"/>
+        <a:font script="Phag" typeface="Phagspa"/>
+        <a:font script="Syrn" typeface="Estrangelo Edessa"/>
+        <a:font script="Syrj" typeface="Estrangelo Edessa"/>
+        <a:font script="Syre" typeface="Estrangelo Edessa"/>
+        <a:font script="Sora" typeface="Nirmala UI"/>
+        <a:font script="Tale" typeface="Microsoft Tai Le"/>
+        <a:font script="Talu" typeface="Microsoft New Tai Lue"/>
+        <a:font script="Tfng" typeface="Ebrima"/>
+      </a:minorFont>
+    </a:fontScheme>
+    <a:fmtScheme name="Office">
+      <a:fillStyleLst>
+        <a:solidFill>
+          <a:schemeClr val="phClr"/>
+        </a:solidFill>
+        <a:gradFill rotWithShape="1">
+          <a:gsLst>
+            <a:gs pos="0">
+              <a:schemeClr val="phClr">
+                <a:lumMod val="110000"/>
+                <a:satMod val="105000"/>
+                <a:tint val="67000"/>
+              </a:schemeClr>
+            </a:gs>
+            <a:gs pos="50000">
+              <a:schemeClr val="phClr">
+                <a:lumMod val="105000"/>
+                <a:satMod val="103000"/>
+                <a:tint val="73000"/>
+              </a:schemeClr>
+            </a:gs>
+            <a:gs pos="100000">
+              <a:schemeClr val="phClr">
+                <a:lumMod val="105000"/>
+                <a:satMod val="109000"/>
+                <a:tint val="81000"/>
+              </a:schemeClr>
+            </a:gs>
+          </a:gsLst>
+          <a:lin ang="5400000" scaled="0"/>
+        </a:gradFill>
+        <a:gradFill rotWithShape="1">
+          <a:gsLst>
+            <a:gs pos="0">
+              <a:schemeClr val="phClr">
+                <a:satMod val="103000"/>
+                <a:lumMod val="102000"/>
+                <a:tint val="94000"/>
+              </a:schemeClr>
+            </a:gs>
+            <a:gs pos="50000">
+              <a:schemeClr val="phClr">
+                <a:satMod val="110000"/>
+                <a:lumMod val="100000"/>
+                <a:shade val="100000"/>
+              </a:schemeClr>
+            </a:gs>
+            <a:gs pos="100000">
+              <a:schemeClr val="phClr">
+                <a:lumMod val="99000"/>
+                <a:satMod val="120000"/>
+                <a:shade val="78000"/>
+              </a:schemeClr>
+            </a:gs>
+          </a:gsLst>
+          <a:lin ang="5400000" scaled="0"/>
+        </a:gradFill>
+      </a:fillStyleLst>
+      <a:lnStyleLst>
+        <a:ln w="6350" cap="flat" cmpd="sng" algn="ctr">
+          <a:solidFill>
+            <a:schemeClr val="phClr"/>
+          </a:solidFill>
+          <a:prstDash val="solid"/>
+          <a:miter lim="800000"/>
+        </a:ln>
+        <a:ln w="12700" cap="flat" cmpd="sng" algn="ctr">
+          <a:solidFill>
+            <a:schemeClr val="phClr"/>
+          </a:solidFill>
+          <a:prstDash val="solid"/>
+          <a:miter lim="800000"/>
+        </a:ln>
+        <a:ln w="19050" cap="flat" cmpd="sng" algn="ctr">
+          <a:solidFill>
+            <a:schemeClr val="phClr"/>
+          </a:solidFill>
+          <a:prstDash val="solid"/>
+          <a:miter lim="800000"/>
+        </a:ln>
+      </a:lnStyleLst>
+      <a:effectStyleLst>
+        <a:effectStyle>
+          <a:effectLst/>
+        </a:effectStyle>
+        <a:effectStyle>
+          <a:effectLst/>
+        </a:effectStyle>
+        <a:effectStyle>
+          <a:effectLst>
+            <a:outerShdw blurRad="57150" dist="19050" dir="5400000" algn="ctr" rotWithShape="0">
+              <a:srgbClr val="000000">
+                <a:alpha val="63000"/>
+              </a:srgbClr>
+            </a:outerShdw>
+          </a:effectLst>
+        </a:effectStyle>
+      </a:effectStyleLst>
+      <a:bgFillStyleLst>
+        <a:solidFill>
+          <a:schemeClr val="phClr"/>
+        </a:solidFill>
+        <a:solidFill>
+          <a:schemeClr val="phClr">
+            <a:tint val="95000"/>
+            <a:satMod val="170000"/>
+          </a:schemeClr>
+        </a:solidFill>
+        <a:gradFill rotWithShape="1">
+          <a:gsLst>
+            <a:gs pos="0">
+              <a:schemeClr val="phClr">
+                <a:tint val="93000"/>
+                <a:satMod val="150000"/>
+                <a:shade val="98000"/>
+                <a:lumMod val="102000"/>
+              </a:schemeClr>
+            </a:gs>
+            <a:gs pos="50000">
+              <a:schemeClr val="phClr">
+                <a:tint val="98000"/>
+                <a:satMod val="130000"/>
+                <a:shade val="90000"/>
+                <a:lumMod val="103000"/>
+              </a:schemeClr>
+            </a:gs>
+            <a:gs pos="100000">
+              <a:schemeClr val="phClr">
+                <a:shade val="63000"/>
+                <a:satMod val="120000"/>
+              </a:schemeClr>
+            </a:gs>
+          </a:gsLst>
+          <a:lin ang="5400000" scaled="0"/>
+        </a:gradFill>
+      </a:bgFillStyleLst>
+    </a:fmtScheme>
+  </a:themeElements>
+  <a:objectDefaults/>
+  <a:extraClrSchemeLst/>
+  <a:extLst>
+    <a:ext uri="{05A4C25C-085E-4340-85A3-A5531E510DB2}">
+      <thm15:themeFamily xmlns:thm15="http://schemas.microsoft.com/office/thememl/2012/main" name="Office Theme" id="{62F939B6-93AF-4DB8-9C6B-D6C7DFDC589F}" vid="{4A3C46E8-61CC-4603-A589-7422A47A8E4A}"/>
+    </a:ext>
+  </a:extLst>
+</a:theme>
 </file>
</xml_diff>